<commit_message>
-BIW**.PY Signed-off-by: Yujin <chaos1984@163.com>
</commit_message>
<xml_diff>
--- a/Python/Howtouse/Readme.pptx
+++ b/Python/Howtouse/Readme.pptx
@@ -5,10 +5,10 @@
     <p:sldMasterId id="2147483677" r:id="rId4"/>
   </p:sldMasterIdLst>
   <p:notesMasterIdLst>
-    <p:notesMasterId r:id="rId16"/>
+    <p:notesMasterId r:id="rId17"/>
   </p:notesMasterIdLst>
   <p:handoutMasterIdLst>
-    <p:handoutMasterId r:id="rId17"/>
+    <p:handoutMasterId r:id="rId18"/>
   </p:handoutMasterIdLst>
   <p:sldIdLst>
     <p:sldId id="256" r:id="rId5"/>
@@ -21,7 +21,8 @@
     <p:sldId id="261" r:id="rId12"/>
     <p:sldId id="263" r:id="rId13"/>
     <p:sldId id="264" r:id="rId14"/>
-    <p:sldId id="265" r:id="rId15"/>
+    <p:sldId id="267" r:id="rId15"/>
+    <p:sldId id="265" r:id="rId16"/>
   </p:sldIdLst>
   <p:sldSz cx="12192000" cy="6858000"/>
   <p:notesSz cx="6799263" cy="9929813"/>
@@ -135,6 +136,7 @@
             <p14:sldId id="261"/>
             <p14:sldId id="263"/>
             <p14:sldId id="264"/>
+            <p14:sldId id="267"/>
           </p14:sldIdLst>
         </p14:section>
         <p14:section name="Version updata log" id="{3BE00363-6993-4AC5-902F-A3AD116B5D64}">
@@ -174,6 +176,1922 @@
     </p:ext>
   </p:extLst>
 </p:presentation>
+</file>
+
+<file path=ppt/charts/chart1.xml><?xml version="1.0" encoding="utf-8"?>
+<c:chartSpace xmlns:c="http://schemas.openxmlformats.org/drawingml/2006/chart" xmlns:a="http://schemas.openxmlformats.org/drawingml/2006/main" xmlns:r="http://schemas.openxmlformats.org/officeDocument/2006/relationships">
+  <c:date1904 val="0"/>
+  <c:lang val="en-US"/>
+  <c:roundedCorners val="0"/>
+  <mc:AlternateContent xmlns:mc="http://schemas.openxmlformats.org/markup-compatibility/2006">
+    <mc:Choice xmlns:c14="http://schemas.microsoft.com/office/drawing/2007/8/2/chart" Requires="c14">
+      <c14:style val="102"/>
+    </mc:Choice>
+    <mc:Fallback>
+      <c:style val="2"/>
+    </mc:Fallback>
+  </mc:AlternateContent>
+  <c:chart>
+    <c:title>
+      <c:tx>
+        <c:rich>
+          <a:bodyPr rot="0" spcFirstLastPara="1" vertOverflow="ellipsis" vert="horz" wrap="square" anchor="ctr" anchorCtr="1"/>
+          <a:lstStyle/>
+          <a:p>
+            <a:pPr>
+              <a:defRPr sz="1862" b="0" i="0" u="none" strike="noStrike" kern="1200" spc="0" baseline="0">
+                <a:solidFill>
+                  <a:schemeClr val="tx1">
+                    <a:lumMod val="65000"/>
+                    <a:lumOff val="35000"/>
+                  </a:schemeClr>
+                </a:solidFill>
+                <a:latin typeface="+mn-lt"/>
+                <a:ea typeface="+mn-ea"/>
+                <a:cs typeface="+mn-cs"/>
+              </a:defRPr>
+            </a:pPr>
+            <a:r>
+              <a:rPr lang="en-US" altLang="zh-CN" dirty="0" smtClean="0"/>
+              <a:t>Time</a:t>
+            </a:r>
+            <a:r>
+              <a:rPr lang="zh-CN" altLang="en-US" dirty="0" smtClean="0"/>
+              <a:t>（</a:t>
+            </a:r>
+            <a:r>
+              <a:rPr lang="en-US" altLang="zh-CN" dirty="0" smtClean="0"/>
+              <a:t>/s</a:t>
+            </a:r>
+            <a:r>
+              <a:rPr lang="zh-CN" altLang="en-US" dirty="0" smtClean="0"/>
+              <a:t>）</a:t>
+            </a:r>
+            <a:endParaRPr lang="en-US" altLang="zh-CN" dirty="0"/>
+          </a:p>
+        </c:rich>
+      </c:tx>
+      <c:layout/>
+      <c:overlay val="0"/>
+      <c:spPr>
+        <a:noFill/>
+        <a:ln>
+          <a:noFill/>
+        </a:ln>
+        <a:effectLst/>
+      </c:spPr>
+      <c:txPr>
+        <a:bodyPr rot="0" spcFirstLastPara="1" vertOverflow="ellipsis" vert="horz" wrap="square" anchor="ctr" anchorCtr="1"/>
+        <a:lstStyle/>
+        <a:p>
+          <a:pPr>
+            <a:defRPr sz="1862" b="0" i="0" u="none" strike="noStrike" kern="1200" spc="0" baseline="0">
+              <a:solidFill>
+                <a:schemeClr val="tx1">
+                  <a:lumMod val="65000"/>
+                  <a:lumOff val="35000"/>
+                </a:schemeClr>
+              </a:solidFill>
+              <a:latin typeface="+mn-lt"/>
+              <a:ea typeface="+mn-ea"/>
+              <a:cs typeface="+mn-cs"/>
+            </a:defRPr>
+          </a:pPr>
+          <a:endParaRPr lang="zh-CN"/>
+        </a:p>
+      </c:txPr>
+    </c:title>
+    <c:autoTitleDeleted val="0"/>
+    <c:plotArea>
+      <c:layout/>
+      <c:barChart>
+        <c:barDir val="col"/>
+        <c:grouping val="clustered"/>
+        <c:varyColors val="0"/>
+        <c:ser>
+          <c:idx val="0"/>
+          <c:order val="0"/>
+          <c:tx>
+            <c:strRef>
+              <c:f>Sheet1!$B$1</c:f>
+              <c:strCache>
+                <c:ptCount val="1"/>
+                <c:pt idx="0">
+                  <c:v>PC(PC:Python lib)</c:v>
+                </c:pt>
+              </c:strCache>
+            </c:strRef>
+          </c:tx>
+          <c:spPr>
+            <a:solidFill>
+              <a:schemeClr val="accent1"/>
+            </a:solidFill>
+            <a:ln>
+              <a:noFill/>
+            </a:ln>
+            <a:effectLst/>
+          </c:spPr>
+          <c:invertIfNegative val="0"/>
+          <c:cat>
+            <c:numRef>
+              <c:f>Sheet1!$A$2</c:f>
+              <c:numCache>
+                <c:formatCode>General</c:formatCode>
+                <c:ptCount val="1"/>
+              </c:numCache>
+            </c:numRef>
+          </c:cat>
+          <c:val>
+            <c:numRef>
+              <c:f>Sheet1!$B$2</c:f>
+              <c:numCache>
+                <c:formatCode>General</c:formatCode>
+                <c:ptCount val="1"/>
+                <c:pt idx="0">
+                  <c:v>123.629</c:v>
+                </c:pt>
+              </c:numCache>
+            </c:numRef>
+          </c:val>
+        </c:ser>
+        <c:ser>
+          <c:idx val="1"/>
+          <c:order val="1"/>
+          <c:tx>
+            <c:strRef>
+              <c:f>Sheet1!$C$1</c:f>
+              <c:strCache>
+                <c:ptCount val="1"/>
+                <c:pt idx="0">
+                  <c:v>PC(Server:Python lib)</c:v>
+                </c:pt>
+              </c:strCache>
+            </c:strRef>
+          </c:tx>
+          <c:spPr>
+            <a:solidFill>
+              <a:schemeClr val="accent2"/>
+            </a:solidFill>
+            <a:ln>
+              <a:noFill/>
+            </a:ln>
+            <a:effectLst/>
+          </c:spPr>
+          <c:invertIfNegative val="0"/>
+          <c:cat>
+            <c:numRef>
+              <c:f>Sheet1!$A$2</c:f>
+              <c:numCache>
+                <c:formatCode>General</c:formatCode>
+                <c:ptCount val="1"/>
+              </c:numCache>
+            </c:numRef>
+          </c:cat>
+          <c:val>
+            <c:numRef>
+              <c:f>Sheet1!$C$2</c:f>
+              <c:numCache>
+                <c:formatCode>General</c:formatCode>
+                <c:ptCount val="1"/>
+                <c:pt idx="0">
+                  <c:v>202</c:v>
+                </c:pt>
+              </c:numCache>
+            </c:numRef>
+          </c:val>
+        </c:ser>
+        <c:ser>
+          <c:idx val="2"/>
+          <c:order val="2"/>
+          <c:tx>
+            <c:strRef>
+              <c:f>Sheet1!$D$1</c:f>
+              <c:strCache>
+                <c:ptCount val="1"/>
+                <c:pt idx="0">
+                  <c:v>Server</c:v>
+                </c:pt>
+              </c:strCache>
+            </c:strRef>
+          </c:tx>
+          <c:spPr>
+            <a:solidFill>
+              <a:schemeClr val="accent3"/>
+            </a:solidFill>
+            <a:ln>
+              <a:noFill/>
+            </a:ln>
+            <a:effectLst/>
+          </c:spPr>
+          <c:invertIfNegative val="0"/>
+          <c:cat>
+            <c:numRef>
+              <c:f>Sheet1!$A$2</c:f>
+              <c:numCache>
+                <c:formatCode>General</c:formatCode>
+                <c:ptCount val="1"/>
+              </c:numCache>
+            </c:numRef>
+          </c:cat>
+          <c:val>
+            <c:numRef>
+              <c:f>Sheet1!$D$2</c:f>
+              <c:numCache>
+                <c:formatCode>General</c:formatCode>
+                <c:ptCount val="1"/>
+                <c:pt idx="0">
+                  <c:v>192.42</c:v>
+                </c:pt>
+              </c:numCache>
+            </c:numRef>
+          </c:val>
+        </c:ser>
+        <c:dLbls>
+          <c:showLegendKey val="0"/>
+          <c:showVal val="0"/>
+          <c:showCatName val="0"/>
+          <c:showSerName val="0"/>
+          <c:showPercent val="0"/>
+          <c:showBubbleSize val="0"/>
+        </c:dLbls>
+        <c:gapWidth val="219"/>
+        <c:overlap val="-27"/>
+        <c:axId val="196308016"/>
+        <c:axId val="196306840"/>
+      </c:barChart>
+      <c:catAx>
+        <c:axId val="196308016"/>
+        <c:scaling>
+          <c:orientation val="minMax"/>
+        </c:scaling>
+        <c:delete val="0"/>
+        <c:axPos val="b"/>
+        <c:numFmt formatCode="General" sourceLinked="1"/>
+        <c:majorTickMark val="none"/>
+        <c:minorTickMark val="none"/>
+        <c:tickLblPos val="nextTo"/>
+        <c:spPr>
+          <a:noFill/>
+          <a:ln w="9525" cap="flat" cmpd="sng" algn="ctr">
+            <a:solidFill>
+              <a:schemeClr val="tx1">
+                <a:lumMod val="15000"/>
+                <a:lumOff val="85000"/>
+              </a:schemeClr>
+            </a:solidFill>
+            <a:round/>
+          </a:ln>
+          <a:effectLst/>
+        </c:spPr>
+        <c:txPr>
+          <a:bodyPr rot="-60000000" spcFirstLastPara="1" vertOverflow="ellipsis" vert="horz" wrap="square" anchor="ctr" anchorCtr="1"/>
+          <a:lstStyle/>
+          <a:p>
+            <a:pPr>
+              <a:defRPr sz="1197" b="0" i="0" u="none" strike="noStrike" kern="1200" baseline="0">
+                <a:solidFill>
+                  <a:schemeClr val="tx1">
+                    <a:lumMod val="65000"/>
+                    <a:lumOff val="35000"/>
+                  </a:schemeClr>
+                </a:solidFill>
+                <a:latin typeface="+mn-lt"/>
+                <a:ea typeface="+mn-ea"/>
+                <a:cs typeface="+mn-cs"/>
+              </a:defRPr>
+            </a:pPr>
+            <a:endParaRPr lang="zh-CN"/>
+          </a:p>
+        </c:txPr>
+        <c:crossAx val="196306840"/>
+        <c:crosses val="autoZero"/>
+        <c:auto val="1"/>
+        <c:lblAlgn val="ctr"/>
+        <c:lblOffset val="100"/>
+        <c:noMultiLvlLbl val="0"/>
+      </c:catAx>
+      <c:valAx>
+        <c:axId val="196306840"/>
+        <c:scaling>
+          <c:orientation val="minMax"/>
+        </c:scaling>
+        <c:delete val="0"/>
+        <c:axPos val="l"/>
+        <c:majorGridlines>
+          <c:spPr>
+            <a:ln w="9525" cap="flat" cmpd="sng" algn="ctr">
+              <a:solidFill>
+                <a:schemeClr val="tx1">
+                  <a:lumMod val="15000"/>
+                  <a:lumOff val="85000"/>
+                </a:schemeClr>
+              </a:solidFill>
+              <a:round/>
+            </a:ln>
+            <a:effectLst/>
+          </c:spPr>
+        </c:majorGridlines>
+        <c:numFmt formatCode="General" sourceLinked="1"/>
+        <c:majorTickMark val="none"/>
+        <c:minorTickMark val="none"/>
+        <c:tickLblPos val="nextTo"/>
+        <c:spPr>
+          <a:noFill/>
+          <a:ln>
+            <a:noFill/>
+          </a:ln>
+          <a:effectLst/>
+        </c:spPr>
+        <c:txPr>
+          <a:bodyPr rot="-60000000" spcFirstLastPara="1" vertOverflow="ellipsis" vert="horz" wrap="square" anchor="ctr" anchorCtr="1"/>
+          <a:lstStyle/>
+          <a:p>
+            <a:pPr>
+              <a:defRPr sz="1197" b="0" i="0" u="none" strike="noStrike" kern="1200" baseline="0">
+                <a:solidFill>
+                  <a:schemeClr val="tx1">
+                    <a:lumMod val="65000"/>
+                    <a:lumOff val="35000"/>
+                  </a:schemeClr>
+                </a:solidFill>
+                <a:latin typeface="+mn-lt"/>
+                <a:ea typeface="+mn-ea"/>
+                <a:cs typeface="+mn-cs"/>
+              </a:defRPr>
+            </a:pPr>
+            <a:endParaRPr lang="zh-CN"/>
+          </a:p>
+        </c:txPr>
+        <c:crossAx val="196308016"/>
+        <c:crosses val="autoZero"/>
+        <c:crossBetween val="between"/>
+      </c:valAx>
+      <c:spPr>
+        <a:noFill/>
+        <a:ln>
+          <a:noFill/>
+        </a:ln>
+        <a:effectLst/>
+      </c:spPr>
+    </c:plotArea>
+    <c:legend>
+      <c:legendPos val="b"/>
+      <c:layout/>
+      <c:overlay val="0"/>
+      <c:spPr>
+        <a:noFill/>
+        <a:ln>
+          <a:noFill/>
+        </a:ln>
+        <a:effectLst/>
+      </c:spPr>
+      <c:txPr>
+        <a:bodyPr rot="0" spcFirstLastPara="1" vertOverflow="ellipsis" vert="horz" wrap="square" anchor="ctr" anchorCtr="1"/>
+        <a:lstStyle/>
+        <a:p>
+          <a:pPr>
+            <a:defRPr sz="1197" b="0" i="0" u="none" strike="noStrike" kern="1200" baseline="0">
+              <a:solidFill>
+                <a:schemeClr val="tx1">
+                  <a:lumMod val="65000"/>
+                  <a:lumOff val="35000"/>
+                </a:schemeClr>
+              </a:solidFill>
+              <a:latin typeface="+mn-lt"/>
+              <a:ea typeface="+mn-ea"/>
+              <a:cs typeface="+mn-cs"/>
+            </a:defRPr>
+          </a:pPr>
+          <a:endParaRPr lang="zh-CN"/>
+        </a:p>
+      </c:txPr>
+    </c:legend>
+    <c:plotVisOnly val="1"/>
+    <c:dispBlanksAs val="gap"/>
+    <c:showDLblsOverMax val="0"/>
+  </c:chart>
+  <c:spPr>
+    <a:noFill/>
+    <a:ln>
+      <a:noFill/>
+    </a:ln>
+    <a:effectLst/>
+  </c:spPr>
+  <c:txPr>
+    <a:bodyPr/>
+    <a:lstStyle/>
+    <a:p>
+      <a:pPr>
+        <a:defRPr/>
+      </a:pPr>
+      <a:endParaRPr lang="zh-CN"/>
+    </a:p>
+  </c:txPr>
+  <c:externalData r:id="rId3">
+    <c:autoUpdate val="0"/>
+  </c:externalData>
+</c:chartSpace>
+</file>
+
+<file path=ppt/charts/chart2.xml><?xml version="1.0" encoding="utf-8"?>
+<c:chartSpace xmlns:c="http://schemas.openxmlformats.org/drawingml/2006/chart" xmlns:a="http://schemas.openxmlformats.org/drawingml/2006/main" xmlns:r="http://schemas.openxmlformats.org/officeDocument/2006/relationships">
+  <c:date1904 val="0"/>
+  <c:lang val="en-US"/>
+  <c:roundedCorners val="0"/>
+  <mc:AlternateContent xmlns:mc="http://schemas.openxmlformats.org/markup-compatibility/2006">
+    <mc:Choice xmlns:c14="http://schemas.microsoft.com/office/drawing/2007/8/2/chart" Requires="c14">
+      <c14:style val="102"/>
+    </mc:Choice>
+    <mc:Fallback>
+      <c:style val="2"/>
+    </mc:Fallback>
+  </mc:AlternateContent>
+  <c:chart>
+    <c:title>
+      <c:tx>
+        <c:rich>
+          <a:bodyPr rot="0" spcFirstLastPara="1" vertOverflow="ellipsis" vert="horz" wrap="square" anchor="ctr" anchorCtr="1"/>
+          <a:lstStyle/>
+          <a:p>
+            <a:pPr>
+              <a:defRPr sz="1862" b="0" i="0" u="none" strike="noStrike" kern="1200" spc="0" baseline="0">
+                <a:solidFill>
+                  <a:schemeClr val="tx1">
+                    <a:lumMod val="65000"/>
+                    <a:lumOff val="35000"/>
+                  </a:schemeClr>
+                </a:solidFill>
+                <a:latin typeface="+mn-lt"/>
+                <a:ea typeface="+mn-ea"/>
+                <a:cs typeface="+mn-cs"/>
+              </a:defRPr>
+            </a:pPr>
+            <a:r>
+              <a:rPr lang="en-US" altLang="zh-CN" dirty="0" smtClean="0"/>
+              <a:t>Time</a:t>
+            </a:r>
+            <a:r>
+              <a:rPr lang="zh-CN" altLang="en-US" dirty="0" smtClean="0"/>
+              <a:t>（</a:t>
+            </a:r>
+            <a:r>
+              <a:rPr lang="en-US" altLang="zh-CN" dirty="0" smtClean="0"/>
+              <a:t>/s</a:t>
+            </a:r>
+            <a:r>
+              <a:rPr lang="zh-CN" altLang="en-US" dirty="0" smtClean="0"/>
+              <a:t>）</a:t>
+            </a:r>
+            <a:endParaRPr lang="en-US" altLang="zh-CN" dirty="0"/>
+          </a:p>
+        </c:rich>
+      </c:tx>
+      <c:layout/>
+      <c:overlay val="0"/>
+      <c:spPr>
+        <a:noFill/>
+        <a:ln>
+          <a:noFill/>
+        </a:ln>
+        <a:effectLst/>
+      </c:spPr>
+      <c:txPr>
+        <a:bodyPr rot="0" spcFirstLastPara="1" vertOverflow="ellipsis" vert="horz" wrap="square" anchor="ctr" anchorCtr="1"/>
+        <a:lstStyle/>
+        <a:p>
+          <a:pPr>
+            <a:defRPr sz="1862" b="0" i="0" u="none" strike="noStrike" kern="1200" spc="0" baseline="0">
+              <a:solidFill>
+                <a:schemeClr val="tx1">
+                  <a:lumMod val="65000"/>
+                  <a:lumOff val="35000"/>
+                </a:schemeClr>
+              </a:solidFill>
+              <a:latin typeface="+mn-lt"/>
+              <a:ea typeface="+mn-ea"/>
+              <a:cs typeface="+mn-cs"/>
+            </a:defRPr>
+          </a:pPr>
+          <a:endParaRPr lang="zh-CN"/>
+        </a:p>
+      </c:txPr>
+    </c:title>
+    <c:autoTitleDeleted val="0"/>
+    <c:plotArea>
+      <c:layout/>
+      <c:barChart>
+        <c:barDir val="col"/>
+        <c:grouping val="clustered"/>
+        <c:varyColors val="0"/>
+        <c:ser>
+          <c:idx val="0"/>
+          <c:order val="0"/>
+          <c:tx>
+            <c:strRef>
+              <c:f>Sheet1!$B$1</c:f>
+              <c:strCache>
+                <c:ptCount val="1"/>
+                <c:pt idx="0">
+                  <c:v>PC(PC:Python lib)</c:v>
+                </c:pt>
+              </c:strCache>
+            </c:strRef>
+          </c:tx>
+          <c:spPr>
+            <a:solidFill>
+              <a:schemeClr val="accent1"/>
+            </a:solidFill>
+            <a:ln>
+              <a:noFill/>
+            </a:ln>
+            <a:effectLst/>
+          </c:spPr>
+          <c:invertIfNegative val="0"/>
+          <c:cat>
+            <c:numRef>
+              <c:f>Sheet1!$A$2</c:f>
+              <c:numCache>
+                <c:formatCode>General</c:formatCode>
+                <c:ptCount val="1"/>
+              </c:numCache>
+            </c:numRef>
+          </c:cat>
+          <c:val>
+            <c:numRef>
+              <c:f>Sheet1!$B$2</c:f>
+              <c:numCache>
+                <c:formatCode>General</c:formatCode>
+                <c:ptCount val="1"/>
+                <c:pt idx="0">
+                  <c:v>39.299999999999997</c:v>
+                </c:pt>
+              </c:numCache>
+            </c:numRef>
+          </c:val>
+        </c:ser>
+        <c:ser>
+          <c:idx val="1"/>
+          <c:order val="1"/>
+          <c:tx>
+            <c:strRef>
+              <c:f>Sheet1!$C$1</c:f>
+              <c:strCache>
+                <c:ptCount val="1"/>
+                <c:pt idx="0">
+                  <c:v>PC(Server:Python lib)</c:v>
+                </c:pt>
+              </c:strCache>
+            </c:strRef>
+          </c:tx>
+          <c:spPr>
+            <a:solidFill>
+              <a:schemeClr val="accent2"/>
+            </a:solidFill>
+            <a:ln>
+              <a:noFill/>
+            </a:ln>
+            <a:effectLst/>
+          </c:spPr>
+          <c:invertIfNegative val="0"/>
+          <c:cat>
+            <c:numRef>
+              <c:f>Sheet1!$A$2</c:f>
+              <c:numCache>
+                <c:formatCode>General</c:formatCode>
+                <c:ptCount val="1"/>
+              </c:numCache>
+            </c:numRef>
+          </c:cat>
+          <c:val>
+            <c:numRef>
+              <c:f>Sheet1!$C$2</c:f>
+              <c:numCache>
+                <c:formatCode>General</c:formatCode>
+                <c:ptCount val="1"/>
+                <c:pt idx="0">
+                  <c:v>158.375</c:v>
+                </c:pt>
+              </c:numCache>
+            </c:numRef>
+          </c:val>
+        </c:ser>
+        <c:ser>
+          <c:idx val="2"/>
+          <c:order val="2"/>
+          <c:tx>
+            <c:strRef>
+              <c:f>Sheet1!$D$1</c:f>
+              <c:strCache>
+                <c:ptCount val="1"/>
+                <c:pt idx="0">
+                  <c:v>Server</c:v>
+                </c:pt>
+              </c:strCache>
+            </c:strRef>
+          </c:tx>
+          <c:spPr>
+            <a:solidFill>
+              <a:schemeClr val="accent3"/>
+            </a:solidFill>
+            <a:ln>
+              <a:noFill/>
+            </a:ln>
+            <a:effectLst/>
+          </c:spPr>
+          <c:invertIfNegative val="0"/>
+          <c:cat>
+            <c:numRef>
+              <c:f>Sheet1!$A$2</c:f>
+              <c:numCache>
+                <c:formatCode>General</c:formatCode>
+                <c:ptCount val="1"/>
+              </c:numCache>
+            </c:numRef>
+          </c:cat>
+          <c:val>
+            <c:numRef>
+              <c:f>Sheet1!$D$2</c:f>
+              <c:numCache>
+                <c:formatCode>General</c:formatCode>
+                <c:ptCount val="1"/>
+                <c:pt idx="0">
+                  <c:v>185.637</c:v>
+                </c:pt>
+              </c:numCache>
+            </c:numRef>
+          </c:val>
+        </c:ser>
+        <c:dLbls>
+          <c:showLegendKey val="0"/>
+          <c:showVal val="0"/>
+          <c:showCatName val="0"/>
+          <c:showSerName val="0"/>
+          <c:showPercent val="0"/>
+          <c:showBubbleSize val="0"/>
+        </c:dLbls>
+        <c:gapWidth val="219"/>
+        <c:overlap val="-27"/>
+        <c:axId val="199648336"/>
+        <c:axId val="199648728"/>
+      </c:barChart>
+      <c:catAx>
+        <c:axId val="199648336"/>
+        <c:scaling>
+          <c:orientation val="minMax"/>
+        </c:scaling>
+        <c:delete val="0"/>
+        <c:axPos val="b"/>
+        <c:numFmt formatCode="General" sourceLinked="1"/>
+        <c:majorTickMark val="none"/>
+        <c:minorTickMark val="none"/>
+        <c:tickLblPos val="nextTo"/>
+        <c:spPr>
+          <a:noFill/>
+          <a:ln w="9525" cap="flat" cmpd="sng" algn="ctr">
+            <a:solidFill>
+              <a:schemeClr val="tx1">
+                <a:lumMod val="15000"/>
+                <a:lumOff val="85000"/>
+              </a:schemeClr>
+            </a:solidFill>
+            <a:round/>
+          </a:ln>
+          <a:effectLst/>
+        </c:spPr>
+        <c:txPr>
+          <a:bodyPr rot="-60000000" spcFirstLastPara="1" vertOverflow="ellipsis" vert="horz" wrap="square" anchor="ctr" anchorCtr="1"/>
+          <a:lstStyle/>
+          <a:p>
+            <a:pPr>
+              <a:defRPr sz="1197" b="0" i="0" u="none" strike="noStrike" kern="1200" baseline="0">
+                <a:solidFill>
+                  <a:schemeClr val="tx1">
+                    <a:lumMod val="65000"/>
+                    <a:lumOff val="35000"/>
+                  </a:schemeClr>
+                </a:solidFill>
+                <a:latin typeface="+mn-lt"/>
+                <a:ea typeface="+mn-ea"/>
+                <a:cs typeface="+mn-cs"/>
+              </a:defRPr>
+            </a:pPr>
+            <a:endParaRPr lang="zh-CN"/>
+          </a:p>
+        </c:txPr>
+        <c:crossAx val="199648728"/>
+        <c:crosses val="autoZero"/>
+        <c:auto val="1"/>
+        <c:lblAlgn val="ctr"/>
+        <c:lblOffset val="100"/>
+        <c:noMultiLvlLbl val="0"/>
+      </c:catAx>
+      <c:valAx>
+        <c:axId val="199648728"/>
+        <c:scaling>
+          <c:orientation val="minMax"/>
+        </c:scaling>
+        <c:delete val="0"/>
+        <c:axPos val="l"/>
+        <c:majorGridlines>
+          <c:spPr>
+            <a:ln w="9525" cap="flat" cmpd="sng" algn="ctr">
+              <a:solidFill>
+                <a:schemeClr val="tx1">
+                  <a:lumMod val="15000"/>
+                  <a:lumOff val="85000"/>
+                </a:schemeClr>
+              </a:solidFill>
+              <a:round/>
+            </a:ln>
+            <a:effectLst/>
+          </c:spPr>
+        </c:majorGridlines>
+        <c:numFmt formatCode="General" sourceLinked="1"/>
+        <c:majorTickMark val="none"/>
+        <c:minorTickMark val="none"/>
+        <c:tickLblPos val="nextTo"/>
+        <c:spPr>
+          <a:noFill/>
+          <a:ln>
+            <a:noFill/>
+          </a:ln>
+          <a:effectLst/>
+        </c:spPr>
+        <c:txPr>
+          <a:bodyPr rot="-60000000" spcFirstLastPara="1" vertOverflow="ellipsis" vert="horz" wrap="square" anchor="ctr" anchorCtr="1"/>
+          <a:lstStyle/>
+          <a:p>
+            <a:pPr>
+              <a:defRPr sz="1197" b="0" i="0" u="none" strike="noStrike" kern="1200" baseline="0">
+                <a:solidFill>
+                  <a:schemeClr val="tx1">
+                    <a:lumMod val="65000"/>
+                    <a:lumOff val="35000"/>
+                  </a:schemeClr>
+                </a:solidFill>
+                <a:latin typeface="+mn-lt"/>
+                <a:ea typeface="+mn-ea"/>
+                <a:cs typeface="+mn-cs"/>
+              </a:defRPr>
+            </a:pPr>
+            <a:endParaRPr lang="zh-CN"/>
+          </a:p>
+        </c:txPr>
+        <c:crossAx val="199648336"/>
+        <c:crosses val="autoZero"/>
+        <c:crossBetween val="between"/>
+      </c:valAx>
+      <c:spPr>
+        <a:noFill/>
+        <a:ln>
+          <a:noFill/>
+        </a:ln>
+        <a:effectLst/>
+      </c:spPr>
+    </c:plotArea>
+    <c:legend>
+      <c:legendPos val="b"/>
+      <c:layout/>
+      <c:overlay val="0"/>
+      <c:spPr>
+        <a:noFill/>
+        <a:ln>
+          <a:noFill/>
+        </a:ln>
+        <a:effectLst/>
+      </c:spPr>
+      <c:txPr>
+        <a:bodyPr rot="0" spcFirstLastPara="1" vertOverflow="ellipsis" vert="horz" wrap="square" anchor="ctr" anchorCtr="1"/>
+        <a:lstStyle/>
+        <a:p>
+          <a:pPr>
+            <a:defRPr sz="1197" b="0" i="0" u="none" strike="noStrike" kern="1200" baseline="0">
+              <a:solidFill>
+                <a:schemeClr val="tx1">
+                  <a:lumMod val="65000"/>
+                  <a:lumOff val="35000"/>
+                </a:schemeClr>
+              </a:solidFill>
+              <a:latin typeface="+mn-lt"/>
+              <a:ea typeface="+mn-ea"/>
+              <a:cs typeface="+mn-cs"/>
+            </a:defRPr>
+          </a:pPr>
+          <a:endParaRPr lang="zh-CN"/>
+        </a:p>
+      </c:txPr>
+    </c:legend>
+    <c:plotVisOnly val="1"/>
+    <c:dispBlanksAs val="gap"/>
+    <c:showDLblsOverMax val="0"/>
+  </c:chart>
+  <c:spPr>
+    <a:noFill/>
+    <a:ln>
+      <a:noFill/>
+    </a:ln>
+    <a:effectLst/>
+  </c:spPr>
+  <c:txPr>
+    <a:bodyPr/>
+    <a:lstStyle/>
+    <a:p>
+      <a:pPr>
+        <a:defRPr/>
+      </a:pPr>
+      <a:endParaRPr lang="zh-CN"/>
+    </a:p>
+  </c:txPr>
+  <c:externalData r:id="rId3">
+    <c:autoUpdate val="0"/>
+  </c:externalData>
+</c:chartSpace>
+</file>
+
+<file path=ppt/charts/colors1.xml><?xml version="1.0" encoding="utf-8"?>
+<cs:colorStyle xmlns:cs="http://schemas.microsoft.com/office/drawing/2012/chartStyle" xmlns:a="http://schemas.openxmlformats.org/drawingml/2006/main" meth="cycle" id="10">
+  <a:schemeClr val="accent1"/>
+  <a:schemeClr val="accent2"/>
+  <a:schemeClr val="accent3"/>
+  <a:schemeClr val="accent4"/>
+  <a:schemeClr val="accent5"/>
+  <a:schemeClr val="accent6"/>
+  <cs:variation/>
+  <cs:variation>
+    <a:lumMod val="60000"/>
+  </cs:variation>
+  <cs:variation>
+    <a:lumMod val="80000"/>
+    <a:lumOff val="20000"/>
+  </cs:variation>
+  <cs:variation>
+    <a:lumMod val="80000"/>
+  </cs:variation>
+  <cs:variation>
+    <a:lumMod val="60000"/>
+    <a:lumOff val="40000"/>
+  </cs:variation>
+  <cs:variation>
+    <a:lumMod val="50000"/>
+  </cs:variation>
+  <cs:variation>
+    <a:lumMod val="70000"/>
+    <a:lumOff val="30000"/>
+  </cs:variation>
+  <cs:variation>
+    <a:lumMod val="70000"/>
+  </cs:variation>
+  <cs:variation>
+    <a:lumMod val="50000"/>
+    <a:lumOff val="50000"/>
+  </cs:variation>
+</cs:colorStyle>
+</file>
+
+<file path=ppt/charts/colors2.xml><?xml version="1.0" encoding="utf-8"?>
+<cs:colorStyle xmlns:cs="http://schemas.microsoft.com/office/drawing/2012/chartStyle" xmlns:a="http://schemas.openxmlformats.org/drawingml/2006/main" meth="cycle" id="10">
+  <a:schemeClr val="accent1"/>
+  <a:schemeClr val="accent2"/>
+  <a:schemeClr val="accent3"/>
+  <a:schemeClr val="accent4"/>
+  <a:schemeClr val="accent5"/>
+  <a:schemeClr val="accent6"/>
+  <cs:variation/>
+  <cs:variation>
+    <a:lumMod val="60000"/>
+  </cs:variation>
+  <cs:variation>
+    <a:lumMod val="80000"/>
+    <a:lumOff val="20000"/>
+  </cs:variation>
+  <cs:variation>
+    <a:lumMod val="80000"/>
+  </cs:variation>
+  <cs:variation>
+    <a:lumMod val="60000"/>
+    <a:lumOff val="40000"/>
+  </cs:variation>
+  <cs:variation>
+    <a:lumMod val="50000"/>
+  </cs:variation>
+  <cs:variation>
+    <a:lumMod val="70000"/>
+    <a:lumOff val="30000"/>
+  </cs:variation>
+  <cs:variation>
+    <a:lumMod val="70000"/>
+  </cs:variation>
+  <cs:variation>
+    <a:lumMod val="50000"/>
+    <a:lumOff val="50000"/>
+  </cs:variation>
+</cs:colorStyle>
+</file>
+
+<file path=ppt/charts/style1.xml><?xml version="1.0" encoding="utf-8"?>
+<cs:chartStyle xmlns:cs="http://schemas.microsoft.com/office/drawing/2012/chartStyle" xmlns:a="http://schemas.openxmlformats.org/drawingml/2006/main" id="201">
+  <cs:axisTitle>
+    <cs:lnRef idx="0"/>
+    <cs:fillRef idx="0"/>
+    <cs:effectRef idx="0"/>
+    <cs:fontRef idx="minor">
+      <a:schemeClr val="tx1">
+        <a:lumMod val="65000"/>
+        <a:lumOff val="35000"/>
+      </a:schemeClr>
+    </cs:fontRef>
+    <cs:defRPr sz="1330" kern="1200"/>
+  </cs:axisTitle>
+  <cs:categoryAxis>
+    <cs:lnRef idx="0"/>
+    <cs:fillRef idx="0"/>
+    <cs:effectRef idx="0"/>
+    <cs:fontRef idx="minor">
+      <a:schemeClr val="tx1">
+        <a:lumMod val="65000"/>
+        <a:lumOff val="35000"/>
+      </a:schemeClr>
+    </cs:fontRef>
+    <cs:spPr>
+      <a:ln w="9525" cap="flat" cmpd="sng" algn="ctr">
+        <a:solidFill>
+          <a:schemeClr val="tx1">
+            <a:lumMod val="15000"/>
+            <a:lumOff val="85000"/>
+          </a:schemeClr>
+        </a:solidFill>
+        <a:round/>
+      </a:ln>
+    </cs:spPr>
+    <cs:defRPr sz="1197" kern="1200"/>
+  </cs:categoryAxis>
+  <cs:chartArea mods="allowNoFillOverride allowNoLineOverride">
+    <cs:lnRef idx="0"/>
+    <cs:fillRef idx="0"/>
+    <cs:effectRef idx="0"/>
+    <cs:fontRef idx="minor">
+      <a:schemeClr val="tx1"/>
+    </cs:fontRef>
+    <cs:spPr>
+      <a:solidFill>
+        <a:schemeClr val="bg1"/>
+      </a:solidFill>
+      <a:ln w="9525" cap="flat" cmpd="sng" algn="ctr">
+        <a:solidFill>
+          <a:schemeClr val="tx1">
+            <a:lumMod val="15000"/>
+            <a:lumOff val="85000"/>
+          </a:schemeClr>
+        </a:solidFill>
+        <a:round/>
+      </a:ln>
+    </cs:spPr>
+    <cs:defRPr sz="1330" kern="1200"/>
+  </cs:chartArea>
+  <cs:dataLabel>
+    <cs:lnRef idx="0"/>
+    <cs:fillRef idx="0"/>
+    <cs:effectRef idx="0"/>
+    <cs:fontRef idx="minor">
+      <a:schemeClr val="tx1">
+        <a:lumMod val="75000"/>
+        <a:lumOff val="25000"/>
+      </a:schemeClr>
+    </cs:fontRef>
+    <cs:defRPr sz="1197" kern="1200"/>
+  </cs:dataLabel>
+  <cs:dataLabelCallout>
+    <cs:lnRef idx="0"/>
+    <cs:fillRef idx="0"/>
+    <cs:effectRef idx="0"/>
+    <cs:fontRef idx="minor">
+      <a:schemeClr val="dk1">
+        <a:lumMod val="65000"/>
+        <a:lumOff val="35000"/>
+      </a:schemeClr>
+    </cs:fontRef>
+    <cs:spPr>
+      <a:solidFill>
+        <a:schemeClr val="lt1"/>
+      </a:solidFill>
+      <a:ln>
+        <a:solidFill>
+          <a:schemeClr val="dk1">
+            <a:lumMod val="25000"/>
+            <a:lumOff val="75000"/>
+          </a:schemeClr>
+        </a:solidFill>
+      </a:ln>
+    </cs:spPr>
+    <cs:defRPr sz="1197" kern="1200"/>
+    <cs:bodyPr rot="0" spcFirstLastPara="1" vertOverflow="clip" horzOverflow="clip" vert="horz" wrap="square" lIns="36576" tIns="18288" rIns="36576" bIns="18288" anchor="ctr" anchorCtr="1">
+      <a:spAutoFit/>
+    </cs:bodyPr>
+  </cs:dataLabelCallout>
+  <cs:dataPoint>
+    <cs:lnRef idx="0"/>
+    <cs:fillRef idx="1">
+      <cs:styleClr val="auto"/>
+    </cs:fillRef>
+    <cs:effectRef idx="0"/>
+    <cs:fontRef idx="minor">
+      <a:schemeClr val="tx1"/>
+    </cs:fontRef>
+  </cs:dataPoint>
+  <cs:dataPoint3D>
+    <cs:lnRef idx="0"/>
+    <cs:fillRef idx="1">
+      <cs:styleClr val="auto"/>
+    </cs:fillRef>
+    <cs:effectRef idx="0"/>
+    <cs:fontRef idx="minor">
+      <a:schemeClr val="tx1"/>
+    </cs:fontRef>
+  </cs:dataPoint3D>
+  <cs:dataPointLine>
+    <cs:lnRef idx="0">
+      <cs:styleClr val="auto"/>
+    </cs:lnRef>
+    <cs:fillRef idx="1"/>
+    <cs:effectRef idx="0"/>
+    <cs:fontRef idx="minor">
+      <a:schemeClr val="tx1"/>
+    </cs:fontRef>
+    <cs:spPr>
+      <a:ln w="28575" cap="rnd">
+        <a:solidFill>
+          <a:schemeClr val="phClr"/>
+        </a:solidFill>
+        <a:round/>
+      </a:ln>
+    </cs:spPr>
+  </cs:dataPointLine>
+  <cs:dataPointMarker>
+    <cs:lnRef idx="0">
+      <cs:styleClr val="auto"/>
+    </cs:lnRef>
+    <cs:fillRef idx="1">
+      <cs:styleClr val="auto"/>
+    </cs:fillRef>
+    <cs:effectRef idx="0"/>
+    <cs:fontRef idx="minor">
+      <a:schemeClr val="tx1"/>
+    </cs:fontRef>
+    <cs:spPr>
+      <a:ln w="9525">
+        <a:solidFill>
+          <a:schemeClr val="phClr"/>
+        </a:solidFill>
+      </a:ln>
+    </cs:spPr>
+  </cs:dataPointMarker>
+  <cs:dataPointMarkerLayout symbol="circle" size="5"/>
+  <cs:dataPointWireframe>
+    <cs:lnRef idx="0">
+      <cs:styleClr val="auto"/>
+    </cs:lnRef>
+    <cs:fillRef idx="1"/>
+    <cs:effectRef idx="0"/>
+    <cs:fontRef idx="minor">
+      <a:schemeClr val="tx1"/>
+    </cs:fontRef>
+    <cs:spPr>
+      <a:ln w="9525" cap="rnd">
+        <a:solidFill>
+          <a:schemeClr val="phClr"/>
+        </a:solidFill>
+        <a:round/>
+      </a:ln>
+    </cs:spPr>
+  </cs:dataPointWireframe>
+  <cs:dataTable>
+    <cs:lnRef idx="0"/>
+    <cs:fillRef idx="0"/>
+    <cs:effectRef idx="0"/>
+    <cs:fontRef idx="minor">
+      <a:schemeClr val="tx1">
+        <a:lumMod val="65000"/>
+        <a:lumOff val="35000"/>
+      </a:schemeClr>
+    </cs:fontRef>
+    <cs:spPr>
+      <a:noFill/>
+      <a:ln w="9525" cap="flat" cmpd="sng" algn="ctr">
+        <a:solidFill>
+          <a:schemeClr val="tx1">
+            <a:lumMod val="15000"/>
+            <a:lumOff val="85000"/>
+          </a:schemeClr>
+        </a:solidFill>
+        <a:round/>
+      </a:ln>
+    </cs:spPr>
+    <cs:defRPr sz="1197" kern="1200"/>
+  </cs:dataTable>
+  <cs:downBar>
+    <cs:lnRef idx="0"/>
+    <cs:fillRef idx="0"/>
+    <cs:effectRef idx="0"/>
+    <cs:fontRef idx="minor">
+      <a:schemeClr val="dk1"/>
+    </cs:fontRef>
+    <cs:spPr>
+      <a:solidFill>
+        <a:schemeClr val="dk1">
+          <a:lumMod val="65000"/>
+          <a:lumOff val="35000"/>
+        </a:schemeClr>
+      </a:solidFill>
+      <a:ln w="9525">
+        <a:solidFill>
+          <a:schemeClr val="tx1">
+            <a:lumMod val="65000"/>
+            <a:lumOff val="35000"/>
+          </a:schemeClr>
+        </a:solidFill>
+      </a:ln>
+    </cs:spPr>
+  </cs:downBar>
+  <cs:dropLine>
+    <cs:lnRef idx="0"/>
+    <cs:fillRef idx="0"/>
+    <cs:effectRef idx="0"/>
+    <cs:fontRef idx="minor">
+      <a:schemeClr val="tx1"/>
+    </cs:fontRef>
+    <cs:spPr>
+      <a:ln w="9525" cap="flat" cmpd="sng" algn="ctr">
+        <a:solidFill>
+          <a:schemeClr val="tx1">
+            <a:lumMod val="35000"/>
+            <a:lumOff val="65000"/>
+          </a:schemeClr>
+        </a:solidFill>
+        <a:round/>
+      </a:ln>
+    </cs:spPr>
+  </cs:dropLine>
+  <cs:errorBar>
+    <cs:lnRef idx="0"/>
+    <cs:fillRef idx="0"/>
+    <cs:effectRef idx="0"/>
+    <cs:fontRef idx="minor">
+      <a:schemeClr val="tx1"/>
+    </cs:fontRef>
+    <cs:spPr>
+      <a:ln w="9525" cap="flat" cmpd="sng" algn="ctr">
+        <a:solidFill>
+          <a:schemeClr val="tx1">
+            <a:lumMod val="65000"/>
+            <a:lumOff val="35000"/>
+          </a:schemeClr>
+        </a:solidFill>
+        <a:round/>
+      </a:ln>
+    </cs:spPr>
+  </cs:errorBar>
+  <cs:floor>
+    <cs:lnRef idx="0"/>
+    <cs:fillRef idx="0"/>
+    <cs:effectRef idx="0"/>
+    <cs:fontRef idx="minor">
+      <a:schemeClr val="tx1"/>
+    </cs:fontRef>
+    <cs:spPr>
+      <a:noFill/>
+      <a:ln>
+        <a:noFill/>
+      </a:ln>
+    </cs:spPr>
+  </cs:floor>
+  <cs:gridlineMajor>
+    <cs:lnRef idx="0"/>
+    <cs:fillRef idx="0"/>
+    <cs:effectRef idx="0"/>
+    <cs:fontRef idx="minor">
+      <a:schemeClr val="tx1"/>
+    </cs:fontRef>
+    <cs:spPr>
+      <a:ln w="9525" cap="flat" cmpd="sng" algn="ctr">
+        <a:solidFill>
+          <a:schemeClr val="tx1">
+            <a:lumMod val="15000"/>
+            <a:lumOff val="85000"/>
+          </a:schemeClr>
+        </a:solidFill>
+        <a:round/>
+      </a:ln>
+    </cs:spPr>
+  </cs:gridlineMajor>
+  <cs:gridlineMinor>
+    <cs:lnRef idx="0"/>
+    <cs:fillRef idx="0"/>
+    <cs:effectRef idx="0"/>
+    <cs:fontRef idx="minor">
+      <a:schemeClr val="tx1"/>
+    </cs:fontRef>
+    <cs:spPr>
+      <a:ln w="9525" cap="flat" cmpd="sng" algn="ctr">
+        <a:solidFill>
+          <a:schemeClr val="tx1">
+            <a:lumMod val="5000"/>
+            <a:lumOff val="95000"/>
+          </a:schemeClr>
+        </a:solidFill>
+        <a:round/>
+      </a:ln>
+    </cs:spPr>
+  </cs:gridlineMinor>
+  <cs:hiLoLine>
+    <cs:lnRef idx="0"/>
+    <cs:fillRef idx="0"/>
+    <cs:effectRef idx="0"/>
+    <cs:fontRef idx="minor">
+      <a:schemeClr val="tx1"/>
+    </cs:fontRef>
+    <cs:spPr>
+      <a:ln w="9525" cap="flat" cmpd="sng" algn="ctr">
+        <a:solidFill>
+          <a:schemeClr val="tx1">
+            <a:lumMod val="75000"/>
+            <a:lumOff val="25000"/>
+          </a:schemeClr>
+        </a:solidFill>
+        <a:round/>
+      </a:ln>
+    </cs:spPr>
+  </cs:hiLoLine>
+  <cs:leaderLine>
+    <cs:lnRef idx="0"/>
+    <cs:fillRef idx="0"/>
+    <cs:effectRef idx="0"/>
+    <cs:fontRef idx="minor">
+      <a:schemeClr val="tx1"/>
+    </cs:fontRef>
+    <cs:spPr>
+      <a:ln w="9525" cap="flat" cmpd="sng" algn="ctr">
+        <a:solidFill>
+          <a:schemeClr val="tx1">
+            <a:lumMod val="35000"/>
+            <a:lumOff val="65000"/>
+          </a:schemeClr>
+        </a:solidFill>
+        <a:round/>
+      </a:ln>
+    </cs:spPr>
+  </cs:leaderLine>
+  <cs:legend>
+    <cs:lnRef idx="0"/>
+    <cs:fillRef idx="0"/>
+    <cs:effectRef idx="0"/>
+    <cs:fontRef idx="minor">
+      <a:schemeClr val="tx1">
+        <a:lumMod val="65000"/>
+        <a:lumOff val="35000"/>
+      </a:schemeClr>
+    </cs:fontRef>
+    <cs:defRPr sz="1197" kern="1200"/>
+  </cs:legend>
+  <cs:plotArea mods="allowNoFillOverride allowNoLineOverride">
+    <cs:lnRef idx="0"/>
+    <cs:fillRef idx="0"/>
+    <cs:effectRef idx="0"/>
+    <cs:fontRef idx="minor">
+      <a:schemeClr val="tx1"/>
+    </cs:fontRef>
+  </cs:plotArea>
+  <cs:plotArea3D mods="allowNoFillOverride allowNoLineOverride">
+    <cs:lnRef idx="0"/>
+    <cs:fillRef idx="0"/>
+    <cs:effectRef idx="0"/>
+    <cs:fontRef idx="minor">
+      <a:schemeClr val="tx1"/>
+    </cs:fontRef>
+  </cs:plotArea3D>
+  <cs:seriesAxis>
+    <cs:lnRef idx="0"/>
+    <cs:fillRef idx="0"/>
+    <cs:effectRef idx="0"/>
+    <cs:fontRef idx="minor">
+      <a:schemeClr val="tx1">
+        <a:lumMod val="65000"/>
+        <a:lumOff val="35000"/>
+      </a:schemeClr>
+    </cs:fontRef>
+    <cs:defRPr sz="1197" kern="1200"/>
+  </cs:seriesAxis>
+  <cs:seriesLine>
+    <cs:lnRef idx="0"/>
+    <cs:fillRef idx="0"/>
+    <cs:effectRef idx="0"/>
+    <cs:fontRef idx="minor">
+      <a:schemeClr val="tx1"/>
+    </cs:fontRef>
+    <cs:spPr>
+      <a:ln w="9525" cap="flat" cmpd="sng" algn="ctr">
+        <a:solidFill>
+          <a:schemeClr val="tx1">
+            <a:lumMod val="35000"/>
+            <a:lumOff val="65000"/>
+          </a:schemeClr>
+        </a:solidFill>
+        <a:round/>
+      </a:ln>
+    </cs:spPr>
+  </cs:seriesLine>
+  <cs:title>
+    <cs:lnRef idx="0"/>
+    <cs:fillRef idx="0"/>
+    <cs:effectRef idx="0"/>
+    <cs:fontRef idx="minor">
+      <a:schemeClr val="tx1">
+        <a:lumMod val="65000"/>
+        <a:lumOff val="35000"/>
+      </a:schemeClr>
+    </cs:fontRef>
+    <cs:defRPr sz="1862" b="0" kern="1200" spc="0" baseline="0"/>
+  </cs:title>
+  <cs:trendline>
+    <cs:lnRef idx="0">
+      <cs:styleClr val="auto"/>
+    </cs:lnRef>
+    <cs:fillRef idx="0"/>
+    <cs:effectRef idx="0"/>
+    <cs:fontRef idx="minor">
+      <a:schemeClr val="tx1"/>
+    </cs:fontRef>
+    <cs:spPr>
+      <a:ln w="19050" cap="rnd">
+        <a:solidFill>
+          <a:schemeClr val="phClr"/>
+        </a:solidFill>
+        <a:prstDash val="sysDot"/>
+      </a:ln>
+    </cs:spPr>
+  </cs:trendline>
+  <cs:trendlineLabel>
+    <cs:lnRef idx="0"/>
+    <cs:fillRef idx="0"/>
+    <cs:effectRef idx="0"/>
+    <cs:fontRef idx="minor">
+      <a:schemeClr val="tx1">
+        <a:lumMod val="65000"/>
+        <a:lumOff val="35000"/>
+      </a:schemeClr>
+    </cs:fontRef>
+    <cs:defRPr sz="1197" kern="1200"/>
+  </cs:trendlineLabel>
+  <cs:upBar>
+    <cs:lnRef idx="0"/>
+    <cs:fillRef idx="0"/>
+    <cs:effectRef idx="0"/>
+    <cs:fontRef idx="minor">
+      <a:schemeClr val="dk1"/>
+    </cs:fontRef>
+    <cs:spPr>
+      <a:solidFill>
+        <a:schemeClr val="lt1"/>
+      </a:solidFill>
+      <a:ln w="9525">
+        <a:solidFill>
+          <a:schemeClr val="tx1">
+            <a:lumMod val="15000"/>
+            <a:lumOff val="85000"/>
+          </a:schemeClr>
+        </a:solidFill>
+      </a:ln>
+    </cs:spPr>
+  </cs:upBar>
+  <cs:valueAxis>
+    <cs:lnRef idx="0"/>
+    <cs:fillRef idx="0"/>
+    <cs:effectRef idx="0"/>
+    <cs:fontRef idx="minor">
+      <a:schemeClr val="tx1">
+        <a:lumMod val="65000"/>
+        <a:lumOff val="35000"/>
+      </a:schemeClr>
+    </cs:fontRef>
+    <cs:defRPr sz="1197" kern="1200"/>
+  </cs:valueAxis>
+  <cs:wall>
+    <cs:lnRef idx="0"/>
+    <cs:fillRef idx="0"/>
+    <cs:effectRef idx="0"/>
+    <cs:fontRef idx="minor">
+      <a:schemeClr val="tx1"/>
+    </cs:fontRef>
+    <cs:spPr>
+      <a:noFill/>
+      <a:ln>
+        <a:noFill/>
+      </a:ln>
+    </cs:spPr>
+  </cs:wall>
+</cs:chartStyle>
+</file>
+
+<file path=ppt/charts/style2.xml><?xml version="1.0" encoding="utf-8"?>
+<cs:chartStyle xmlns:cs="http://schemas.microsoft.com/office/drawing/2012/chartStyle" xmlns:a="http://schemas.openxmlformats.org/drawingml/2006/main" id="201">
+  <cs:axisTitle>
+    <cs:lnRef idx="0"/>
+    <cs:fillRef idx="0"/>
+    <cs:effectRef idx="0"/>
+    <cs:fontRef idx="minor">
+      <a:schemeClr val="tx1">
+        <a:lumMod val="65000"/>
+        <a:lumOff val="35000"/>
+      </a:schemeClr>
+    </cs:fontRef>
+    <cs:defRPr sz="1330" kern="1200"/>
+  </cs:axisTitle>
+  <cs:categoryAxis>
+    <cs:lnRef idx="0"/>
+    <cs:fillRef idx="0"/>
+    <cs:effectRef idx="0"/>
+    <cs:fontRef idx="minor">
+      <a:schemeClr val="tx1">
+        <a:lumMod val="65000"/>
+        <a:lumOff val="35000"/>
+      </a:schemeClr>
+    </cs:fontRef>
+    <cs:spPr>
+      <a:ln w="9525" cap="flat" cmpd="sng" algn="ctr">
+        <a:solidFill>
+          <a:schemeClr val="tx1">
+            <a:lumMod val="15000"/>
+            <a:lumOff val="85000"/>
+          </a:schemeClr>
+        </a:solidFill>
+        <a:round/>
+      </a:ln>
+    </cs:spPr>
+    <cs:defRPr sz="1197" kern="1200"/>
+  </cs:categoryAxis>
+  <cs:chartArea mods="allowNoFillOverride allowNoLineOverride">
+    <cs:lnRef idx="0"/>
+    <cs:fillRef idx="0"/>
+    <cs:effectRef idx="0"/>
+    <cs:fontRef idx="minor">
+      <a:schemeClr val="tx1"/>
+    </cs:fontRef>
+    <cs:spPr>
+      <a:solidFill>
+        <a:schemeClr val="bg1"/>
+      </a:solidFill>
+      <a:ln w="9525" cap="flat" cmpd="sng" algn="ctr">
+        <a:solidFill>
+          <a:schemeClr val="tx1">
+            <a:lumMod val="15000"/>
+            <a:lumOff val="85000"/>
+          </a:schemeClr>
+        </a:solidFill>
+        <a:round/>
+      </a:ln>
+    </cs:spPr>
+    <cs:defRPr sz="1330" kern="1200"/>
+  </cs:chartArea>
+  <cs:dataLabel>
+    <cs:lnRef idx="0"/>
+    <cs:fillRef idx="0"/>
+    <cs:effectRef idx="0"/>
+    <cs:fontRef idx="minor">
+      <a:schemeClr val="tx1">
+        <a:lumMod val="75000"/>
+        <a:lumOff val="25000"/>
+      </a:schemeClr>
+    </cs:fontRef>
+    <cs:defRPr sz="1197" kern="1200"/>
+  </cs:dataLabel>
+  <cs:dataLabelCallout>
+    <cs:lnRef idx="0"/>
+    <cs:fillRef idx="0"/>
+    <cs:effectRef idx="0"/>
+    <cs:fontRef idx="minor">
+      <a:schemeClr val="dk1">
+        <a:lumMod val="65000"/>
+        <a:lumOff val="35000"/>
+      </a:schemeClr>
+    </cs:fontRef>
+    <cs:spPr>
+      <a:solidFill>
+        <a:schemeClr val="lt1"/>
+      </a:solidFill>
+      <a:ln>
+        <a:solidFill>
+          <a:schemeClr val="dk1">
+            <a:lumMod val="25000"/>
+            <a:lumOff val="75000"/>
+          </a:schemeClr>
+        </a:solidFill>
+      </a:ln>
+    </cs:spPr>
+    <cs:defRPr sz="1197" kern="1200"/>
+    <cs:bodyPr rot="0" spcFirstLastPara="1" vertOverflow="clip" horzOverflow="clip" vert="horz" wrap="square" lIns="36576" tIns="18288" rIns="36576" bIns="18288" anchor="ctr" anchorCtr="1">
+      <a:spAutoFit/>
+    </cs:bodyPr>
+  </cs:dataLabelCallout>
+  <cs:dataPoint>
+    <cs:lnRef idx="0"/>
+    <cs:fillRef idx="1">
+      <cs:styleClr val="auto"/>
+    </cs:fillRef>
+    <cs:effectRef idx="0"/>
+    <cs:fontRef idx="minor">
+      <a:schemeClr val="tx1"/>
+    </cs:fontRef>
+  </cs:dataPoint>
+  <cs:dataPoint3D>
+    <cs:lnRef idx="0"/>
+    <cs:fillRef idx="1">
+      <cs:styleClr val="auto"/>
+    </cs:fillRef>
+    <cs:effectRef idx="0"/>
+    <cs:fontRef idx="minor">
+      <a:schemeClr val="tx1"/>
+    </cs:fontRef>
+  </cs:dataPoint3D>
+  <cs:dataPointLine>
+    <cs:lnRef idx="0">
+      <cs:styleClr val="auto"/>
+    </cs:lnRef>
+    <cs:fillRef idx="1"/>
+    <cs:effectRef idx="0"/>
+    <cs:fontRef idx="minor">
+      <a:schemeClr val="tx1"/>
+    </cs:fontRef>
+    <cs:spPr>
+      <a:ln w="28575" cap="rnd">
+        <a:solidFill>
+          <a:schemeClr val="phClr"/>
+        </a:solidFill>
+        <a:round/>
+      </a:ln>
+    </cs:spPr>
+  </cs:dataPointLine>
+  <cs:dataPointMarker>
+    <cs:lnRef idx="0">
+      <cs:styleClr val="auto"/>
+    </cs:lnRef>
+    <cs:fillRef idx="1">
+      <cs:styleClr val="auto"/>
+    </cs:fillRef>
+    <cs:effectRef idx="0"/>
+    <cs:fontRef idx="minor">
+      <a:schemeClr val="tx1"/>
+    </cs:fontRef>
+    <cs:spPr>
+      <a:ln w="9525">
+        <a:solidFill>
+          <a:schemeClr val="phClr"/>
+        </a:solidFill>
+      </a:ln>
+    </cs:spPr>
+  </cs:dataPointMarker>
+  <cs:dataPointMarkerLayout symbol="circle" size="5"/>
+  <cs:dataPointWireframe>
+    <cs:lnRef idx="0">
+      <cs:styleClr val="auto"/>
+    </cs:lnRef>
+    <cs:fillRef idx="1"/>
+    <cs:effectRef idx="0"/>
+    <cs:fontRef idx="minor">
+      <a:schemeClr val="tx1"/>
+    </cs:fontRef>
+    <cs:spPr>
+      <a:ln w="9525" cap="rnd">
+        <a:solidFill>
+          <a:schemeClr val="phClr"/>
+        </a:solidFill>
+        <a:round/>
+      </a:ln>
+    </cs:spPr>
+  </cs:dataPointWireframe>
+  <cs:dataTable>
+    <cs:lnRef idx="0"/>
+    <cs:fillRef idx="0"/>
+    <cs:effectRef idx="0"/>
+    <cs:fontRef idx="minor">
+      <a:schemeClr val="tx1">
+        <a:lumMod val="65000"/>
+        <a:lumOff val="35000"/>
+      </a:schemeClr>
+    </cs:fontRef>
+    <cs:spPr>
+      <a:noFill/>
+      <a:ln w="9525" cap="flat" cmpd="sng" algn="ctr">
+        <a:solidFill>
+          <a:schemeClr val="tx1">
+            <a:lumMod val="15000"/>
+            <a:lumOff val="85000"/>
+          </a:schemeClr>
+        </a:solidFill>
+        <a:round/>
+      </a:ln>
+    </cs:spPr>
+    <cs:defRPr sz="1197" kern="1200"/>
+  </cs:dataTable>
+  <cs:downBar>
+    <cs:lnRef idx="0"/>
+    <cs:fillRef idx="0"/>
+    <cs:effectRef idx="0"/>
+    <cs:fontRef idx="minor">
+      <a:schemeClr val="dk1"/>
+    </cs:fontRef>
+    <cs:spPr>
+      <a:solidFill>
+        <a:schemeClr val="dk1">
+          <a:lumMod val="65000"/>
+          <a:lumOff val="35000"/>
+        </a:schemeClr>
+      </a:solidFill>
+      <a:ln w="9525">
+        <a:solidFill>
+          <a:schemeClr val="tx1">
+            <a:lumMod val="65000"/>
+            <a:lumOff val="35000"/>
+          </a:schemeClr>
+        </a:solidFill>
+      </a:ln>
+    </cs:spPr>
+  </cs:downBar>
+  <cs:dropLine>
+    <cs:lnRef idx="0"/>
+    <cs:fillRef idx="0"/>
+    <cs:effectRef idx="0"/>
+    <cs:fontRef idx="minor">
+      <a:schemeClr val="tx1"/>
+    </cs:fontRef>
+    <cs:spPr>
+      <a:ln w="9525" cap="flat" cmpd="sng" algn="ctr">
+        <a:solidFill>
+          <a:schemeClr val="tx1">
+            <a:lumMod val="35000"/>
+            <a:lumOff val="65000"/>
+          </a:schemeClr>
+        </a:solidFill>
+        <a:round/>
+      </a:ln>
+    </cs:spPr>
+  </cs:dropLine>
+  <cs:errorBar>
+    <cs:lnRef idx="0"/>
+    <cs:fillRef idx="0"/>
+    <cs:effectRef idx="0"/>
+    <cs:fontRef idx="minor">
+      <a:schemeClr val="tx1"/>
+    </cs:fontRef>
+    <cs:spPr>
+      <a:ln w="9525" cap="flat" cmpd="sng" algn="ctr">
+        <a:solidFill>
+          <a:schemeClr val="tx1">
+            <a:lumMod val="65000"/>
+            <a:lumOff val="35000"/>
+          </a:schemeClr>
+        </a:solidFill>
+        <a:round/>
+      </a:ln>
+    </cs:spPr>
+  </cs:errorBar>
+  <cs:floor>
+    <cs:lnRef idx="0"/>
+    <cs:fillRef idx="0"/>
+    <cs:effectRef idx="0"/>
+    <cs:fontRef idx="minor">
+      <a:schemeClr val="tx1"/>
+    </cs:fontRef>
+    <cs:spPr>
+      <a:noFill/>
+      <a:ln>
+        <a:noFill/>
+      </a:ln>
+    </cs:spPr>
+  </cs:floor>
+  <cs:gridlineMajor>
+    <cs:lnRef idx="0"/>
+    <cs:fillRef idx="0"/>
+    <cs:effectRef idx="0"/>
+    <cs:fontRef idx="minor">
+      <a:schemeClr val="tx1"/>
+    </cs:fontRef>
+    <cs:spPr>
+      <a:ln w="9525" cap="flat" cmpd="sng" algn="ctr">
+        <a:solidFill>
+          <a:schemeClr val="tx1">
+            <a:lumMod val="15000"/>
+            <a:lumOff val="85000"/>
+          </a:schemeClr>
+        </a:solidFill>
+        <a:round/>
+      </a:ln>
+    </cs:spPr>
+  </cs:gridlineMajor>
+  <cs:gridlineMinor>
+    <cs:lnRef idx="0"/>
+    <cs:fillRef idx="0"/>
+    <cs:effectRef idx="0"/>
+    <cs:fontRef idx="minor">
+      <a:schemeClr val="tx1"/>
+    </cs:fontRef>
+    <cs:spPr>
+      <a:ln w="9525" cap="flat" cmpd="sng" algn="ctr">
+        <a:solidFill>
+          <a:schemeClr val="tx1">
+            <a:lumMod val="5000"/>
+            <a:lumOff val="95000"/>
+          </a:schemeClr>
+        </a:solidFill>
+        <a:round/>
+      </a:ln>
+    </cs:spPr>
+  </cs:gridlineMinor>
+  <cs:hiLoLine>
+    <cs:lnRef idx="0"/>
+    <cs:fillRef idx="0"/>
+    <cs:effectRef idx="0"/>
+    <cs:fontRef idx="minor">
+      <a:schemeClr val="tx1"/>
+    </cs:fontRef>
+    <cs:spPr>
+      <a:ln w="9525" cap="flat" cmpd="sng" algn="ctr">
+        <a:solidFill>
+          <a:schemeClr val="tx1">
+            <a:lumMod val="75000"/>
+            <a:lumOff val="25000"/>
+          </a:schemeClr>
+        </a:solidFill>
+        <a:round/>
+      </a:ln>
+    </cs:spPr>
+  </cs:hiLoLine>
+  <cs:leaderLine>
+    <cs:lnRef idx="0"/>
+    <cs:fillRef idx="0"/>
+    <cs:effectRef idx="0"/>
+    <cs:fontRef idx="minor">
+      <a:schemeClr val="tx1"/>
+    </cs:fontRef>
+    <cs:spPr>
+      <a:ln w="9525" cap="flat" cmpd="sng" algn="ctr">
+        <a:solidFill>
+          <a:schemeClr val="tx1">
+            <a:lumMod val="35000"/>
+            <a:lumOff val="65000"/>
+          </a:schemeClr>
+        </a:solidFill>
+        <a:round/>
+      </a:ln>
+    </cs:spPr>
+  </cs:leaderLine>
+  <cs:legend>
+    <cs:lnRef idx="0"/>
+    <cs:fillRef idx="0"/>
+    <cs:effectRef idx="0"/>
+    <cs:fontRef idx="minor">
+      <a:schemeClr val="tx1">
+        <a:lumMod val="65000"/>
+        <a:lumOff val="35000"/>
+      </a:schemeClr>
+    </cs:fontRef>
+    <cs:defRPr sz="1197" kern="1200"/>
+  </cs:legend>
+  <cs:plotArea mods="allowNoFillOverride allowNoLineOverride">
+    <cs:lnRef idx="0"/>
+    <cs:fillRef idx="0"/>
+    <cs:effectRef idx="0"/>
+    <cs:fontRef idx="minor">
+      <a:schemeClr val="tx1"/>
+    </cs:fontRef>
+  </cs:plotArea>
+  <cs:plotArea3D mods="allowNoFillOverride allowNoLineOverride">
+    <cs:lnRef idx="0"/>
+    <cs:fillRef idx="0"/>
+    <cs:effectRef idx="0"/>
+    <cs:fontRef idx="minor">
+      <a:schemeClr val="tx1"/>
+    </cs:fontRef>
+  </cs:plotArea3D>
+  <cs:seriesAxis>
+    <cs:lnRef idx="0"/>
+    <cs:fillRef idx="0"/>
+    <cs:effectRef idx="0"/>
+    <cs:fontRef idx="minor">
+      <a:schemeClr val="tx1">
+        <a:lumMod val="65000"/>
+        <a:lumOff val="35000"/>
+      </a:schemeClr>
+    </cs:fontRef>
+    <cs:defRPr sz="1197" kern="1200"/>
+  </cs:seriesAxis>
+  <cs:seriesLine>
+    <cs:lnRef idx="0"/>
+    <cs:fillRef idx="0"/>
+    <cs:effectRef idx="0"/>
+    <cs:fontRef idx="minor">
+      <a:schemeClr val="tx1"/>
+    </cs:fontRef>
+    <cs:spPr>
+      <a:ln w="9525" cap="flat" cmpd="sng" algn="ctr">
+        <a:solidFill>
+          <a:schemeClr val="tx1">
+            <a:lumMod val="35000"/>
+            <a:lumOff val="65000"/>
+          </a:schemeClr>
+        </a:solidFill>
+        <a:round/>
+      </a:ln>
+    </cs:spPr>
+  </cs:seriesLine>
+  <cs:title>
+    <cs:lnRef idx="0"/>
+    <cs:fillRef idx="0"/>
+    <cs:effectRef idx="0"/>
+    <cs:fontRef idx="minor">
+      <a:schemeClr val="tx1">
+        <a:lumMod val="65000"/>
+        <a:lumOff val="35000"/>
+      </a:schemeClr>
+    </cs:fontRef>
+    <cs:defRPr sz="1862" b="0" kern="1200" spc="0" baseline="0"/>
+  </cs:title>
+  <cs:trendline>
+    <cs:lnRef idx="0">
+      <cs:styleClr val="auto"/>
+    </cs:lnRef>
+    <cs:fillRef idx="0"/>
+    <cs:effectRef idx="0"/>
+    <cs:fontRef idx="minor">
+      <a:schemeClr val="tx1"/>
+    </cs:fontRef>
+    <cs:spPr>
+      <a:ln w="19050" cap="rnd">
+        <a:solidFill>
+          <a:schemeClr val="phClr"/>
+        </a:solidFill>
+        <a:prstDash val="sysDot"/>
+      </a:ln>
+    </cs:spPr>
+  </cs:trendline>
+  <cs:trendlineLabel>
+    <cs:lnRef idx="0"/>
+    <cs:fillRef idx="0"/>
+    <cs:effectRef idx="0"/>
+    <cs:fontRef idx="minor">
+      <a:schemeClr val="tx1">
+        <a:lumMod val="65000"/>
+        <a:lumOff val="35000"/>
+      </a:schemeClr>
+    </cs:fontRef>
+    <cs:defRPr sz="1197" kern="1200"/>
+  </cs:trendlineLabel>
+  <cs:upBar>
+    <cs:lnRef idx="0"/>
+    <cs:fillRef idx="0"/>
+    <cs:effectRef idx="0"/>
+    <cs:fontRef idx="minor">
+      <a:schemeClr val="dk1"/>
+    </cs:fontRef>
+    <cs:spPr>
+      <a:solidFill>
+        <a:schemeClr val="lt1"/>
+      </a:solidFill>
+      <a:ln w="9525">
+        <a:solidFill>
+          <a:schemeClr val="tx1">
+            <a:lumMod val="15000"/>
+            <a:lumOff val="85000"/>
+          </a:schemeClr>
+        </a:solidFill>
+      </a:ln>
+    </cs:spPr>
+  </cs:upBar>
+  <cs:valueAxis>
+    <cs:lnRef idx="0"/>
+    <cs:fillRef idx="0"/>
+    <cs:effectRef idx="0"/>
+    <cs:fontRef idx="minor">
+      <a:schemeClr val="tx1">
+        <a:lumMod val="65000"/>
+        <a:lumOff val="35000"/>
+      </a:schemeClr>
+    </cs:fontRef>
+    <cs:defRPr sz="1197" kern="1200"/>
+  </cs:valueAxis>
+  <cs:wall>
+    <cs:lnRef idx="0"/>
+    <cs:fillRef idx="0"/>
+    <cs:effectRef idx="0"/>
+    <cs:fontRef idx="minor">
+      <a:schemeClr val="tx1"/>
+    </cs:fontRef>
+    <cs:spPr>
+      <a:noFill/>
+      <a:ln>
+        <a:noFill/>
+      </a:ln>
+    </cs:spPr>
+  </cs:wall>
+</cs:chartStyle>
 </file>
 
 <file path=ppt/handoutMasters/handoutMaster1.xml><?xml version="1.0" encoding="utf-8"?>
@@ -3962,22 +5880,107 @@
           <a:p>
             <a:r>
               <a:rPr lang="en-US" altLang="zh-CN" dirty="0" smtClean="0"/>
-              <a:t>Version Log</a:t>
+              <a:t>RUN TIME</a:t>
             </a:r>
             <a:endParaRPr lang="zh-CN" altLang="en-US" dirty="0"/>
           </a:p>
         </p:txBody>
       </p:sp>
-      <p:sp>
-        <p:nvSpPr>
-          <p:cNvPr id="6" name="TextBox 5"/>
+      <p:graphicFrame>
+        <p:nvGraphicFramePr>
+          <p:cNvPr id="10" name="Chart 9"/>
+          <p:cNvGraphicFramePr/>
+          <p:nvPr>
+            <p:extLst>
+              <p:ext uri="{D42A27DB-BD31-4B8C-83A1-F6EECF244321}">
+                <p14:modId xmlns:p14="http://schemas.microsoft.com/office/powerpoint/2010/main" val="618729788"/>
+              </p:ext>
+            </p:extLst>
+          </p:nvPr>
+        </p:nvGraphicFramePr>
+        <p:xfrm>
+          <a:off x="1221793" y="2504069"/>
+          <a:ext cx="4606488" cy="3319632"/>
+        </p:xfrm>
+        <a:graphic>
+          <a:graphicData uri="http://schemas.openxmlformats.org/drawingml/2006/chart">
+            <c:chart xmlns:c="http://schemas.openxmlformats.org/drawingml/2006/chart" xmlns:r="http://schemas.openxmlformats.org/officeDocument/2006/relationships" r:id="rId2"/>
+          </a:graphicData>
+        </a:graphic>
+      </p:graphicFrame>
+      <p:sp>
+        <p:nvSpPr>
+          <p:cNvPr id="11" name="Rectangle 10"/>
+          <p:cNvSpPr/>
+          <p:nvPr/>
+        </p:nvSpPr>
+        <p:spPr>
+          <a:xfrm>
+            <a:off x="6617282" y="1464695"/>
+            <a:ext cx="1565365" cy="369332"/>
+          </a:xfrm>
+          <a:prstGeom prst="rect">
+            <a:avLst/>
+          </a:prstGeom>
+        </p:spPr>
+        <p:txBody>
+          <a:bodyPr wrap="none">
+            <a:spAutoFit/>
+          </a:bodyPr>
+          <a:lstStyle/>
+          <a:p>
+            <a:r>
+              <a:rPr lang="en-US" altLang="zh-CN" dirty="0" smtClean="0"/>
+              <a:t>PAB</a:t>
+            </a:r>
+            <a:r>
+              <a:rPr lang="zh-CN" altLang="en-US" dirty="0" smtClean="0"/>
+              <a:t>（</a:t>
+            </a:r>
+            <a:r>
+              <a:rPr lang="en-US" altLang="zh-CN" dirty="0" smtClean="0"/>
+              <a:t>PSD</a:t>
+            </a:r>
+            <a:r>
+              <a:rPr lang="zh-CN" altLang="en-US" dirty="0" smtClean="0"/>
+              <a:t>）</a:t>
+            </a:r>
+            <a:endParaRPr lang="zh-CN" altLang="en-US" dirty="0"/>
+          </a:p>
+        </p:txBody>
+      </p:sp>
+      <p:graphicFrame>
+        <p:nvGraphicFramePr>
+          <p:cNvPr id="12" name="Chart 11"/>
+          <p:cNvGraphicFramePr/>
+          <p:nvPr>
+            <p:extLst>
+              <p:ext uri="{D42A27DB-BD31-4B8C-83A1-F6EECF244321}">
+                <p14:modId xmlns:p14="http://schemas.microsoft.com/office/powerpoint/2010/main" val="2675945974"/>
+              </p:ext>
+            </p:extLst>
+          </p:nvPr>
+        </p:nvGraphicFramePr>
+        <p:xfrm>
+          <a:off x="6978580" y="2504069"/>
+          <a:ext cx="4606488" cy="3319632"/>
+        </p:xfrm>
+        <a:graphic>
+          <a:graphicData uri="http://schemas.openxmlformats.org/drawingml/2006/chart">
+            <c:chart xmlns:c="http://schemas.openxmlformats.org/drawingml/2006/chart" xmlns:r="http://schemas.openxmlformats.org/officeDocument/2006/relationships" r:id="rId3"/>
+          </a:graphicData>
+        </a:graphic>
+      </p:graphicFrame>
+      <p:sp>
+        <p:nvSpPr>
+          <p:cNvPr id="13" name="TextBox 12"/>
           <p:cNvSpPr txBox="1"/>
           <p:nvPr/>
         </p:nvSpPr>
         <p:spPr>
           <a:xfrm>
-            <a:off x="753626" y="1423713"/>
-            <a:ext cx="4059372" cy="1242254"/>
+            <a:off x="924232" y="1924015"/>
+            <a:ext cx="648502" cy="365091"/>
           </a:xfrm>
           <a:prstGeom prst="rect">
             <a:avLst/>
@@ -4008,6 +6011,180 @@
                   </a:schemeClr>
                 </a:solidFill>
               </a:rPr>
+              <a:t>SB</a:t>
+            </a:r>
+            <a:endParaRPr lang="zh-CN" altLang="en-US" sz="2000" dirty="0" err="1" smtClean="0">
+              <a:solidFill>
+                <a:schemeClr val="tx1">
+                  <a:lumMod val="50000"/>
+                </a:schemeClr>
+              </a:solidFill>
+            </a:endParaRPr>
+          </a:p>
+        </p:txBody>
+      </p:sp>
+    </p:spTree>
+    <p:extLst>
+      <p:ext uri="{BB962C8B-B14F-4D97-AF65-F5344CB8AC3E}">
+        <p14:creationId xmlns:p14="http://schemas.microsoft.com/office/powerpoint/2010/main" val="1564830514"/>
+      </p:ext>
+    </p:extLst>
+  </p:cSld>
+  <p:clrMapOvr>
+    <a:masterClrMapping/>
+  </p:clrMapOvr>
+</p:sld>
+</file>
+
+<file path=ppt/slides/slide12.xml><?xml version="1.0" encoding="utf-8"?>
+<p:sld xmlns:a="http://schemas.openxmlformats.org/drawingml/2006/main" xmlns:r="http://schemas.openxmlformats.org/officeDocument/2006/relationships" xmlns:p="http://schemas.openxmlformats.org/presentationml/2006/main">
+  <p:cSld>
+    <p:spTree>
+      <p:nvGrpSpPr>
+        <p:cNvPr id="1" name=""/>
+        <p:cNvGrpSpPr/>
+        <p:nvPr/>
+      </p:nvGrpSpPr>
+      <p:grpSpPr>
+        <a:xfrm>
+          <a:off x="0" y="0"/>
+          <a:ext cx="0" cy="0"/>
+          <a:chOff x="0" y="0"/>
+          <a:chExt cx="0" cy="0"/>
+        </a:xfrm>
+      </p:grpSpPr>
+      <p:sp>
+        <p:nvSpPr>
+          <p:cNvPr id="2" name="Date Placeholder 1"/>
+          <p:cNvSpPr>
+            <a:spLocks noGrp="1"/>
+          </p:cNvSpPr>
+          <p:nvPr>
+            <p:ph type="dt" sz="half" idx="10"/>
+          </p:nvPr>
+        </p:nvSpPr>
+        <p:spPr/>
+        <p:txBody>
+          <a:bodyPr/>
+          <a:lstStyle/>
+          <a:p>
+            <a:r>
+              <a:rPr lang="en-US" noProof="0" smtClean="0"/>
+              <a:t>March 24, 2017</a:t>
+            </a:r>
+            <a:endParaRPr lang="en-US" noProof="0" dirty="0"/>
+          </a:p>
+        </p:txBody>
+      </p:sp>
+      <p:sp>
+        <p:nvSpPr>
+          <p:cNvPr id="3" name="Footer Placeholder 2"/>
+          <p:cNvSpPr>
+            <a:spLocks noGrp="1"/>
+          </p:cNvSpPr>
+          <p:nvPr>
+            <p:ph type="ftr" sz="quarter" idx="11"/>
+          </p:nvPr>
+        </p:nvSpPr>
+        <p:spPr/>
+        <p:txBody>
+          <a:bodyPr/>
+          <a:lstStyle/>
+          <a:p>
+            <a:r>
+              <a:rPr lang="en-US" noProof="0" smtClean="0"/>
+              <a:t>Autoliv General Presentation 2017</a:t>
+            </a:r>
+            <a:endParaRPr lang="en-US" noProof="0" dirty="0"/>
+          </a:p>
+        </p:txBody>
+      </p:sp>
+      <p:sp>
+        <p:nvSpPr>
+          <p:cNvPr id="4" name="Slide Number Placeholder 3"/>
+          <p:cNvSpPr>
+            <a:spLocks noGrp="1"/>
+          </p:cNvSpPr>
+          <p:nvPr>
+            <p:ph type="sldNum" sz="quarter" idx="12"/>
+          </p:nvPr>
+        </p:nvSpPr>
+        <p:spPr/>
+        <p:txBody>
+          <a:bodyPr/>
+          <a:lstStyle/>
+          <a:p>
+            <a:fld id="{7E74F4B1-9ADB-4B50-83D6-797B7B30BEA4}" type="slidenum">
+              <a:rPr lang="en-US" noProof="0" smtClean="0"/>
+              <a:t>12</a:t>
+            </a:fld>
+            <a:endParaRPr lang="en-US" noProof="0" dirty="0"/>
+          </a:p>
+        </p:txBody>
+      </p:sp>
+      <p:sp>
+        <p:nvSpPr>
+          <p:cNvPr id="5" name="Text Placeholder 4"/>
+          <p:cNvSpPr>
+            <a:spLocks noGrp="1"/>
+          </p:cNvSpPr>
+          <p:nvPr>
+            <p:ph type="body" sz="quarter" idx="17"/>
+          </p:nvPr>
+        </p:nvSpPr>
+        <p:spPr/>
+        <p:txBody>
+          <a:bodyPr/>
+          <a:lstStyle/>
+          <a:p>
+            <a:r>
+              <a:rPr lang="en-US" altLang="zh-CN" dirty="0" smtClean="0"/>
+              <a:t>Version Log</a:t>
+            </a:r>
+            <a:endParaRPr lang="zh-CN" altLang="en-US" dirty="0"/>
+          </a:p>
+        </p:txBody>
+      </p:sp>
+      <p:sp>
+        <p:nvSpPr>
+          <p:cNvPr id="6" name="TextBox 5"/>
+          <p:cNvSpPr txBox="1"/>
+          <p:nvPr/>
+        </p:nvSpPr>
+        <p:spPr>
+          <a:xfrm>
+            <a:off x="662132" y="1323178"/>
+            <a:ext cx="9458218" cy="3873744"/>
+          </a:xfrm>
+          <a:prstGeom prst="rect">
+            <a:avLst/>
+          </a:prstGeom>
+          <a:noFill/>
+        </p:spPr>
+        <p:txBody>
+          <a:bodyPr wrap="square" lIns="36000" tIns="36000" rIns="36000" bIns="36000" rtlCol="0" anchor="ctr" anchorCtr="0">
+            <a:spAutoFit/>
+          </a:bodyPr>
+          <a:lstStyle/>
+          <a:p>
+            <a:pPr marL="230400" indent="-230400">
+              <a:lnSpc>
+                <a:spcPct val="95000"/>
+              </a:lnSpc>
+              <a:buClr>
+                <a:schemeClr val="accent1"/>
+              </a:buClr>
+              <a:buFont typeface="Wingdings" panose="05000000000000000000" pitchFamily="2" charset="2"/>
+              <a:buChar char="§"/>
+            </a:pPr>
+            <a:r>
+              <a:rPr lang="en-US" altLang="zh-CN" sz="2000" dirty="0">
+                <a:solidFill>
+                  <a:schemeClr val="tx1">
+                    <a:lumMod val="50000"/>
+                  </a:schemeClr>
+                </a:solidFill>
+              </a:rPr>
               <a:t>20180518</a:t>
             </a:r>
           </a:p>
@@ -4090,7 +6267,396 @@
               </a:rPr>
               <a:t>Automatic achieve title for directory</a:t>
             </a:r>
-            <a:endParaRPr lang="zh-CN" altLang="en-US" sz="2000" dirty="0" err="1" smtClean="0">
+          </a:p>
+          <a:p>
+            <a:pPr>
+              <a:lnSpc>
+                <a:spcPct val="95000"/>
+              </a:lnSpc>
+              <a:buClr>
+                <a:schemeClr val="accent1"/>
+              </a:buClr>
+            </a:pPr>
+            <a:endParaRPr lang="en-US" altLang="zh-CN" sz="2000" dirty="0">
+              <a:solidFill>
+                <a:schemeClr val="tx1">
+                  <a:lumMod val="50000"/>
+                </a:schemeClr>
+              </a:solidFill>
+            </a:endParaRPr>
+          </a:p>
+          <a:p>
+            <a:pPr marL="342900" indent="-342900">
+              <a:lnSpc>
+                <a:spcPct val="95000"/>
+              </a:lnSpc>
+              <a:buClr>
+                <a:schemeClr val="accent1"/>
+              </a:buClr>
+              <a:buFont typeface="Wingdings" panose="05000000000000000000" pitchFamily="2" charset="2"/>
+              <a:buChar char="n"/>
+            </a:pPr>
+            <a:r>
+              <a:rPr lang="en-US" altLang="zh-CN" sz="2000" dirty="0" smtClean="0">
+                <a:solidFill>
+                  <a:schemeClr val="tx1">
+                    <a:lumMod val="50000"/>
+                  </a:schemeClr>
+                </a:solidFill>
+              </a:rPr>
+              <a:t>20180606</a:t>
+            </a:r>
+          </a:p>
+          <a:p>
+            <a:pPr>
+              <a:lnSpc>
+                <a:spcPct val="95000"/>
+              </a:lnSpc>
+              <a:buClr>
+                <a:schemeClr val="accent1"/>
+              </a:buClr>
+            </a:pPr>
+            <a:r>
+              <a:rPr lang="en-US" altLang="zh-CN" sz="2000" dirty="0" err="1" smtClean="0">
+                <a:solidFill>
+                  <a:schemeClr val="tx1">
+                    <a:lumMod val="50000"/>
+                  </a:schemeClr>
+                </a:solidFill>
+              </a:rPr>
+              <a:t>SBSession</a:t>
+            </a:r>
+            <a:r>
+              <a:rPr lang="en-US" altLang="zh-CN" sz="2000" dirty="0" smtClean="0">
+                <a:solidFill>
+                  <a:schemeClr val="tx1">
+                    <a:lumMod val="50000"/>
+                  </a:schemeClr>
+                </a:solidFill>
+              </a:rPr>
+              <a:t> check </a:t>
+            </a:r>
+            <a:r>
+              <a:rPr lang="en-US" altLang="zh-CN" sz="2000" dirty="0" err="1" smtClean="0">
+                <a:solidFill>
+                  <a:schemeClr val="tx1">
+                    <a:lumMod val="50000"/>
+                  </a:schemeClr>
+                </a:solidFill>
+              </a:rPr>
+              <a:t>coord</a:t>
+            </a:r>
+            <a:r>
+              <a:rPr lang="en-US" altLang="zh-CN" sz="2000" dirty="0" smtClean="0">
+                <a:solidFill>
+                  <a:schemeClr val="tx1">
+                    <a:lumMod val="50000"/>
+                  </a:schemeClr>
+                </a:solidFill>
+              </a:rPr>
+              <a:t> -&gt; spring</a:t>
+            </a:r>
+            <a:r>
+              <a:rPr lang="zh-CN" altLang="en-US" sz="2000" dirty="0" smtClean="0">
+                <a:solidFill>
+                  <a:schemeClr val="tx1">
+                    <a:lumMod val="50000"/>
+                  </a:schemeClr>
+                </a:solidFill>
+              </a:rPr>
+              <a:t>（</a:t>
+            </a:r>
+            <a:r>
+              <a:rPr lang="en-US" altLang="zh-CN" sz="2000" dirty="0" smtClean="0">
+                <a:solidFill>
+                  <a:schemeClr val="tx1">
+                    <a:lumMod val="50000"/>
+                  </a:schemeClr>
+                </a:solidFill>
+              </a:rPr>
+              <a:t>discrete element</a:t>
+            </a:r>
+            <a:r>
+              <a:rPr lang="zh-CN" altLang="en-US" sz="2000" dirty="0" smtClean="0">
+                <a:solidFill>
+                  <a:schemeClr val="tx1">
+                    <a:lumMod val="50000"/>
+                  </a:schemeClr>
+                </a:solidFill>
+              </a:rPr>
+              <a:t>）</a:t>
+            </a:r>
+            <a:endParaRPr lang="en-US" altLang="zh-CN" sz="2000" dirty="0" smtClean="0">
+              <a:solidFill>
+                <a:schemeClr val="tx1">
+                  <a:lumMod val="50000"/>
+                </a:schemeClr>
+              </a:solidFill>
+            </a:endParaRPr>
+          </a:p>
+          <a:p>
+            <a:pPr>
+              <a:lnSpc>
+                <a:spcPct val="95000"/>
+              </a:lnSpc>
+              <a:buClr>
+                <a:schemeClr val="accent1"/>
+              </a:buClr>
+            </a:pPr>
+            <a:r>
+              <a:rPr lang="en-US" altLang="zh-CN" sz="2000" dirty="0" err="1" smtClean="0">
+                <a:solidFill>
+                  <a:schemeClr val="tx1">
+                    <a:lumMod val="50000"/>
+                  </a:schemeClr>
+                </a:solidFill>
+              </a:rPr>
+              <a:t>Seession</a:t>
+            </a:r>
+            <a:r>
+              <a:rPr lang="zh-CN" altLang="en-US" sz="2000" dirty="0" smtClean="0">
+                <a:solidFill>
+                  <a:schemeClr val="tx1">
+                    <a:lumMod val="50000"/>
+                  </a:schemeClr>
+                </a:solidFill>
+              </a:rPr>
+              <a:t>（</a:t>
+            </a:r>
+            <a:r>
+              <a:rPr lang="en-US" altLang="zh-CN" sz="2000" dirty="0" smtClean="0">
+                <a:solidFill>
+                  <a:schemeClr val="tx1">
+                    <a:lumMod val="50000"/>
+                  </a:schemeClr>
+                </a:solidFill>
+              </a:rPr>
+              <a:t>Animator</a:t>
+            </a:r>
+            <a:r>
+              <a:rPr lang="zh-CN" altLang="en-US" sz="2000" dirty="0" smtClean="0">
+                <a:solidFill>
+                  <a:schemeClr val="tx1">
+                    <a:lumMod val="50000"/>
+                  </a:schemeClr>
+                </a:solidFill>
+              </a:rPr>
+              <a:t>）</a:t>
+            </a:r>
+            <a:r>
+              <a:rPr lang="en-US" altLang="zh-CN" sz="2000" dirty="0" err="1" smtClean="0">
+                <a:solidFill>
+                  <a:schemeClr val="tx1">
+                    <a:lumMod val="50000"/>
+                  </a:schemeClr>
+                </a:solidFill>
+              </a:rPr>
+              <a:t>sta</a:t>
+            </a:r>
+            <a:r>
+              <a:rPr lang="en-US" altLang="zh-CN" sz="2000" dirty="0" smtClean="0">
+                <a:solidFill>
+                  <a:schemeClr val="tx1">
+                    <a:lumMod val="50000"/>
+                  </a:schemeClr>
+                </a:solidFill>
+              </a:rPr>
+              <a:t> set </a:t>
+            </a:r>
+            <a:r>
+              <a:rPr lang="en-US" altLang="zh-CN" sz="2000" dirty="0" err="1" smtClean="0">
+                <a:solidFill>
+                  <a:schemeClr val="tx1">
+                    <a:lumMod val="50000"/>
+                  </a:schemeClr>
+                </a:solidFill>
+              </a:rPr>
+              <a:t>fma</a:t>
+            </a:r>
+            <a:r>
+              <a:rPr lang="en-US" altLang="zh-CN" sz="2000" dirty="0" smtClean="0">
+                <a:solidFill>
+                  <a:schemeClr val="tx1">
+                    <a:lumMod val="50000"/>
+                  </a:schemeClr>
+                </a:solidFill>
+              </a:rPr>
+              <a:t> -&gt;  </a:t>
+            </a:r>
+            <a:r>
+              <a:rPr lang="en-US" altLang="zh-CN" sz="2000" dirty="0" err="1" smtClean="0">
+                <a:solidFill>
+                  <a:schemeClr val="tx1">
+                    <a:lumMod val="50000"/>
+                  </a:schemeClr>
+                </a:solidFill>
+              </a:rPr>
+              <a:t>sta</a:t>
+            </a:r>
+            <a:r>
+              <a:rPr lang="en-US" altLang="zh-CN" sz="2000" dirty="0" smtClean="0">
+                <a:solidFill>
+                  <a:schemeClr val="tx1">
+                    <a:lumMod val="50000"/>
+                  </a:schemeClr>
+                </a:solidFill>
+              </a:rPr>
+              <a:t> set </a:t>
+            </a:r>
+            <a:r>
+              <a:rPr lang="en-US" altLang="zh-CN" sz="2000" dirty="0" err="1" smtClean="0">
+                <a:solidFill>
+                  <a:schemeClr val="tx1">
+                    <a:lumMod val="50000"/>
+                  </a:schemeClr>
+                </a:solidFill>
+              </a:rPr>
+              <a:t>tim</a:t>
+            </a:r>
+            <a:r>
+              <a:rPr lang="en-US" altLang="zh-CN" sz="2000" dirty="0" smtClean="0">
+                <a:solidFill>
+                  <a:schemeClr val="tx1">
+                    <a:lumMod val="50000"/>
+                  </a:schemeClr>
+                </a:solidFill>
+              </a:rPr>
+              <a:t> &lt;time&gt;; insert ‘</a:t>
+            </a:r>
+            <a:r>
+              <a:rPr lang="en-US" altLang="zh-CN" sz="2000" dirty="0" err="1" smtClean="0">
+                <a:solidFill>
+                  <a:schemeClr val="tx1">
+                    <a:lumMod val="50000"/>
+                  </a:schemeClr>
+                </a:solidFill>
+              </a:rPr>
+              <a:t>sta</a:t>
+            </a:r>
+            <a:r>
+              <a:rPr lang="en-US" altLang="zh-CN" sz="2000" dirty="0" smtClean="0">
+                <a:solidFill>
+                  <a:schemeClr val="tx1">
+                    <a:lumMod val="50000"/>
+                  </a:schemeClr>
+                </a:solidFill>
+              </a:rPr>
+              <a:t> set pre’ after </a:t>
+            </a:r>
+            <a:r>
+              <a:rPr lang="en-US" altLang="zh-CN" sz="2000" dirty="0" err="1" smtClean="0">
+                <a:solidFill>
+                  <a:schemeClr val="tx1">
+                    <a:lumMod val="50000"/>
+                  </a:schemeClr>
+                </a:solidFill>
+              </a:rPr>
+              <a:t>sta</a:t>
+            </a:r>
+            <a:r>
+              <a:rPr lang="en-US" altLang="zh-CN" sz="2000" dirty="0" smtClean="0">
+                <a:solidFill>
+                  <a:schemeClr val="tx1">
+                    <a:lumMod val="50000"/>
+                  </a:schemeClr>
+                </a:solidFill>
+              </a:rPr>
+              <a:t> set las to  avoid strange deformed </a:t>
+            </a:r>
+            <a:r>
+              <a:rPr lang="en-US" altLang="zh-CN" sz="2000" dirty="0" smtClean="0">
+                <a:solidFill>
+                  <a:schemeClr val="tx1">
+                    <a:lumMod val="50000"/>
+                  </a:schemeClr>
+                </a:solidFill>
+              </a:rPr>
+              <a:t>element</a:t>
+            </a:r>
+          </a:p>
+          <a:p>
+            <a:pPr>
+              <a:lnSpc>
+                <a:spcPct val="95000"/>
+              </a:lnSpc>
+              <a:buClr>
+                <a:schemeClr val="accent1"/>
+              </a:buClr>
+            </a:pPr>
+            <a:endParaRPr lang="en-US" altLang="zh-CN" sz="2000" dirty="0">
+              <a:solidFill>
+                <a:schemeClr val="tx1">
+                  <a:lumMod val="50000"/>
+                </a:schemeClr>
+              </a:solidFill>
+            </a:endParaRPr>
+          </a:p>
+          <a:p>
+            <a:pPr marL="342900" indent="-342900">
+              <a:lnSpc>
+                <a:spcPct val="95000"/>
+              </a:lnSpc>
+              <a:buClr>
+                <a:schemeClr val="accent1"/>
+              </a:buClr>
+              <a:buFont typeface="Wingdings" panose="05000000000000000000" pitchFamily="2" charset="2"/>
+              <a:buChar char="n"/>
+            </a:pPr>
+            <a:r>
+              <a:rPr lang="en-US" altLang="zh-CN" sz="2000" dirty="0" smtClean="0">
+                <a:solidFill>
+                  <a:schemeClr val="tx1">
+                    <a:lumMod val="50000"/>
+                  </a:schemeClr>
+                </a:solidFill>
+              </a:rPr>
+              <a:t>201806011</a:t>
+            </a:r>
+            <a:endParaRPr lang="en-US" altLang="zh-CN" sz="2000" dirty="0">
+              <a:solidFill>
+                <a:schemeClr val="tx1">
+                  <a:lumMod val="50000"/>
+                </a:schemeClr>
+              </a:solidFill>
+            </a:endParaRPr>
+          </a:p>
+          <a:p>
+            <a:pPr>
+              <a:lnSpc>
+                <a:spcPct val="95000"/>
+              </a:lnSpc>
+              <a:buClr>
+                <a:schemeClr val="accent1"/>
+              </a:buClr>
+            </a:pPr>
+            <a:r>
+              <a:rPr lang="en-US" altLang="zh-CN" sz="2000" dirty="0" smtClean="0">
+                <a:solidFill>
+                  <a:schemeClr val="tx1">
+                    <a:lumMod val="50000"/>
+                  </a:schemeClr>
+                </a:solidFill>
+              </a:rPr>
+              <a:t>PAB add mode shape slide</a:t>
+            </a:r>
+            <a:endParaRPr lang="en-US" altLang="zh-CN" sz="2000" dirty="0">
+              <a:solidFill>
+                <a:schemeClr val="tx1">
+                  <a:lumMod val="50000"/>
+                </a:schemeClr>
+              </a:solidFill>
+            </a:endParaRPr>
+          </a:p>
+          <a:p>
+            <a:pPr>
+              <a:lnSpc>
+                <a:spcPct val="95000"/>
+              </a:lnSpc>
+              <a:buClr>
+                <a:schemeClr val="accent1"/>
+              </a:buClr>
+            </a:pPr>
+            <a:endParaRPr lang="en-US" altLang="zh-CN" sz="2000" dirty="0" smtClean="0">
               <a:solidFill>
                 <a:schemeClr val="tx1">
                   <a:lumMod val="50000"/>
@@ -4437,7 +7003,7 @@
         <p:spPr>
           <a:xfrm>
             <a:off x="611422" y="1464866"/>
-            <a:ext cx="5434308" cy="369332"/>
+            <a:ext cx="5434308" cy="646331"/>
           </a:xfrm>
           <a:prstGeom prst="rect">
             <a:avLst/>
@@ -4450,9 +7016,82 @@
           <a:lstStyle/>
           <a:p>
             <a:r>
+              <a:rPr lang="en-US" altLang="zh-CN" dirty="0" err="1">
+                <a:solidFill>
+                  <a:schemeClr val="tx1">
+                    <a:lumMod val="50000"/>
+                  </a:schemeClr>
+                </a:solidFill>
+              </a:rPr>
+              <a:t>Rundir</a:t>
+            </a:r>
+            <a:endParaRPr lang="zh-CN" altLang="en-US" dirty="0">
+              <a:solidFill>
+                <a:schemeClr val="tx1">
+                  <a:lumMod val="50000"/>
+                </a:schemeClr>
+              </a:solidFill>
+            </a:endParaRPr>
+          </a:p>
+          <a:p>
+            <a:r>
+              <a:rPr lang="zh-CN" altLang="en-US" dirty="0" smtClean="0"/>
+              <a:t>Y</a:t>
+            </a:r>
+            <a:r>
               <a:rPr lang="zh-CN" altLang="en-US" dirty="0"/>
-              <a:t>Y:\doc\08_Personal\Yujin\0508\YokingPy\Howtouse</a:t>
-            </a:r>
+              <a:t>:\doc\08_Personal\Yujin\0508\YokingPy\Howtouse</a:t>
+            </a:r>
+          </a:p>
+        </p:txBody>
+      </p:sp>
+      <p:sp>
+        <p:nvSpPr>
+          <p:cNvPr id="12" name="TextBox 11"/>
+          <p:cNvSpPr txBox="1"/>
+          <p:nvPr/>
+        </p:nvSpPr>
+        <p:spPr>
+          <a:xfrm>
+            <a:off x="4611330" y="5133384"/>
+            <a:ext cx="829321" cy="365091"/>
+          </a:xfrm>
+          <a:prstGeom prst="rect">
+            <a:avLst/>
+          </a:prstGeom>
+          <a:noFill/>
+        </p:spPr>
+        <p:txBody>
+          <a:bodyPr wrap="none" lIns="36000" tIns="36000" rIns="36000" bIns="36000" rtlCol="0" anchor="ctr" anchorCtr="0">
+            <a:spAutoFit/>
+          </a:bodyPr>
+          <a:lstStyle/>
+          <a:p>
+            <a:pPr>
+              <a:lnSpc>
+                <a:spcPct val="95000"/>
+              </a:lnSpc>
+              <a:buClr>
+                <a:schemeClr val="accent1"/>
+              </a:buClr>
+            </a:pPr>
+            <a:r>
+              <a:rPr lang="en-US" altLang="zh-CN" sz="2000" dirty="0" err="1" smtClean="0">
+                <a:solidFill>
+                  <a:schemeClr val="tx1">
+                    <a:lumMod val="50000"/>
+                  </a:schemeClr>
+                </a:solidFill>
+              </a:rPr>
+              <a:t>Rundir</a:t>
+            </a:r>
+            <a:endParaRPr lang="zh-CN" altLang="en-US" sz="2000" dirty="0" err="1" smtClean="0">
+              <a:solidFill>
+                <a:schemeClr val="tx1">
+                  <a:lumMod val="50000"/>
+                </a:schemeClr>
+              </a:solidFill>
+            </a:endParaRPr>
           </a:p>
         </p:txBody>
       </p:sp>
@@ -4787,17 +7426,7 @@
                   </a:schemeClr>
                 </a:solidFill>
               </a:rPr>
-              <a:t>Configure </a:t>
-            </a:r>
-            <a:r>
-              <a:rPr lang="en-US" altLang="zh-CN" dirty="0" smtClean="0">
-                <a:solidFill>
-                  <a:schemeClr val="tx1">
-                    <a:lumMod val="50000"/>
-                  </a:schemeClr>
-                </a:solidFill>
-              </a:rPr>
-              <a:t>the </a:t>
+              <a:t>Configure the </a:t>
             </a:r>
             <a:r>
               <a:rPr lang="en-US" altLang="zh-CN" dirty="0" err="1" smtClean="0">
@@ -5545,7 +8174,7 @@
         <p:spPr>
           <a:xfrm>
             <a:off x="550863" y="1498582"/>
-            <a:ext cx="10101667" cy="1534642"/>
+            <a:ext cx="8724495" cy="1534642"/>
           </a:xfrm>
           <a:prstGeom prst="rect">
             <a:avLst/>
@@ -5679,27 +8308,7 @@
                   </a:schemeClr>
                 </a:solidFill>
               </a:rPr>
-              <a:t> a new session file and </a:t>
-            </a:r>
-            <a:r>
-              <a:rPr lang="en-US" altLang="zh-CN" sz="2000" dirty="0" err="1" smtClean="0">
-                <a:solidFill>
-                  <a:schemeClr val="tx1">
-                    <a:lumMod val="50000"/>
-                  </a:schemeClr>
-                </a:solidFill>
-              </a:rPr>
-              <a:t>tcl</a:t>
-            </a:r>
-            <a:r>
-              <a:rPr lang="en-US" altLang="zh-CN" sz="2000" dirty="0" smtClean="0">
-                <a:solidFill>
-                  <a:schemeClr val="tx1">
-                    <a:lumMod val="50000"/>
-                  </a:schemeClr>
-                </a:solidFill>
-              </a:rPr>
-              <a:t> file in work directory, user shouldn’t modify.</a:t>
+              <a:t> a new session file in work directory, user shouldn’t modify.</a:t>
             </a:r>
           </a:p>
           <a:p>
@@ -5736,27 +8345,7 @@
                   </a:schemeClr>
                 </a:solidFill>
               </a:rPr>
-              <a:t>Note: </a:t>
-            </a:r>
-            <a:r>
-              <a:rPr lang="en-US" altLang="zh-CN" sz="2000" dirty="0" err="1" smtClean="0">
-                <a:solidFill>
-                  <a:schemeClr val="tx1">
-                    <a:lumMod val="50000"/>
-                  </a:schemeClr>
-                </a:solidFill>
-              </a:rPr>
-              <a:t>Hyperview</a:t>
-            </a:r>
-            <a:r>
-              <a:rPr lang="en-US" altLang="zh-CN" sz="2000" dirty="0" smtClean="0">
-                <a:solidFill>
-                  <a:schemeClr val="tx1">
-                    <a:lumMod val="50000"/>
-                  </a:schemeClr>
-                </a:solidFill>
-              </a:rPr>
-              <a:t> session and </a:t>
+              <a:t>Note: Animator session and </a:t>
             </a:r>
             <a:r>
               <a:rPr lang="en-US" altLang="zh-CN" sz="2000" dirty="0" err="1" smtClean="0">
@@ -7205,7 +9794,7 @@
           <a:p>
             <a:r>
               <a:rPr lang="en-US" altLang="zh-CN" dirty="0" smtClean="0"/>
-              <a:t>Add pictures</a:t>
+              <a:t>Add Pictures</a:t>
             </a:r>
             <a:endParaRPr lang="zh-CN" altLang="en-US" dirty="0"/>
           </a:p>
@@ -8147,12 +10736,15 @@
 </file>
 
 <file path=customXml/item1.xml><?xml version="1.0" encoding="utf-8"?>
-<?mso-contentType ?>
-<FormTemplates xmlns="http://schemas.microsoft.com/sharepoint/v3/contenttype/forms">
-  <Display>DocumentLibraryForm</Display>
-  <Edit>DocumentLibraryForm</Edit>
-  <New>DocumentLibraryForm</New>
-</FormTemplates>
+<p:properties xmlns:p="http://schemas.microsoft.com/office/2006/metadata/properties" xmlns:xsi="http://www.w3.org/2001/XMLSchema-instance" xmlns:pc="http://schemas.microsoft.com/office/infopath/2007/PartnerControls">
+  <documentManagement>
+    <Category xmlns="682f6bf9-3ecb-412a-8ab2-32cc2720e371">Others</Category>
+    <Language xmlns="http://schemas.microsoft.com/sharepoint/v3">English</Language>
+    <Topic xmlns="9b763500-6eb8-456c-a4dd-dbef261a76a2" xsi:nil="true"/>
+    <PublishingExpirationDate xmlns="http://schemas.microsoft.com/sharepoint/v3" xsi:nil="true"/>
+    <PublishingStartDate xmlns="http://schemas.microsoft.com/sharepoint/v3" xsi:nil="true"/>
+  </documentManagement>
+</p:properties>
 </file>
 
 <file path=customXml/item2.xml><?xml version="1.0" encoding="utf-8"?>
@@ -8374,21 +10966,28 @@
 </file>
 
 <file path=customXml/item3.xml><?xml version="1.0" encoding="utf-8"?>
-<p:properties xmlns:p="http://schemas.microsoft.com/office/2006/metadata/properties" xmlns:xsi="http://www.w3.org/2001/XMLSchema-instance" xmlns:pc="http://schemas.microsoft.com/office/infopath/2007/PartnerControls">
-  <documentManagement>
-    <Category xmlns="682f6bf9-3ecb-412a-8ab2-32cc2720e371">Others</Category>
-    <Language xmlns="http://schemas.microsoft.com/sharepoint/v3">English</Language>
-    <Topic xmlns="9b763500-6eb8-456c-a4dd-dbef261a76a2" xsi:nil="true"/>
-    <PublishingExpirationDate xmlns="http://schemas.microsoft.com/sharepoint/v3" xsi:nil="true"/>
-    <PublishingStartDate xmlns="http://schemas.microsoft.com/sharepoint/v3" xsi:nil="true"/>
-  </documentManagement>
-</p:properties>
+<?mso-contentType ?>
+<FormTemplates xmlns="http://schemas.microsoft.com/sharepoint/v3/contenttype/forms">
+  <Display>DocumentLibraryForm</Display>
+  <Edit>DocumentLibraryForm</Edit>
+  <New>DocumentLibraryForm</New>
+</FormTemplates>
 </file>
 
 <file path=customXml/itemProps1.xml><?xml version="1.0" encoding="utf-8"?>
-<ds:datastoreItem xmlns:ds="http://schemas.openxmlformats.org/officeDocument/2006/customXml" ds:itemID="{66B9EAF3-28D0-4592-A9D2-6364F4E06FA4}">
+<ds:datastoreItem xmlns:ds="http://schemas.openxmlformats.org/officeDocument/2006/customXml" ds:itemID="{849068C1-CDFA-4FCC-89A8-32998777623D}">
   <ds:schemaRefs>
-    <ds:schemaRef ds:uri="http://schemas.microsoft.com/sharepoint/v3/contenttype/forms"/>
+    <ds:schemaRef ds:uri="http://www.w3.org/XML/1998/namespace"/>
+    <ds:schemaRef ds:uri="http://purl.org/dc/dcmitype/"/>
+    <ds:schemaRef ds:uri="http://purl.org/dc/terms/"/>
+    <ds:schemaRef ds:uri="http://schemas.openxmlformats.org/package/2006/metadata/core-properties"/>
+    <ds:schemaRef ds:uri="http://schemas.microsoft.com/office/2006/documentManagement/types"/>
+    <ds:schemaRef ds:uri="http://schemas.microsoft.com/office/2006/metadata/properties"/>
+    <ds:schemaRef ds:uri="http://schemas.microsoft.com/office/infopath/2007/PartnerControls"/>
+    <ds:schemaRef ds:uri="http://schemas.microsoft.com/sharepoint/v3"/>
+    <ds:schemaRef ds:uri="9b763500-6eb8-456c-a4dd-dbef261a76a2"/>
+    <ds:schemaRef ds:uri="682f6bf9-3ecb-412a-8ab2-32cc2720e371"/>
+    <ds:schemaRef ds:uri="http://purl.org/dc/elements/1.1/"/>
   </ds:schemaRefs>
 </ds:datastoreItem>
 </file>
@@ -8414,19 +11013,9 @@
 </file>
 
 <file path=customXml/itemProps3.xml><?xml version="1.0" encoding="utf-8"?>
-<ds:datastoreItem xmlns:ds="http://schemas.openxmlformats.org/officeDocument/2006/customXml" ds:itemID="{849068C1-CDFA-4FCC-89A8-32998777623D}">
+<ds:datastoreItem xmlns:ds="http://schemas.openxmlformats.org/officeDocument/2006/customXml" ds:itemID="{66B9EAF3-28D0-4592-A9D2-6364F4E06FA4}">
   <ds:schemaRefs>
-    <ds:schemaRef ds:uri="http://www.w3.org/XML/1998/namespace"/>
-    <ds:schemaRef ds:uri="http://purl.org/dc/dcmitype/"/>
-    <ds:schemaRef ds:uri="http://purl.org/dc/terms/"/>
-    <ds:schemaRef ds:uri="http://schemas.openxmlformats.org/package/2006/metadata/core-properties"/>
-    <ds:schemaRef ds:uri="http://schemas.microsoft.com/office/2006/documentManagement/types"/>
-    <ds:schemaRef ds:uri="http://schemas.microsoft.com/office/2006/metadata/properties"/>
-    <ds:schemaRef ds:uri="http://schemas.microsoft.com/office/infopath/2007/PartnerControls"/>
-    <ds:schemaRef ds:uri="http://schemas.microsoft.com/sharepoint/v3"/>
-    <ds:schemaRef ds:uri="9b763500-6eb8-456c-a4dd-dbef261a76a2"/>
-    <ds:schemaRef ds:uri="682f6bf9-3ecb-412a-8ab2-32cc2720e371"/>
-    <ds:schemaRef ds:uri="http://purl.org/dc/elements/1.1/"/>
+    <ds:schemaRef ds:uri="http://schemas.microsoft.com/sharepoint/v3/contenttype/forms"/>
   </ds:schemaRefs>
 </ds:datastoreItem>
 </file>
</xml_diff>

<commit_message>
$SB +automatic fill force in conclusion
Signed-off-by: Yujin <chaos1984@163.com>
</commit_message>
<xml_diff>
--- a/Python/Howtouse/Readme.pptx
+++ b/Python/Howtouse/Readme.pptx
@@ -5,10 +5,10 @@
     <p:sldMasterId id="2147483677" r:id="rId4"/>
   </p:sldMasterIdLst>
   <p:notesMasterIdLst>
-    <p:notesMasterId r:id="rId16"/>
+    <p:notesMasterId r:id="rId17"/>
   </p:notesMasterIdLst>
   <p:handoutMasterIdLst>
-    <p:handoutMasterId r:id="rId17"/>
+    <p:handoutMasterId r:id="rId18"/>
   </p:handoutMasterIdLst>
   <p:sldIdLst>
     <p:sldId id="256" r:id="rId5"/>
@@ -21,7 +21,8 @@
     <p:sldId id="261" r:id="rId12"/>
     <p:sldId id="263" r:id="rId13"/>
     <p:sldId id="264" r:id="rId14"/>
-    <p:sldId id="265" r:id="rId15"/>
+    <p:sldId id="267" r:id="rId15"/>
+    <p:sldId id="265" r:id="rId16"/>
   </p:sldIdLst>
   <p:sldSz cx="12192000" cy="6858000"/>
   <p:notesSz cx="6799263" cy="9929813"/>
@@ -135,6 +136,7 @@
             <p14:sldId id="261"/>
             <p14:sldId id="263"/>
             <p14:sldId id="264"/>
+            <p14:sldId id="267"/>
           </p14:sldIdLst>
         </p14:section>
         <p14:section name="Version updata log" id="{3BE00363-6993-4AC5-902F-A3AD116B5D64}">
@@ -174,6 +176,1922 @@
     </p:ext>
   </p:extLst>
 </p:presentation>
+</file>
+
+<file path=ppt/charts/chart1.xml><?xml version="1.0" encoding="utf-8"?>
+<c:chartSpace xmlns:c="http://schemas.openxmlformats.org/drawingml/2006/chart" xmlns:a="http://schemas.openxmlformats.org/drawingml/2006/main" xmlns:r="http://schemas.openxmlformats.org/officeDocument/2006/relationships">
+  <c:date1904 val="0"/>
+  <c:lang val="en-US"/>
+  <c:roundedCorners val="0"/>
+  <mc:AlternateContent xmlns:mc="http://schemas.openxmlformats.org/markup-compatibility/2006">
+    <mc:Choice xmlns:c14="http://schemas.microsoft.com/office/drawing/2007/8/2/chart" Requires="c14">
+      <c14:style val="102"/>
+    </mc:Choice>
+    <mc:Fallback>
+      <c:style val="2"/>
+    </mc:Fallback>
+  </mc:AlternateContent>
+  <c:chart>
+    <c:title>
+      <c:tx>
+        <c:rich>
+          <a:bodyPr rot="0" spcFirstLastPara="1" vertOverflow="ellipsis" vert="horz" wrap="square" anchor="ctr" anchorCtr="1"/>
+          <a:lstStyle/>
+          <a:p>
+            <a:pPr>
+              <a:defRPr sz="1862" b="0" i="0" u="none" strike="noStrike" kern="1200" spc="0" baseline="0">
+                <a:solidFill>
+                  <a:schemeClr val="tx1">
+                    <a:lumMod val="65000"/>
+                    <a:lumOff val="35000"/>
+                  </a:schemeClr>
+                </a:solidFill>
+                <a:latin typeface="+mn-lt"/>
+                <a:ea typeface="+mn-ea"/>
+                <a:cs typeface="+mn-cs"/>
+              </a:defRPr>
+            </a:pPr>
+            <a:r>
+              <a:rPr lang="en-US" altLang="zh-CN" dirty="0" smtClean="0"/>
+              <a:t>Time</a:t>
+            </a:r>
+            <a:r>
+              <a:rPr lang="zh-CN" altLang="en-US" dirty="0" smtClean="0"/>
+              <a:t>（</a:t>
+            </a:r>
+            <a:r>
+              <a:rPr lang="en-US" altLang="zh-CN" dirty="0" smtClean="0"/>
+              <a:t>/s</a:t>
+            </a:r>
+            <a:r>
+              <a:rPr lang="zh-CN" altLang="en-US" dirty="0" smtClean="0"/>
+              <a:t>）</a:t>
+            </a:r>
+            <a:endParaRPr lang="en-US" altLang="zh-CN" dirty="0"/>
+          </a:p>
+        </c:rich>
+      </c:tx>
+      <c:layout/>
+      <c:overlay val="0"/>
+      <c:spPr>
+        <a:noFill/>
+        <a:ln>
+          <a:noFill/>
+        </a:ln>
+        <a:effectLst/>
+      </c:spPr>
+      <c:txPr>
+        <a:bodyPr rot="0" spcFirstLastPara="1" vertOverflow="ellipsis" vert="horz" wrap="square" anchor="ctr" anchorCtr="1"/>
+        <a:lstStyle/>
+        <a:p>
+          <a:pPr>
+            <a:defRPr sz="1862" b="0" i="0" u="none" strike="noStrike" kern="1200" spc="0" baseline="0">
+              <a:solidFill>
+                <a:schemeClr val="tx1">
+                  <a:lumMod val="65000"/>
+                  <a:lumOff val="35000"/>
+                </a:schemeClr>
+              </a:solidFill>
+              <a:latin typeface="+mn-lt"/>
+              <a:ea typeface="+mn-ea"/>
+              <a:cs typeface="+mn-cs"/>
+            </a:defRPr>
+          </a:pPr>
+          <a:endParaRPr lang="zh-CN"/>
+        </a:p>
+      </c:txPr>
+    </c:title>
+    <c:autoTitleDeleted val="0"/>
+    <c:plotArea>
+      <c:layout/>
+      <c:barChart>
+        <c:barDir val="col"/>
+        <c:grouping val="clustered"/>
+        <c:varyColors val="0"/>
+        <c:ser>
+          <c:idx val="0"/>
+          <c:order val="0"/>
+          <c:tx>
+            <c:strRef>
+              <c:f>Sheet1!$B$1</c:f>
+              <c:strCache>
+                <c:ptCount val="1"/>
+                <c:pt idx="0">
+                  <c:v>PC(PC:Python lib)</c:v>
+                </c:pt>
+              </c:strCache>
+            </c:strRef>
+          </c:tx>
+          <c:spPr>
+            <a:solidFill>
+              <a:schemeClr val="accent1"/>
+            </a:solidFill>
+            <a:ln>
+              <a:noFill/>
+            </a:ln>
+            <a:effectLst/>
+          </c:spPr>
+          <c:invertIfNegative val="0"/>
+          <c:cat>
+            <c:numRef>
+              <c:f>Sheet1!$A$2</c:f>
+              <c:numCache>
+                <c:formatCode>General</c:formatCode>
+                <c:ptCount val="1"/>
+              </c:numCache>
+            </c:numRef>
+          </c:cat>
+          <c:val>
+            <c:numRef>
+              <c:f>Sheet1!$B$2</c:f>
+              <c:numCache>
+                <c:formatCode>General</c:formatCode>
+                <c:ptCount val="1"/>
+                <c:pt idx="0">
+                  <c:v>123.629</c:v>
+                </c:pt>
+              </c:numCache>
+            </c:numRef>
+          </c:val>
+        </c:ser>
+        <c:ser>
+          <c:idx val="1"/>
+          <c:order val="1"/>
+          <c:tx>
+            <c:strRef>
+              <c:f>Sheet1!$C$1</c:f>
+              <c:strCache>
+                <c:ptCount val="1"/>
+                <c:pt idx="0">
+                  <c:v>PC(Server:Python lib)</c:v>
+                </c:pt>
+              </c:strCache>
+            </c:strRef>
+          </c:tx>
+          <c:spPr>
+            <a:solidFill>
+              <a:schemeClr val="accent2"/>
+            </a:solidFill>
+            <a:ln>
+              <a:noFill/>
+            </a:ln>
+            <a:effectLst/>
+          </c:spPr>
+          <c:invertIfNegative val="0"/>
+          <c:cat>
+            <c:numRef>
+              <c:f>Sheet1!$A$2</c:f>
+              <c:numCache>
+                <c:formatCode>General</c:formatCode>
+                <c:ptCount val="1"/>
+              </c:numCache>
+            </c:numRef>
+          </c:cat>
+          <c:val>
+            <c:numRef>
+              <c:f>Sheet1!$C$2</c:f>
+              <c:numCache>
+                <c:formatCode>General</c:formatCode>
+                <c:ptCount val="1"/>
+                <c:pt idx="0">
+                  <c:v>202</c:v>
+                </c:pt>
+              </c:numCache>
+            </c:numRef>
+          </c:val>
+        </c:ser>
+        <c:ser>
+          <c:idx val="2"/>
+          <c:order val="2"/>
+          <c:tx>
+            <c:strRef>
+              <c:f>Sheet1!$D$1</c:f>
+              <c:strCache>
+                <c:ptCount val="1"/>
+                <c:pt idx="0">
+                  <c:v>Server</c:v>
+                </c:pt>
+              </c:strCache>
+            </c:strRef>
+          </c:tx>
+          <c:spPr>
+            <a:solidFill>
+              <a:schemeClr val="accent3"/>
+            </a:solidFill>
+            <a:ln>
+              <a:noFill/>
+            </a:ln>
+            <a:effectLst/>
+          </c:spPr>
+          <c:invertIfNegative val="0"/>
+          <c:cat>
+            <c:numRef>
+              <c:f>Sheet1!$A$2</c:f>
+              <c:numCache>
+                <c:formatCode>General</c:formatCode>
+                <c:ptCount val="1"/>
+              </c:numCache>
+            </c:numRef>
+          </c:cat>
+          <c:val>
+            <c:numRef>
+              <c:f>Sheet1!$D$2</c:f>
+              <c:numCache>
+                <c:formatCode>General</c:formatCode>
+                <c:ptCount val="1"/>
+                <c:pt idx="0">
+                  <c:v>192.42</c:v>
+                </c:pt>
+              </c:numCache>
+            </c:numRef>
+          </c:val>
+        </c:ser>
+        <c:dLbls>
+          <c:showLegendKey val="0"/>
+          <c:showVal val="0"/>
+          <c:showCatName val="0"/>
+          <c:showSerName val="0"/>
+          <c:showPercent val="0"/>
+          <c:showBubbleSize val="0"/>
+        </c:dLbls>
+        <c:gapWidth val="219"/>
+        <c:overlap val="-27"/>
+        <c:axId val="472482664"/>
+        <c:axId val="609955856"/>
+      </c:barChart>
+      <c:catAx>
+        <c:axId val="472482664"/>
+        <c:scaling>
+          <c:orientation val="minMax"/>
+        </c:scaling>
+        <c:delete val="0"/>
+        <c:axPos val="b"/>
+        <c:numFmt formatCode="General" sourceLinked="1"/>
+        <c:majorTickMark val="none"/>
+        <c:minorTickMark val="none"/>
+        <c:tickLblPos val="nextTo"/>
+        <c:spPr>
+          <a:noFill/>
+          <a:ln w="9525" cap="flat" cmpd="sng" algn="ctr">
+            <a:solidFill>
+              <a:schemeClr val="tx1">
+                <a:lumMod val="15000"/>
+                <a:lumOff val="85000"/>
+              </a:schemeClr>
+            </a:solidFill>
+            <a:round/>
+          </a:ln>
+          <a:effectLst/>
+        </c:spPr>
+        <c:txPr>
+          <a:bodyPr rot="-60000000" spcFirstLastPara="1" vertOverflow="ellipsis" vert="horz" wrap="square" anchor="ctr" anchorCtr="1"/>
+          <a:lstStyle/>
+          <a:p>
+            <a:pPr>
+              <a:defRPr sz="1197" b="0" i="0" u="none" strike="noStrike" kern="1200" baseline="0">
+                <a:solidFill>
+                  <a:schemeClr val="tx1">
+                    <a:lumMod val="65000"/>
+                    <a:lumOff val="35000"/>
+                  </a:schemeClr>
+                </a:solidFill>
+                <a:latin typeface="+mn-lt"/>
+                <a:ea typeface="+mn-ea"/>
+                <a:cs typeface="+mn-cs"/>
+              </a:defRPr>
+            </a:pPr>
+            <a:endParaRPr lang="zh-CN"/>
+          </a:p>
+        </c:txPr>
+        <c:crossAx val="609955856"/>
+        <c:crosses val="autoZero"/>
+        <c:auto val="1"/>
+        <c:lblAlgn val="ctr"/>
+        <c:lblOffset val="100"/>
+        <c:noMultiLvlLbl val="0"/>
+      </c:catAx>
+      <c:valAx>
+        <c:axId val="609955856"/>
+        <c:scaling>
+          <c:orientation val="minMax"/>
+        </c:scaling>
+        <c:delete val="0"/>
+        <c:axPos val="l"/>
+        <c:majorGridlines>
+          <c:spPr>
+            <a:ln w="9525" cap="flat" cmpd="sng" algn="ctr">
+              <a:solidFill>
+                <a:schemeClr val="tx1">
+                  <a:lumMod val="15000"/>
+                  <a:lumOff val="85000"/>
+                </a:schemeClr>
+              </a:solidFill>
+              <a:round/>
+            </a:ln>
+            <a:effectLst/>
+          </c:spPr>
+        </c:majorGridlines>
+        <c:numFmt formatCode="General" sourceLinked="1"/>
+        <c:majorTickMark val="none"/>
+        <c:minorTickMark val="none"/>
+        <c:tickLblPos val="nextTo"/>
+        <c:spPr>
+          <a:noFill/>
+          <a:ln>
+            <a:noFill/>
+          </a:ln>
+          <a:effectLst/>
+        </c:spPr>
+        <c:txPr>
+          <a:bodyPr rot="-60000000" spcFirstLastPara="1" vertOverflow="ellipsis" vert="horz" wrap="square" anchor="ctr" anchorCtr="1"/>
+          <a:lstStyle/>
+          <a:p>
+            <a:pPr>
+              <a:defRPr sz="1197" b="0" i="0" u="none" strike="noStrike" kern="1200" baseline="0">
+                <a:solidFill>
+                  <a:schemeClr val="tx1">
+                    <a:lumMod val="65000"/>
+                    <a:lumOff val="35000"/>
+                  </a:schemeClr>
+                </a:solidFill>
+                <a:latin typeface="+mn-lt"/>
+                <a:ea typeface="+mn-ea"/>
+                <a:cs typeface="+mn-cs"/>
+              </a:defRPr>
+            </a:pPr>
+            <a:endParaRPr lang="zh-CN"/>
+          </a:p>
+        </c:txPr>
+        <c:crossAx val="472482664"/>
+        <c:crosses val="autoZero"/>
+        <c:crossBetween val="between"/>
+      </c:valAx>
+      <c:spPr>
+        <a:noFill/>
+        <a:ln>
+          <a:noFill/>
+        </a:ln>
+        <a:effectLst/>
+      </c:spPr>
+    </c:plotArea>
+    <c:legend>
+      <c:legendPos val="b"/>
+      <c:layout/>
+      <c:overlay val="0"/>
+      <c:spPr>
+        <a:noFill/>
+        <a:ln>
+          <a:noFill/>
+        </a:ln>
+        <a:effectLst/>
+      </c:spPr>
+      <c:txPr>
+        <a:bodyPr rot="0" spcFirstLastPara="1" vertOverflow="ellipsis" vert="horz" wrap="square" anchor="ctr" anchorCtr="1"/>
+        <a:lstStyle/>
+        <a:p>
+          <a:pPr>
+            <a:defRPr sz="1197" b="0" i="0" u="none" strike="noStrike" kern="1200" baseline="0">
+              <a:solidFill>
+                <a:schemeClr val="tx1">
+                  <a:lumMod val="65000"/>
+                  <a:lumOff val="35000"/>
+                </a:schemeClr>
+              </a:solidFill>
+              <a:latin typeface="+mn-lt"/>
+              <a:ea typeface="+mn-ea"/>
+              <a:cs typeface="+mn-cs"/>
+            </a:defRPr>
+          </a:pPr>
+          <a:endParaRPr lang="zh-CN"/>
+        </a:p>
+      </c:txPr>
+    </c:legend>
+    <c:plotVisOnly val="1"/>
+    <c:dispBlanksAs val="gap"/>
+    <c:showDLblsOverMax val="0"/>
+  </c:chart>
+  <c:spPr>
+    <a:noFill/>
+    <a:ln>
+      <a:noFill/>
+    </a:ln>
+    <a:effectLst/>
+  </c:spPr>
+  <c:txPr>
+    <a:bodyPr/>
+    <a:lstStyle/>
+    <a:p>
+      <a:pPr>
+        <a:defRPr/>
+      </a:pPr>
+      <a:endParaRPr lang="zh-CN"/>
+    </a:p>
+  </c:txPr>
+  <c:externalData r:id="rId3">
+    <c:autoUpdate val="0"/>
+  </c:externalData>
+</c:chartSpace>
+</file>
+
+<file path=ppt/charts/chart2.xml><?xml version="1.0" encoding="utf-8"?>
+<c:chartSpace xmlns:c="http://schemas.openxmlformats.org/drawingml/2006/chart" xmlns:a="http://schemas.openxmlformats.org/drawingml/2006/main" xmlns:r="http://schemas.openxmlformats.org/officeDocument/2006/relationships">
+  <c:date1904 val="0"/>
+  <c:lang val="en-US"/>
+  <c:roundedCorners val="0"/>
+  <mc:AlternateContent xmlns:mc="http://schemas.openxmlformats.org/markup-compatibility/2006">
+    <mc:Choice xmlns:c14="http://schemas.microsoft.com/office/drawing/2007/8/2/chart" Requires="c14">
+      <c14:style val="102"/>
+    </mc:Choice>
+    <mc:Fallback>
+      <c:style val="2"/>
+    </mc:Fallback>
+  </mc:AlternateContent>
+  <c:chart>
+    <c:title>
+      <c:tx>
+        <c:rich>
+          <a:bodyPr rot="0" spcFirstLastPara="1" vertOverflow="ellipsis" vert="horz" wrap="square" anchor="ctr" anchorCtr="1"/>
+          <a:lstStyle/>
+          <a:p>
+            <a:pPr>
+              <a:defRPr sz="1862" b="0" i="0" u="none" strike="noStrike" kern="1200" spc="0" baseline="0">
+                <a:solidFill>
+                  <a:schemeClr val="tx1">
+                    <a:lumMod val="65000"/>
+                    <a:lumOff val="35000"/>
+                  </a:schemeClr>
+                </a:solidFill>
+                <a:latin typeface="+mn-lt"/>
+                <a:ea typeface="+mn-ea"/>
+                <a:cs typeface="+mn-cs"/>
+              </a:defRPr>
+            </a:pPr>
+            <a:r>
+              <a:rPr lang="en-US" altLang="zh-CN" dirty="0" smtClean="0"/>
+              <a:t>Time</a:t>
+            </a:r>
+            <a:r>
+              <a:rPr lang="zh-CN" altLang="en-US" dirty="0" smtClean="0"/>
+              <a:t>（</a:t>
+            </a:r>
+            <a:r>
+              <a:rPr lang="en-US" altLang="zh-CN" dirty="0" smtClean="0"/>
+              <a:t>/s</a:t>
+            </a:r>
+            <a:r>
+              <a:rPr lang="zh-CN" altLang="en-US" dirty="0" smtClean="0"/>
+              <a:t>）</a:t>
+            </a:r>
+            <a:endParaRPr lang="en-US" altLang="zh-CN" dirty="0"/>
+          </a:p>
+        </c:rich>
+      </c:tx>
+      <c:layout/>
+      <c:overlay val="0"/>
+      <c:spPr>
+        <a:noFill/>
+        <a:ln>
+          <a:noFill/>
+        </a:ln>
+        <a:effectLst/>
+      </c:spPr>
+      <c:txPr>
+        <a:bodyPr rot="0" spcFirstLastPara="1" vertOverflow="ellipsis" vert="horz" wrap="square" anchor="ctr" anchorCtr="1"/>
+        <a:lstStyle/>
+        <a:p>
+          <a:pPr>
+            <a:defRPr sz="1862" b="0" i="0" u="none" strike="noStrike" kern="1200" spc="0" baseline="0">
+              <a:solidFill>
+                <a:schemeClr val="tx1">
+                  <a:lumMod val="65000"/>
+                  <a:lumOff val="35000"/>
+                </a:schemeClr>
+              </a:solidFill>
+              <a:latin typeface="+mn-lt"/>
+              <a:ea typeface="+mn-ea"/>
+              <a:cs typeface="+mn-cs"/>
+            </a:defRPr>
+          </a:pPr>
+          <a:endParaRPr lang="zh-CN"/>
+        </a:p>
+      </c:txPr>
+    </c:title>
+    <c:autoTitleDeleted val="0"/>
+    <c:plotArea>
+      <c:layout/>
+      <c:barChart>
+        <c:barDir val="col"/>
+        <c:grouping val="clustered"/>
+        <c:varyColors val="0"/>
+        <c:ser>
+          <c:idx val="0"/>
+          <c:order val="0"/>
+          <c:tx>
+            <c:strRef>
+              <c:f>Sheet1!$B$1</c:f>
+              <c:strCache>
+                <c:ptCount val="1"/>
+                <c:pt idx="0">
+                  <c:v>PC(PC:Python lib)</c:v>
+                </c:pt>
+              </c:strCache>
+            </c:strRef>
+          </c:tx>
+          <c:spPr>
+            <a:solidFill>
+              <a:schemeClr val="accent1"/>
+            </a:solidFill>
+            <a:ln>
+              <a:noFill/>
+            </a:ln>
+            <a:effectLst/>
+          </c:spPr>
+          <c:invertIfNegative val="0"/>
+          <c:cat>
+            <c:numRef>
+              <c:f>Sheet1!$A$2</c:f>
+              <c:numCache>
+                <c:formatCode>General</c:formatCode>
+                <c:ptCount val="1"/>
+              </c:numCache>
+            </c:numRef>
+          </c:cat>
+          <c:val>
+            <c:numRef>
+              <c:f>Sheet1!$B$2</c:f>
+              <c:numCache>
+                <c:formatCode>General</c:formatCode>
+                <c:ptCount val="1"/>
+                <c:pt idx="0">
+                  <c:v>39.299999999999997</c:v>
+                </c:pt>
+              </c:numCache>
+            </c:numRef>
+          </c:val>
+        </c:ser>
+        <c:ser>
+          <c:idx val="1"/>
+          <c:order val="1"/>
+          <c:tx>
+            <c:strRef>
+              <c:f>Sheet1!$C$1</c:f>
+              <c:strCache>
+                <c:ptCount val="1"/>
+                <c:pt idx="0">
+                  <c:v>PC(Server:Python lib)</c:v>
+                </c:pt>
+              </c:strCache>
+            </c:strRef>
+          </c:tx>
+          <c:spPr>
+            <a:solidFill>
+              <a:schemeClr val="accent2"/>
+            </a:solidFill>
+            <a:ln>
+              <a:noFill/>
+            </a:ln>
+            <a:effectLst/>
+          </c:spPr>
+          <c:invertIfNegative val="0"/>
+          <c:cat>
+            <c:numRef>
+              <c:f>Sheet1!$A$2</c:f>
+              <c:numCache>
+                <c:formatCode>General</c:formatCode>
+                <c:ptCount val="1"/>
+              </c:numCache>
+            </c:numRef>
+          </c:cat>
+          <c:val>
+            <c:numRef>
+              <c:f>Sheet1!$C$2</c:f>
+              <c:numCache>
+                <c:formatCode>General</c:formatCode>
+                <c:ptCount val="1"/>
+                <c:pt idx="0">
+                  <c:v>158.375</c:v>
+                </c:pt>
+              </c:numCache>
+            </c:numRef>
+          </c:val>
+        </c:ser>
+        <c:ser>
+          <c:idx val="2"/>
+          <c:order val="2"/>
+          <c:tx>
+            <c:strRef>
+              <c:f>Sheet1!$D$1</c:f>
+              <c:strCache>
+                <c:ptCount val="1"/>
+                <c:pt idx="0">
+                  <c:v>Server</c:v>
+                </c:pt>
+              </c:strCache>
+            </c:strRef>
+          </c:tx>
+          <c:spPr>
+            <a:solidFill>
+              <a:schemeClr val="accent3"/>
+            </a:solidFill>
+            <a:ln>
+              <a:noFill/>
+            </a:ln>
+            <a:effectLst/>
+          </c:spPr>
+          <c:invertIfNegative val="0"/>
+          <c:cat>
+            <c:numRef>
+              <c:f>Sheet1!$A$2</c:f>
+              <c:numCache>
+                <c:formatCode>General</c:formatCode>
+                <c:ptCount val="1"/>
+              </c:numCache>
+            </c:numRef>
+          </c:cat>
+          <c:val>
+            <c:numRef>
+              <c:f>Sheet1!$D$2</c:f>
+              <c:numCache>
+                <c:formatCode>General</c:formatCode>
+                <c:ptCount val="1"/>
+                <c:pt idx="0">
+                  <c:v>185.637</c:v>
+                </c:pt>
+              </c:numCache>
+            </c:numRef>
+          </c:val>
+        </c:ser>
+        <c:dLbls>
+          <c:showLegendKey val="0"/>
+          <c:showVal val="0"/>
+          <c:showCatName val="0"/>
+          <c:showSerName val="0"/>
+          <c:showPercent val="0"/>
+          <c:showBubbleSize val="0"/>
+        </c:dLbls>
+        <c:gapWidth val="219"/>
+        <c:overlap val="-27"/>
+        <c:axId val="396137040"/>
+        <c:axId val="396137432"/>
+      </c:barChart>
+      <c:catAx>
+        <c:axId val="396137040"/>
+        <c:scaling>
+          <c:orientation val="minMax"/>
+        </c:scaling>
+        <c:delete val="0"/>
+        <c:axPos val="b"/>
+        <c:numFmt formatCode="General" sourceLinked="1"/>
+        <c:majorTickMark val="none"/>
+        <c:minorTickMark val="none"/>
+        <c:tickLblPos val="nextTo"/>
+        <c:spPr>
+          <a:noFill/>
+          <a:ln w="9525" cap="flat" cmpd="sng" algn="ctr">
+            <a:solidFill>
+              <a:schemeClr val="tx1">
+                <a:lumMod val="15000"/>
+                <a:lumOff val="85000"/>
+              </a:schemeClr>
+            </a:solidFill>
+            <a:round/>
+          </a:ln>
+          <a:effectLst/>
+        </c:spPr>
+        <c:txPr>
+          <a:bodyPr rot="-60000000" spcFirstLastPara="1" vertOverflow="ellipsis" vert="horz" wrap="square" anchor="ctr" anchorCtr="1"/>
+          <a:lstStyle/>
+          <a:p>
+            <a:pPr>
+              <a:defRPr sz="1197" b="0" i="0" u="none" strike="noStrike" kern="1200" baseline="0">
+                <a:solidFill>
+                  <a:schemeClr val="tx1">
+                    <a:lumMod val="65000"/>
+                    <a:lumOff val="35000"/>
+                  </a:schemeClr>
+                </a:solidFill>
+                <a:latin typeface="+mn-lt"/>
+                <a:ea typeface="+mn-ea"/>
+                <a:cs typeface="+mn-cs"/>
+              </a:defRPr>
+            </a:pPr>
+            <a:endParaRPr lang="zh-CN"/>
+          </a:p>
+        </c:txPr>
+        <c:crossAx val="396137432"/>
+        <c:crosses val="autoZero"/>
+        <c:auto val="1"/>
+        <c:lblAlgn val="ctr"/>
+        <c:lblOffset val="100"/>
+        <c:noMultiLvlLbl val="0"/>
+      </c:catAx>
+      <c:valAx>
+        <c:axId val="396137432"/>
+        <c:scaling>
+          <c:orientation val="minMax"/>
+        </c:scaling>
+        <c:delete val="0"/>
+        <c:axPos val="l"/>
+        <c:majorGridlines>
+          <c:spPr>
+            <a:ln w="9525" cap="flat" cmpd="sng" algn="ctr">
+              <a:solidFill>
+                <a:schemeClr val="tx1">
+                  <a:lumMod val="15000"/>
+                  <a:lumOff val="85000"/>
+                </a:schemeClr>
+              </a:solidFill>
+              <a:round/>
+            </a:ln>
+            <a:effectLst/>
+          </c:spPr>
+        </c:majorGridlines>
+        <c:numFmt formatCode="General" sourceLinked="1"/>
+        <c:majorTickMark val="none"/>
+        <c:minorTickMark val="none"/>
+        <c:tickLblPos val="nextTo"/>
+        <c:spPr>
+          <a:noFill/>
+          <a:ln>
+            <a:noFill/>
+          </a:ln>
+          <a:effectLst/>
+        </c:spPr>
+        <c:txPr>
+          <a:bodyPr rot="-60000000" spcFirstLastPara="1" vertOverflow="ellipsis" vert="horz" wrap="square" anchor="ctr" anchorCtr="1"/>
+          <a:lstStyle/>
+          <a:p>
+            <a:pPr>
+              <a:defRPr sz="1197" b="0" i="0" u="none" strike="noStrike" kern="1200" baseline="0">
+                <a:solidFill>
+                  <a:schemeClr val="tx1">
+                    <a:lumMod val="65000"/>
+                    <a:lumOff val="35000"/>
+                  </a:schemeClr>
+                </a:solidFill>
+                <a:latin typeface="+mn-lt"/>
+                <a:ea typeface="+mn-ea"/>
+                <a:cs typeface="+mn-cs"/>
+              </a:defRPr>
+            </a:pPr>
+            <a:endParaRPr lang="zh-CN"/>
+          </a:p>
+        </c:txPr>
+        <c:crossAx val="396137040"/>
+        <c:crosses val="autoZero"/>
+        <c:crossBetween val="between"/>
+      </c:valAx>
+      <c:spPr>
+        <a:noFill/>
+        <a:ln>
+          <a:noFill/>
+        </a:ln>
+        <a:effectLst/>
+      </c:spPr>
+    </c:plotArea>
+    <c:legend>
+      <c:legendPos val="b"/>
+      <c:layout/>
+      <c:overlay val="0"/>
+      <c:spPr>
+        <a:noFill/>
+        <a:ln>
+          <a:noFill/>
+        </a:ln>
+        <a:effectLst/>
+      </c:spPr>
+      <c:txPr>
+        <a:bodyPr rot="0" spcFirstLastPara="1" vertOverflow="ellipsis" vert="horz" wrap="square" anchor="ctr" anchorCtr="1"/>
+        <a:lstStyle/>
+        <a:p>
+          <a:pPr>
+            <a:defRPr sz="1197" b="0" i="0" u="none" strike="noStrike" kern="1200" baseline="0">
+              <a:solidFill>
+                <a:schemeClr val="tx1">
+                  <a:lumMod val="65000"/>
+                  <a:lumOff val="35000"/>
+                </a:schemeClr>
+              </a:solidFill>
+              <a:latin typeface="+mn-lt"/>
+              <a:ea typeface="+mn-ea"/>
+              <a:cs typeface="+mn-cs"/>
+            </a:defRPr>
+          </a:pPr>
+          <a:endParaRPr lang="zh-CN"/>
+        </a:p>
+      </c:txPr>
+    </c:legend>
+    <c:plotVisOnly val="1"/>
+    <c:dispBlanksAs val="gap"/>
+    <c:showDLblsOverMax val="0"/>
+  </c:chart>
+  <c:spPr>
+    <a:noFill/>
+    <a:ln>
+      <a:noFill/>
+    </a:ln>
+    <a:effectLst/>
+  </c:spPr>
+  <c:txPr>
+    <a:bodyPr/>
+    <a:lstStyle/>
+    <a:p>
+      <a:pPr>
+        <a:defRPr/>
+      </a:pPr>
+      <a:endParaRPr lang="zh-CN"/>
+    </a:p>
+  </c:txPr>
+  <c:externalData r:id="rId3">
+    <c:autoUpdate val="0"/>
+  </c:externalData>
+</c:chartSpace>
+</file>
+
+<file path=ppt/charts/colors1.xml><?xml version="1.0" encoding="utf-8"?>
+<cs:colorStyle xmlns:cs="http://schemas.microsoft.com/office/drawing/2012/chartStyle" xmlns:a="http://schemas.openxmlformats.org/drawingml/2006/main" meth="cycle" id="10">
+  <a:schemeClr val="accent1"/>
+  <a:schemeClr val="accent2"/>
+  <a:schemeClr val="accent3"/>
+  <a:schemeClr val="accent4"/>
+  <a:schemeClr val="accent5"/>
+  <a:schemeClr val="accent6"/>
+  <cs:variation/>
+  <cs:variation>
+    <a:lumMod val="60000"/>
+  </cs:variation>
+  <cs:variation>
+    <a:lumMod val="80000"/>
+    <a:lumOff val="20000"/>
+  </cs:variation>
+  <cs:variation>
+    <a:lumMod val="80000"/>
+  </cs:variation>
+  <cs:variation>
+    <a:lumMod val="60000"/>
+    <a:lumOff val="40000"/>
+  </cs:variation>
+  <cs:variation>
+    <a:lumMod val="50000"/>
+  </cs:variation>
+  <cs:variation>
+    <a:lumMod val="70000"/>
+    <a:lumOff val="30000"/>
+  </cs:variation>
+  <cs:variation>
+    <a:lumMod val="70000"/>
+  </cs:variation>
+  <cs:variation>
+    <a:lumMod val="50000"/>
+    <a:lumOff val="50000"/>
+  </cs:variation>
+</cs:colorStyle>
+</file>
+
+<file path=ppt/charts/colors2.xml><?xml version="1.0" encoding="utf-8"?>
+<cs:colorStyle xmlns:cs="http://schemas.microsoft.com/office/drawing/2012/chartStyle" xmlns:a="http://schemas.openxmlformats.org/drawingml/2006/main" meth="cycle" id="10">
+  <a:schemeClr val="accent1"/>
+  <a:schemeClr val="accent2"/>
+  <a:schemeClr val="accent3"/>
+  <a:schemeClr val="accent4"/>
+  <a:schemeClr val="accent5"/>
+  <a:schemeClr val="accent6"/>
+  <cs:variation/>
+  <cs:variation>
+    <a:lumMod val="60000"/>
+  </cs:variation>
+  <cs:variation>
+    <a:lumMod val="80000"/>
+    <a:lumOff val="20000"/>
+  </cs:variation>
+  <cs:variation>
+    <a:lumMod val="80000"/>
+  </cs:variation>
+  <cs:variation>
+    <a:lumMod val="60000"/>
+    <a:lumOff val="40000"/>
+  </cs:variation>
+  <cs:variation>
+    <a:lumMod val="50000"/>
+  </cs:variation>
+  <cs:variation>
+    <a:lumMod val="70000"/>
+    <a:lumOff val="30000"/>
+  </cs:variation>
+  <cs:variation>
+    <a:lumMod val="70000"/>
+  </cs:variation>
+  <cs:variation>
+    <a:lumMod val="50000"/>
+    <a:lumOff val="50000"/>
+  </cs:variation>
+</cs:colorStyle>
+</file>
+
+<file path=ppt/charts/style1.xml><?xml version="1.0" encoding="utf-8"?>
+<cs:chartStyle xmlns:cs="http://schemas.microsoft.com/office/drawing/2012/chartStyle" xmlns:a="http://schemas.openxmlformats.org/drawingml/2006/main" id="201">
+  <cs:axisTitle>
+    <cs:lnRef idx="0"/>
+    <cs:fillRef idx="0"/>
+    <cs:effectRef idx="0"/>
+    <cs:fontRef idx="minor">
+      <a:schemeClr val="tx1">
+        <a:lumMod val="65000"/>
+        <a:lumOff val="35000"/>
+      </a:schemeClr>
+    </cs:fontRef>
+    <cs:defRPr sz="1330" kern="1200"/>
+  </cs:axisTitle>
+  <cs:categoryAxis>
+    <cs:lnRef idx="0"/>
+    <cs:fillRef idx="0"/>
+    <cs:effectRef idx="0"/>
+    <cs:fontRef idx="minor">
+      <a:schemeClr val="tx1">
+        <a:lumMod val="65000"/>
+        <a:lumOff val="35000"/>
+      </a:schemeClr>
+    </cs:fontRef>
+    <cs:spPr>
+      <a:ln w="9525" cap="flat" cmpd="sng" algn="ctr">
+        <a:solidFill>
+          <a:schemeClr val="tx1">
+            <a:lumMod val="15000"/>
+            <a:lumOff val="85000"/>
+          </a:schemeClr>
+        </a:solidFill>
+        <a:round/>
+      </a:ln>
+    </cs:spPr>
+    <cs:defRPr sz="1197" kern="1200"/>
+  </cs:categoryAxis>
+  <cs:chartArea mods="allowNoFillOverride allowNoLineOverride">
+    <cs:lnRef idx="0"/>
+    <cs:fillRef idx="0"/>
+    <cs:effectRef idx="0"/>
+    <cs:fontRef idx="minor">
+      <a:schemeClr val="tx1"/>
+    </cs:fontRef>
+    <cs:spPr>
+      <a:solidFill>
+        <a:schemeClr val="bg1"/>
+      </a:solidFill>
+      <a:ln w="9525" cap="flat" cmpd="sng" algn="ctr">
+        <a:solidFill>
+          <a:schemeClr val="tx1">
+            <a:lumMod val="15000"/>
+            <a:lumOff val="85000"/>
+          </a:schemeClr>
+        </a:solidFill>
+        <a:round/>
+      </a:ln>
+    </cs:spPr>
+    <cs:defRPr sz="1330" kern="1200"/>
+  </cs:chartArea>
+  <cs:dataLabel>
+    <cs:lnRef idx="0"/>
+    <cs:fillRef idx="0"/>
+    <cs:effectRef idx="0"/>
+    <cs:fontRef idx="minor">
+      <a:schemeClr val="tx1">
+        <a:lumMod val="75000"/>
+        <a:lumOff val="25000"/>
+      </a:schemeClr>
+    </cs:fontRef>
+    <cs:defRPr sz="1197" kern="1200"/>
+  </cs:dataLabel>
+  <cs:dataLabelCallout>
+    <cs:lnRef idx="0"/>
+    <cs:fillRef idx="0"/>
+    <cs:effectRef idx="0"/>
+    <cs:fontRef idx="minor">
+      <a:schemeClr val="dk1">
+        <a:lumMod val="65000"/>
+        <a:lumOff val="35000"/>
+      </a:schemeClr>
+    </cs:fontRef>
+    <cs:spPr>
+      <a:solidFill>
+        <a:schemeClr val="lt1"/>
+      </a:solidFill>
+      <a:ln>
+        <a:solidFill>
+          <a:schemeClr val="dk1">
+            <a:lumMod val="25000"/>
+            <a:lumOff val="75000"/>
+          </a:schemeClr>
+        </a:solidFill>
+      </a:ln>
+    </cs:spPr>
+    <cs:defRPr sz="1197" kern="1200"/>
+    <cs:bodyPr rot="0" spcFirstLastPara="1" vertOverflow="clip" horzOverflow="clip" vert="horz" wrap="square" lIns="36576" tIns="18288" rIns="36576" bIns="18288" anchor="ctr" anchorCtr="1">
+      <a:spAutoFit/>
+    </cs:bodyPr>
+  </cs:dataLabelCallout>
+  <cs:dataPoint>
+    <cs:lnRef idx="0"/>
+    <cs:fillRef idx="1">
+      <cs:styleClr val="auto"/>
+    </cs:fillRef>
+    <cs:effectRef idx="0"/>
+    <cs:fontRef idx="minor">
+      <a:schemeClr val="tx1"/>
+    </cs:fontRef>
+  </cs:dataPoint>
+  <cs:dataPoint3D>
+    <cs:lnRef idx="0"/>
+    <cs:fillRef idx="1">
+      <cs:styleClr val="auto"/>
+    </cs:fillRef>
+    <cs:effectRef idx="0"/>
+    <cs:fontRef idx="minor">
+      <a:schemeClr val="tx1"/>
+    </cs:fontRef>
+  </cs:dataPoint3D>
+  <cs:dataPointLine>
+    <cs:lnRef idx="0">
+      <cs:styleClr val="auto"/>
+    </cs:lnRef>
+    <cs:fillRef idx="1"/>
+    <cs:effectRef idx="0"/>
+    <cs:fontRef idx="minor">
+      <a:schemeClr val="tx1"/>
+    </cs:fontRef>
+    <cs:spPr>
+      <a:ln w="28575" cap="rnd">
+        <a:solidFill>
+          <a:schemeClr val="phClr"/>
+        </a:solidFill>
+        <a:round/>
+      </a:ln>
+    </cs:spPr>
+  </cs:dataPointLine>
+  <cs:dataPointMarker>
+    <cs:lnRef idx="0">
+      <cs:styleClr val="auto"/>
+    </cs:lnRef>
+    <cs:fillRef idx="1">
+      <cs:styleClr val="auto"/>
+    </cs:fillRef>
+    <cs:effectRef idx="0"/>
+    <cs:fontRef idx="minor">
+      <a:schemeClr val="tx1"/>
+    </cs:fontRef>
+    <cs:spPr>
+      <a:ln w="9525">
+        <a:solidFill>
+          <a:schemeClr val="phClr"/>
+        </a:solidFill>
+      </a:ln>
+    </cs:spPr>
+  </cs:dataPointMarker>
+  <cs:dataPointMarkerLayout symbol="circle" size="5"/>
+  <cs:dataPointWireframe>
+    <cs:lnRef idx="0">
+      <cs:styleClr val="auto"/>
+    </cs:lnRef>
+    <cs:fillRef idx="1"/>
+    <cs:effectRef idx="0"/>
+    <cs:fontRef idx="minor">
+      <a:schemeClr val="tx1"/>
+    </cs:fontRef>
+    <cs:spPr>
+      <a:ln w="9525" cap="rnd">
+        <a:solidFill>
+          <a:schemeClr val="phClr"/>
+        </a:solidFill>
+        <a:round/>
+      </a:ln>
+    </cs:spPr>
+  </cs:dataPointWireframe>
+  <cs:dataTable>
+    <cs:lnRef idx="0"/>
+    <cs:fillRef idx="0"/>
+    <cs:effectRef idx="0"/>
+    <cs:fontRef idx="minor">
+      <a:schemeClr val="tx1">
+        <a:lumMod val="65000"/>
+        <a:lumOff val="35000"/>
+      </a:schemeClr>
+    </cs:fontRef>
+    <cs:spPr>
+      <a:noFill/>
+      <a:ln w="9525" cap="flat" cmpd="sng" algn="ctr">
+        <a:solidFill>
+          <a:schemeClr val="tx1">
+            <a:lumMod val="15000"/>
+            <a:lumOff val="85000"/>
+          </a:schemeClr>
+        </a:solidFill>
+        <a:round/>
+      </a:ln>
+    </cs:spPr>
+    <cs:defRPr sz="1197" kern="1200"/>
+  </cs:dataTable>
+  <cs:downBar>
+    <cs:lnRef idx="0"/>
+    <cs:fillRef idx="0"/>
+    <cs:effectRef idx="0"/>
+    <cs:fontRef idx="minor">
+      <a:schemeClr val="dk1"/>
+    </cs:fontRef>
+    <cs:spPr>
+      <a:solidFill>
+        <a:schemeClr val="dk1">
+          <a:lumMod val="65000"/>
+          <a:lumOff val="35000"/>
+        </a:schemeClr>
+      </a:solidFill>
+      <a:ln w="9525">
+        <a:solidFill>
+          <a:schemeClr val="tx1">
+            <a:lumMod val="65000"/>
+            <a:lumOff val="35000"/>
+          </a:schemeClr>
+        </a:solidFill>
+      </a:ln>
+    </cs:spPr>
+  </cs:downBar>
+  <cs:dropLine>
+    <cs:lnRef idx="0"/>
+    <cs:fillRef idx="0"/>
+    <cs:effectRef idx="0"/>
+    <cs:fontRef idx="minor">
+      <a:schemeClr val="tx1"/>
+    </cs:fontRef>
+    <cs:spPr>
+      <a:ln w="9525" cap="flat" cmpd="sng" algn="ctr">
+        <a:solidFill>
+          <a:schemeClr val="tx1">
+            <a:lumMod val="35000"/>
+            <a:lumOff val="65000"/>
+          </a:schemeClr>
+        </a:solidFill>
+        <a:round/>
+      </a:ln>
+    </cs:spPr>
+  </cs:dropLine>
+  <cs:errorBar>
+    <cs:lnRef idx="0"/>
+    <cs:fillRef idx="0"/>
+    <cs:effectRef idx="0"/>
+    <cs:fontRef idx="minor">
+      <a:schemeClr val="tx1"/>
+    </cs:fontRef>
+    <cs:spPr>
+      <a:ln w="9525" cap="flat" cmpd="sng" algn="ctr">
+        <a:solidFill>
+          <a:schemeClr val="tx1">
+            <a:lumMod val="65000"/>
+            <a:lumOff val="35000"/>
+          </a:schemeClr>
+        </a:solidFill>
+        <a:round/>
+      </a:ln>
+    </cs:spPr>
+  </cs:errorBar>
+  <cs:floor>
+    <cs:lnRef idx="0"/>
+    <cs:fillRef idx="0"/>
+    <cs:effectRef idx="0"/>
+    <cs:fontRef idx="minor">
+      <a:schemeClr val="tx1"/>
+    </cs:fontRef>
+    <cs:spPr>
+      <a:noFill/>
+      <a:ln>
+        <a:noFill/>
+      </a:ln>
+    </cs:spPr>
+  </cs:floor>
+  <cs:gridlineMajor>
+    <cs:lnRef idx="0"/>
+    <cs:fillRef idx="0"/>
+    <cs:effectRef idx="0"/>
+    <cs:fontRef idx="minor">
+      <a:schemeClr val="tx1"/>
+    </cs:fontRef>
+    <cs:spPr>
+      <a:ln w="9525" cap="flat" cmpd="sng" algn="ctr">
+        <a:solidFill>
+          <a:schemeClr val="tx1">
+            <a:lumMod val="15000"/>
+            <a:lumOff val="85000"/>
+          </a:schemeClr>
+        </a:solidFill>
+        <a:round/>
+      </a:ln>
+    </cs:spPr>
+  </cs:gridlineMajor>
+  <cs:gridlineMinor>
+    <cs:lnRef idx="0"/>
+    <cs:fillRef idx="0"/>
+    <cs:effectRef idx="0"/>
+    <cs:fontRef idx="minor">
+      <a:schemeClr val="tx1"/>
+    </cs:fontRef>
+    <cs:spPr>
+      <a:ln w="9525" cap="flat" cmpd="sng" algn="ctr">
+        <a:solidFill>
+          <a:schemeClr val="tx1">
+            <a:lumMod val="5000"/>
+            <a:lumOff val="95000"/>
+          </a:schemeClr>
+        </a:solidFill>
+        <a:round/>
+      </a:ln>
+    </cs:spPr>
+  </cs:gridlineMinor>
+  <cs:hiLoLine>
+    <cs:lnRef idx="0"/>
+    <cs:fillRef idx="0"/>
+    <cs:effectRef idx="0"/>
+    <cs:fontRef idx="minor">
+      <a:schemeClr val="tx1"/>
+    </cs:fontRef>
+    <cs:spPr>
+      <a:ln w="9525" cap="flat" cmpd="sng" algn="ctr">
+        <a:solidFill>
+          <a:schemeClr val="tx1">
+            <a:lumMod val="75000"/>
+            <a:lumOff val="25000"/>
+          </a:schemeClr>
+        </a:solidFill>
+        <a:round/>
+      </a:ln>
+    </cs:spPr>
+  </cs:hiLoLine>
+  <cs:leaderLine>
+    <cs:lnRef idx="0"/>
+    <cs:fillRef idx="0"/>
+    <cs:effectRef idx="0"/>
+    <cs:fontRef idx="minor">
+      <a:schemeClr val="tx1"/>
+    </cs:fontRef>
+    <cs:spPr>
+      <a:ln w="9525" cap="flat" cmpd="sng" algn="ctr">
+        <a:solidFill>
+          <a:schemeClr val="tx1">
+            <a:lumMod val="35000"/>
+            <a:lumOff val="65000"/>
+          </a:schemeClr>
+        </a:solidFill>
+        <a:round/>
+      </a:ln>
+    </cs:spPr>
+  </cs:leaderLine>
+  <cs:legend>
+    <cs:lnRef idx="0"/>
+    <cs:fillRef idx="0"/>
+    <cs:effectRef idx="0"/>
+    <cs:fontRef idx="minor">
+      <a:schemeClr val="tx1">
+        <a:lumMod val="65000"/>
+        <a:lumOff val="35000"/>
+      </a:schemeClr>
+    </cs:fontRef>
+    <cs:defRPr sz="1197" kern="1200"/>
+  </cs:legend>
+  <cs:plotArea mods="allowNoFillOverride allowNoLineOverride">
+    <cs:lnRef idx="0"/>
+    <cs:fillRef idx="0"/>
+    <cs:effectRef idx="0"/>
+    <cs:fontRef idx="minor">
+      <a:schemeClr val="tx1"/>
+    </cs:fontRef>
+  </cs:plotArea>
+  <cs:plotArea3D mods="allowNoFillOverride allowNoLineOverride">
+    <cs:lnRef idx="0"/>
+    <cs:fillRef idx="0"/>
+    <cs:effectRef idx="0"/>
+    <cs:fontRef idx="minor">
+      <a:schemeClr val="tx1"/>
+    </cs:fontRef>
+  </cs:plotArea3D>
+  <cs:seriesAxis>
+    <cs:lnRef idx="0"/>
+    <cs:fillRef idx="0"/>
+    <cs:effectRef idx="0"/>
+    <cs:fontRef idx="minor">
+      <a:schemeClr val="tx1">
+        <a:lumMod val="65000"/>
+        <a:lumOff val="35000"/>
+      </a:schemeClr>
+    </cs:fontRef>
+    <cs:defRPr sz="1197" kern="1200"/>
+  </cs:seriesAxis>
+  <cs:seriesLine>
+    <cs:lnRef idx="0"/>
+    <cs:fillRef idx="0"/>
+    <cs:effectRef idx="0"/>
+    <cs:fontRef idx="minor">
+      <a:schemeClr val="tx1"/>
+    </cs:fontRef>
+    <cs:spPr>
+      <a:ln w="9525" cap="flat" cmpd="sng" algn="ctr">
+        <a:solidFill>
+          <a:schemeClr val="tx1">
+            <a:lumMod val="35000"/>
+            <a:lumOff val="65000"/>
+          </a:schemeClr>
+        </a:solidFill>
+        <a:round/>
+      </a:ln>
+    </cs:spPr>
+  </cs:seriesLine>
+  <cs:title>
+    <cs:lnRef idx="0"/>
+    <cs:fillRef idx="0"/>
+    <cs:effectRef idx="0"/>
+    <cs:fontRef idx="minor">
+      <a:schemeClr val="tx1">
+        <a:lumMod val="65000"/>
+        <a:lumOff val="35000"/>
+      </a:schemeClr>
+    </cs:fontRef>
+    <cs:defRPr sz="1862" b="0" kern="1200" spc="0" baseline="0"/>
+  </cs:title>
+  <cs:trendline>
+    <cs:lnRef idx="0">
+      <cs:styleClr val="auto"/>
+    </cs:lnRef>
+    <cs:fillRef idx="0"/>
+    <cs:effectRef idx="0"/>
+    <cs:fontRef idx="minor">
+      <a:schemeClr val="tx1"/>
+    </cs:fontRef>
+    <cs:spPr>
+      <a:ln w="19050" cap="rnd">
+        <a:solidFill>
+          <a:schemeClr val="phClr"/>
+        </a:solidFill>
+        <a:prstDash val="sysDot"/>
+      </a:ln>
+    </cs:spPr>
+  </cs:trendline>
+  <cs:trendlineLabel>
+    <cs:lnRef idx="0"/>
+    <cs:fillRef idx="0"/>
+    <cs:effectRef idx="0"/>
+    <cs:fontRef idx="minor">
+      <a:schemeClr val="tx1">
+        <a:lumMod val="65000"/>
+        <a:lumOff val="35000"/>
+      </a:schemeClr>
+    </cs:fontRef>
+    <cs:defRPr sz="1197" kern="1200"/>
+  </cs:trendlineLabel>
+  <cs:upBar>
+    <cs:lnRef idx="0"/>
+    <cs:fillRef idx="0"/>
+    <cs:effectRef idx="0"/>
+    <cs:fontRef idx="minor">
+      <a:schemeClr val="dk1"/>
+    </cs:fontRef>
+    <cs:spPr>
+      <a:solidFill>
+        <a:schemeClr val="lt1"/>
+      </a:solidFill>
+      <a:ln w="9525">
+        <a:solidFill>
+          <a:schemeClr val="tx1">
+            <a:lumMod val="15000"/>
+            <a:lumOff val="85000"/>
+          </a:schemeClr>
+        </a:solidFill>
+      </a:ln>
+    </cs:spPr>
+  </cs:upBar>
+  <cs:valueAxis>
+    <cs:lnRef idx="0"/>
+    <cs:fillRef idx="0"/>
+    <cs:effectRef idx="0"/>
+    <cs:fontRef idx="minor">
+      <a:schemeClr val="tx1">
+        <a:lumMod val="65000"/>
+        <a:lumOff val="35000"/>
+      </a:schemeClr>
+    </cs:fontRef>
+    <cs:defRPr sz="1197" kern="1200"/>
+  </cs:valueAxis>
+  <cs:wall>
+    <cs:lnRef idx="0"/>
+    <cs:fillRef idx="0"/>
+    <cs:effectRef idx="0"/>
+    <cs:fontRef idx="minor">
+      <a:schemeClr val="tx1"/>
+    </cs:fontRef>
+    <cs:spPr>
+      <a:noFill/>
+      <a:ln>
+        <a:noFill/>
+      </a:ln>
+    </cs:spPr>
+  </cs:wall>
+</cs:chartStyle>
+</file>
+
+<file path=ppt/charts/style2.xml><?xml version="1.0" encoding="utf-8"?>
+<cs:chartStyle xmlns:cs="http://schemas.microsoft.com/office/drawing/2012/chartStyle" xmlns:a="http://schemas.openxmlformats.org/drawingml/2006/main" id="201">
+  <cs:axisTitle>
+    <cs:lnRef idx="0"/>
+    <cs:fillRef idx="0"/>
+    <cs:effectRef idx="0"/>
+    <cs:fontRef idx="minor">
+      <a:schemeClr val="tx1">
+        <a:lumMod val="65000"/>
+        <a:lumOff val="35000"/>
+      </a:schemeClr>
+    </cs:fontRef>
+    <cs:defRPr sz="1330" kern="1200"/>
+  </cs:axisTitle>
+  <cs:categoryAxis>
+    <cs:lnRef idx="0"/>
+    <cs:fillRef idx="0"/>
+    <cs:effectRef idx="0"/>
+    <cs:fontRef idx="minor">
+      <a:schemeClr val="tx1">
+        <a:lumMod val="65000"/>
+        <a:lumOff val="35000"/>
+      </a:schemeClr>
+    </cs:fontRef>
+    <cs:spPr>
+      <a:ln w="9525" cap="flat" cmpd="sng" algn="ctr">
+        <a:solidFill>
+          <a:schemeClr val="tx1">
+            <a:lumMod val="15000"/>
+            <a:lumOff val="85000"/>
+          </a:schemeClr>
+        </a:solidFill>
+        <a:round/>
+      </a:ln>
+    </cs:spPr>
+    <cs:defRPr sz="1197" kern="1200"/>
+  </cs:categoryAxis>
+  <cs:chartArea mods="allowNoFillOverride allowNoLineOverride">
+    <cs:lnRef idx="0"/>
+    <cs:fillRef idx="0"/>
+    <cs:effectRef idx="0"/>
+    <cs:fontRef idx="minor">
+      <a:schemeClr val="tx1"/>
+    </cs:fontRef>
+    <cs:spPr>
+      <a:solidFill>
+        <a:schemeClr val="bg1"/>
+      </a:solidFill>
+      <a:ln w="9525" cap="flat" cmpd="sng" algn="ctr">
+        <a:solidFill>
+          <a:schemeClr val="tx1">
+            <a:lumMod val="15000"/>
+            <a:lumOff val="85000"/>
+          </a:schemeClr>
+        </a:solidFill>
+        <a:round/>
+      </a:ln>
+    </cs:spPr>
+    <cs:defRPr sz="1330" kern="1200"/>
+  </cs:chartArea>
+  <cs:dataLabel>
+    <cs:lnRef idx="0"/>
+    <cs:fillRef idx="0"/>
+    <cs:effectRef idx="0"/>
+    <cs:fontRef idx="minor">
+      <a:schemeClr val="tx1">
+        <a:lumMod val="75000"/>
+        <a:lumOff val="25000"/>
+      </a:schemeClr>
+    </cs:fontRef>
+    <cs:defRPr sz="1197" kern="1200"/>
+  </cs:dataLabel>
+  <cs:dataLabelCallout>
+    <cs:lnRef idx="0"/>
+    <cs:fillRef idx="0"/>
+    <cs:effectRef idx="0"/>
+    <cs:fontRef idx="minor">
+      <a:schemeClr val="dk1">
+        <a:lumMod val="65000"/>
+        <a:lumOff val="35000"/>
+      </a:schemeClr>
+    </cs:fontRef>
+    <cs:spPr>
+      <a:solidFill>
+        <a:schemeClr val="lt1"/>
+      </a:solidFill>
+      <a:ln>
+        <a:solidFill>
+          <a:schemeClr val="dk1">
+            <a:lumMod val="25000"/>
+            <a:lumOff val="75000"/>
+          </a:schemeClr>
+        </a:solidFill>
+      </a:ln>
+    </cs:spPr>
+    <cs:defRPr sz="1197" kern="1200"/>
+    <cs:bodyPr rot="0" spcFirstLastPara="1" vertOverflow="clip" horzOverflow="clip" vert="horz" wrap="square" lIns="36576" tIns="18288" rIns="36576" bIns="18288" anchor="ctr" anchorCtr="1">
+      <a:spAutoFit/>
+    </cs:bodyPr>
+  </cs:dataLabelCallout>
+  <cs:dataPoint>
+    <cs:lnRef idx="0"/>
+    <cs:fillRef idx="1">
+      <cs:styleClr val="auto"/>
+    </cs:fillRef>
+    <cs:effectRef idx="0"/>
+    <cs:fontRef idx="minor">
+      <a:schemeClr val="tx1"/>
+    </cs:fontRef>
+  </cs:dataPoint>
+  <cs:dataPoint3D>
+    <cs:lnRef idx="0"/>
+    <cs:fillRef idx="1">
+      <cs:styleClr val="auto"/>
+    </cs:fillRef>
+    <cs:effectRef idx="0"/>
+    <cs:fontRef idx="minor">
+      <a:schemeClr val="tx1"/>
+    </cs:fontRef>
+  </cs:dataPoint3D>
+  <cs:dataPointLine>
+    <cs:lnRef idx="0">
+      <cs:styleClr val="auto"/>
+    </cs:lnRef>
+    <cs:fillRef idx="1"/>
+    <cs:effectRef idx="0"/>
+    <cs:fontRef idx="minor">
+      <a:schemeClr val="tx1"/>
+    </cs:fontRef>
+    <cs:spPr>
+      <a:ln w="28575" cap="rnd">
+        <a:solidFill>
+          <a:schemeClr val="phClr"/>
+        </a:solidFill>
+        <a:round/>
+      </a:ln>
+    </cs:spPr>
+  </cs:dataPointLine>
+  <cs:dataPointMarker>
+    <cs:lnRef idx="0">
+      <cs:styleClr val="auto"/>
+    </cs:lnRef>
+    <cs:fillRef idx="1">
+      <cs:styleClr val="auto"/>
+    </cs:fillRef>
+    <cs:effectRef idx="0"/>
+    <cs:fontRef idx="minor">
+      <a:schemeClr val="tx1"/>
+    </cs:fontRef>
+    <cs:spPr>
+      <a:ln w="9525">
+        <a:solidFill>
+          <a:schemeClr val="phClr"/>
+        </a:solidFill>
+      </a:ln>
+    </cs:spPr>
+  </cs:dataPointMarker>
+  <cs:dataPointMarkerLayout symbol="circle" size="5"/>
+  <cs:dataPointWireframe>
+    <cs:lnRef idx="0">
+      <cs:styleClr val="auto"/>
+    </cs:lnRef>
+    <cs:fillRef idx="1"/>
+    <cs:effectRef idx="0"/>
+    <cs:fontRef idx="minor">
+      <a:schemeClr val="tx1"/>
+    </cs:fontRef>
+    <cs:spPr>
+      <a:ln w="9525" cap="rnd">
+        <a:solidFill>
+          <a:schemeClr val="phClr"/>
+        </a:solidFill>
+        <a:round/>
+      </a:ln>
+    </cs:spPr>
+  </cs:dataPointWireframe>
+  <cs:dataTable>
+    <cs:lnRef idx="0"/>
+    <cs:fillRef idx="0"/>
+    <cs:effectRef idx="0"/>
+    <cs:fontRef idx="minor">
+      <a:schemeClr val="tx1">
+        <a:lumMod val="65000"/>
+        <a:lumOff val="35000"/>
+      </a:schemeClr>
+    </cs:fontRef>
+    <cs:spPr>
+      <a:noFill/>
+      <a:ln w="9525" cap="flat" cmpd="sng" algn="ctr">
+        <a:solidFill>
+          <a:schemeClr val="tx1">
+            <a:lumMod val="15000"/>
+            <a:lumOff val="85000"/>
+          </a:schemeClr>
+        </a:solidFill>
+        <a:round/>
+      </a:ln>
+    </cs:spPr>
+    <cs:defRPr sz="1197" kern="1200"/>
+  </cs:dataTable>
+  <cs:downBar>
+    <cs:lnRef idx="0"/>
+    <cs:fillRef idx="0"/>
+    <cs:effectRef idx="0"/>
+    <cs:fontRef idx="minor">
+      <a:schemeClr val="dk1"/>
+    </cs:fontRef>
+    <cs:spPr>
+      <a:solidFill>
+        <a:schemeClr val="dk1">
+          <a:lumMod val="65000"/>
+          <a:lumOff val="35000"/>
+        </a:schemeClr>
+      </a:solidFill>
+      <a:ln w="9525">
+        <a:solidFill>
+          <a:schemeClr val="tx1">
+            <a:lumMod val="65000"/>
+            <a:lumOff val="35000"/>
+          </a:schemeClr>
+        </a:solidFill>
+      </a:ln>
+    </cs:spPr>
+  </cs:downBar>
+  <cs:dropLine>
+    <cs:lnRef idx="0"/>
+    <cs:fillRef idx="0"/>
+    <cs:effectRef idx="0"/>
+    <cs:fontRef idx="minor">
+      <a:schemeClr val="tx1"/>
+    </cs:fontRef>
+    <cs:spPr>
+      <a:ln w="9525" cap="flat" cmpd="sng" algn="ctr">
+        <a:solidFill>
+          <a:schemeClr val="tx1">
+            <a:lumMod val="35000"/>
+            <a:lumOff val="65000"/>
+          </a:schemeClr>
+        </a:solidFill>
+        <a:round/>
+      </a:ln>
+    </cs:spPr>
+  </cs:dropLine>
+  <cs:errorBar>
+    <cs:lnRef idx="0"/>
+    <cs:fillRef idx="0"/>
+    <cs:effectRef idx="0"/>
+    <cs:fontRef idx="minor">
+      <a:schemeClr val="tx1"/>
+    </cs:fontRef>
+    <cs:spPr>
+      <a:ln w="9525" cap="flat" cmpd="sng" algn="ctr">
+        <a:solidFill>
+          <a:schemeClr val="tx1">
+            <a:lumMod val="65000"/>
+            <a:lumOff val="35000"/>
+          </a:schemeClr>
+        </a:solidFill>
+        <a:round/>
+      </a:ln>
+    </cs:spPr>
+  </cs:errorBar>
+  <cs:floor>
+    <cs:lnRef idx="0"/>
+    <cs:fillRef idx="0"/>
+    <cs:effectRef idx="0"/>
+    <cs:fontRef idx="minor">
+      <a:schemeClr val="tx1"/>
+    </cs:fontRef>
+    <cs:spPr>
+      <a:noFill/>
+      <a:ln>
+        <a:noFill/>
+      </a:ln>
+    </cs:spPr>
+  </cs:floor>
+  <cs:gridlineMajor>
+    <cs:lnRef idx="0"/>
+    <cs:fillRef idx="0"/>
+    <cs:effectRef idx="0"/>
+    <cs:fontRef idx="minor">
+      <a:schemeClr val="tx1"/>
+    </cs:fontRef>
+    <cs:spPr>
+      <a:ln w="9525" cap="flat" cmpd="sng" algn="ctr">
+        <a:solidFill>
+          <a:schemeClr val="tx1">
+            <a:lumMod val="15000"/>
+            <a:lumOff val="85000"/>
+          </a:schemeClr>
+        </a:solidFill>
+        <a:round/>
+      </a:ln>
+    </cs:spPr>
+  </cs:gridlineMajor>
+  <cs:gridlineMinor>
+    <cs:lnRef idx="0"/>
+    <cs:fillRef idx="0"/>
+    <cs:effectRef idx="0"/>
+    <cs:fontRef idx="minor">
+      <a:schemeClr val="tx1"/>
+    </cs:fontRef>
+    <cs:spPr>
+      <a:ln w="9525" cap="flat" cmpd="sng" algn="ctr">
+        <a:solidFill>
+          <a:schemeClr val="tx1">
+            <a:lumMod val="5000"/>
+            <a:lumOff val="95000"/>
+          </a:schemeClr>
+        </a:solidFill>
+        <a:round/>
+      </a:ln>
+    </cs:spPr>
+  </cs:gridlineMinor>
+  <cs:hiLoLine>
+    <cs:lnRef idx="0"/>
+    <cs:fillRef idx="0"/>
+    <cs:effectRef idx="0"/>
+    <cs:fontRef idx="minor">
+      <a:schemeClr val="tx1"/>
+    </cs:fontRef>
+    <cs:spPr>
+      <a:ln w="9525" cap="flat" cmpd="sng" algn="ctr">
+        <a:solidFill>
+          <a:schemeClr val="tx1">
+            <a:lumMod val="75000"/>
+            <a:lumOff val="25000"/>
+          </a:schemeClr>
+        </a:solidFill>
+        <a:round/>
+      </a:ln>
+    </cs:spPr>
+  </cs:hiLoLine>
+  <cs:leaderLine>
+    <cs:lnRef idx="0"/>
+    <cs:fillRef idx="0"/>
+    <cs:effectRef idx="0"/>
+    <cs:fontRef idx="minor">
+      <a:schemeClr val="tx1"/>
+    </cs:fontRef>
+    <cs:spPr>
+      <a:ln w="9525" cap="flat" cmpd="sng" algn="ctr">
+        <a:solidFill>
+          <a:schemeClr val="tx1">
+            <a:lumMod val="35000"/>
+            <a:lumOff val="65000"/>
+          </a:schemeClr>
+        </a:solidFill>
+        <a:round/>
+      </a:ln>
+    </cs:spPr>
+  </cs:leaderLine>
+  <cs:legend>
+    <cs:lnRef idx="0"/>
+    <cs:fillRef idx="0"/>
+    <cs:effectRef idx="0"/>
+    <cs:fontRef idx="minor">
+      <a:schemeClr val="tx1">
+        <a:lumMod val="65000"/>
+        <a:lumOff val="35000"/>
+      </a:schemeClr>
+    </cs:fontRef>
+    <cs:defRPr sz="1197" kern="1200"/>
+  </cs:legend>
+  <cs:plotArea mods="allowNoFillOverride allowNoLineOverride">
+    <cs:lnRef idx="0"/>
+    <cs:fillRef idx="0"/>
+    <cs:effectRef idx="0"/>
+    <cs:fontRef idx="minor">
+      <a:schemeClr val="tx1"/>
+    </cs:fontRef>
+  </cs:plotArea>
+  <cs:plotArea3D mods="allowNoFillOverride allowNoLineOverride">
+    <cs:lnRef idx="0"/>
+    <cs:fillRef idx="0"/>
+    <cs:effectRef idx="0"/>
+    <cs:fontRef idx="minor">
+      <a:schemeClr val="tx1"/>
+    </cs:fontRef>
+  </cs:plotArea3D>
+  <cs:seriesAxis>
+    <cs:lnRef idx="0"/>
+    <cs:fillRef idx="0"/>
+    <cs:effectRef idx="0"/>
+    <cs:fontRef idx="minor">
+      <a:schemeClr val="tx1">
+        <a:lumMod val="65000"/>
+        <a:lumOff val="35000"/>
+      </a:schemeClr>
+    </cs:fontRef>
+    <cs:defRPr sz="1197" kern="1200"/>
+  </cs:seriesAxis>
+  <cs:seriesLine>
+    <cs:lnRef idx="0"/>
+    <cs:fillRef idx="0"/>
+    <cs:effectRef idx="0"/>
+    <cs:fontRef idx="minor">
+      <a:schemeClr val="tx1"/>
+    </cs:fontRef>
+    <cs:spPr>
+      <a:ln w="9525" cap="flat" cmpd="sng" algn="ctr">
+        <a:solidFill>
+          <a:schemeClr val="tx1">
+            <a:lumMod val="35000"/>
+            <a:lumOff val="65000"/>
+          </a:schemeClr>
+        </a:solidFill>
+        <a:round/>
+      </a:ln>
+    </cs:spPr>
+  </cs:seriesLine>
+  <cs:title>
+    <cs:lnRef idx="0"/>
+    <cs:fillRef idx="0"/>
+    <cs:effectRef idx="0"/>
+    <cs:fontRef idx="minor">
+      <a:schemeClr val="tx1">
+        <a:lumMod val="65000"/>
+        <a:lumOff val="35000"/>
+      </a:schemeClr>
+    </cs:fontRef>
+    <cs:defRPr sz="1862" b="0" kern="1200" spc="0" baseline="0"/>
+  </cs:title>
+  <cs:trendline>
+    <cs:lnRef idx="0">
+      <cs:styleClr val="auto"/>
+    </cs:lnRef>
+    <cs:fillRef idx="0"/>
+    <cs:effectRef idx="0"/>
+    <cs:fontRef idx="minor">
+      <a:schemeClr val="tx1"/>
+    </cs:fontRef>
+    <cs:spPr>
+      <a:ln w="19050" cap="rnd">
+        <a:solidFill>
+          <a:schemeClr val="phClr"/>
+        </a:solidFill>
+        <a:prstDash val="sysDot"/>
+      </a:ln>
+    </cs:spPr>
+  </cs:trendline>
+  <cs:trendlineLabel>
+    <cs:lnRef idx="0"/>
+    <cs:fillRef idx="0"/>
+    <cs:effectRef idx="0"/>
+    <cs:fontRef idx="minor">
+      <a:schemeClr val="tx1">
+        <a:lumMod val="65000"/>
+        <a:lumOff val="35000"/>
+      </a:schemeClr>
+    </cs:fontRef>
+    <cs:defRPr sz="1197" kern="1200"/>
+  </cs:trendlineLabel>
+  <cs:upBar>
+    <cs:lnRef idx="0"/>
+    <cs:fillRef idx="0"/>
+    <cs:effectRef idx="0"/>
+    <cs:fontRef idx="minor">
+      <a:schemeClr val="dk1"/>
+    </cs:fontRef>
+    <cs:spPr>
+      <a:solidFill>
+        <a:schemeClr val="lt1"/>
+      </a:solidFill>
+      <a:ln w="9525">
+        <a:solidFill>
+          <a:schemeClr val="tx1">
+            <a:lumMod val="15000"/>
+            <a:lumOff val="85000"/>
+          </a:schemeClr>
+        </a:solidFill>
+      </a:ln>
+    </cs:spPr>
+  </cs:upBar>
+  <cs:valueAxis>
+    <cs:lnRef idx="0"/>
+    <cs:fillRef idx="0"/>
+    <cs:effectRef idx="0"/>
+    <cs:fontRef idx="minor">
+      <a:schemeClr val="tx1">
+        <a:lumMod val="65000"/>
+        <a:lumOff val="35000"/>
+      </a:schemeClr>
+    </cs:fontRef>
+    <cs:defRPr sz="1197" kern="1200"/>
+  </cs:valueAxis>
+  <cs:wall>
+    <cs:lnRef idx="0"/>
+    <cs:fillRef idx="0"/>
+    <cs:effectRef idx="0"/>
+    <cs:fontRef idx="minor">
+      <a:schemeClr val="tx1"/>
+    </cs:fontRef>
+    <cs:spPr>
+      <a:noFill/>
+      <a:ln>
+        <a:noFill/>
+      </a:ln>
+    </cs:spPr>
+  </cs:wall>
+</cs:chartStyle>
 </file>
 
 <file path=ppt/handoutMasters/handoutMaster1.xml><?xml version="1.0" encoding="utf-8"?>
@@ -3962,22 +5880,107 @@
           <a:p>
             <a:r>
               <a:rPr lang="en-US" altLang="zh-CN" dirty="0" smtClean="0"/>
-              <a:t>Version Log</a:t>
+              <a:t>RUN TIME</a:t>
             </a:r>
             <a:endParaRPr lang="zh-CN" altLang="en-US" dirty="0"/>
           </a:p>
         </p:txBody>
       </p:sp>
-      <p:sp>
-        <p:nvSpPr>
-          <p:cNvPr id="6" name="TextBox 5"/>
+      <p:graphicFrame>
+        <p:nvGraphicFramePr>
+          <p:cNvPr id="10" name="Chart 9"/>
+          <p:cNvGraphicFramePr/>
+          <p:nvPr>
+            <p:extLst>
+              <p:ext uri="{D42A27DB-BD31-4B8C-83A1-F6EECF244321}">
+                <p14:modId xmlns:p14="http://schemas.microsoft.com/office/powerpoint/2010/main" val="618729788"/>
+              </p:ext>
+            </p:extLst>
+          </p:nvPr>
+        </p:nvGraphicFramePr>
+        <p:xfrm>
+          <a:off x="1221793" y="2504069"/>
+          <a:ext cx="4606488" cy="3319632"/>
+        </p:xfrm>
+        <a:graphic>
+          <a:graphicData uri="http://schemas.openxmlformats.org/drawingml/2006/chart">
+            <c:chart xmlns:c="http://schemas.openxmlformats.org/drawingml/2006/chart" xmlns:r="http://schemas.openxmlformats.org/officeDocument/2006/relationships" r:id="rId2"/>
+          </a:graphicData>
+        </a:graphic>
+      </p:graphicFrame>
+      <p:sp>
+        <p:nvSpPr>
+          <p:cNvPr id="11" name="Rectangle 10"/>
+          <p:cNvSpPr/>
+          <p:nvPr/>
+        </p:nvSpPr>
+        <p:spPr>
+          <a:xfrm>
+            <a:off x="6617282" y="1464695"/>
+            <a:ext cx="1565365" cy="369332"/>
+          </a:xfrm>
+          <a:prstGeom prst="rect">
+            <a:avLst/>
+          </a:prstGeom>
+        </p:spPr>
+        <p:txBody>
+          <a:bodyPr wrap="none">
+            <a:spAutoFit/>
+          </a:bodyPr>
+          <a:lstStyle/>
+          <a:p>
+            <a:r>
+              <a:rPr lang="en-US" altLang="zh-CN" dirty="0" smtClean="0"/>
+              <a:t>PAB</a:t>
+            </a:r>
+            <a:r>
+              <a:rPr lang="zh-CN" altLang="en-US" dirty="0" smtClean="0"/>
+              <a:t>（</a:t>
+            </a:r>
+            <a:r>
+              <a:rPr lang="en-US" altLang="zh-CN" dirty="0" smtClean="0"/>
+              <a:t>PSD</a:t>
+            </a:r>
+            <a:r>
+              <a:rPr lang="zh-CN" altLang="en-US" dirty="0" smtClean="0"/>
+              <a:t>）</a:t>
+            </a:r>
+            <a:endParaRPr lang="zh-CN" altLang="en-US" dirty="0"/>
+          </a:p>
+        </p:txBody>
+      </p:sp>
+      <p:graphicFrame>
+        <p:nvGraphicFramePr>
+          <p:cNvPr id="12" name="Chart 11"/>
+          <p:cNvGraphicFramePr/>
+          <p:nvPr>
+            <p:extLst>
+              <p:ext uri="{D42A27DB-BD31-4B8C-83A1-F6EECF244321}">
+                <p14:modId xmlns:p14="http://schemas.microsoft.com/office/powerpoint/2010/main" val="2675945974"/>
+              </p:ext>
+            </p:extLst>
+          </p:nvPr>
+        </p:nvGraphicFramePr>
+        <p:xfrm>
+          <a:off x="6978580" y="2504069"/>
+          <a:ext cx="4606488" cy="3319632"/>
+        </p:xfrm>
+        <a:graphic>
+          <a:graphicData uri="http://schemas.openxmlformats.org/drawingml/2006/chart">
+            <c:chart xmlns:c="http://schemas.openxmlformats.org/drawingml/2006/chart" xmlns:r="http://schemas.openxmlformats.org/officeDocument/2006/relationships" r:id="rId3"/>
+          </a:graphicData>
+        </a:graphic>
+      </p:graphicFrame>
+      <p:sp>
+        <p:nvSpPr>
+          <p:cNvPr id="13" name="TextBox 12"/>
           <p:cNvSpPr txBox="1"/>
           <p:nvPr/>
         </p:nvSpPr>
         <p:spPr>
           <a:xfrm>
-            <a:off x="753626" y="1423713"/>
-            <a:ext cx="4059372" cy="1242254"/>
+            <a:off x="924232" y="1924015"/>
+            <a:ext cx="648502" cy="365091"/>
           </a:xfrm>
           <a:prstGeom prst="rect">
             <a:avLst/>
@@ -4008,6 +6011,180 @@
                   </a:schemeClr>
                 </a:solidFill>
               </a:rPr>
+              <a:t>SB</a:t>
+            </a:r>
+            <a:endParaRPr lang="zh-CN" altLang="en-US" sz="2000" dirty="0" err="1" smtClean="0">
+              <a:solidFill>
+                <a:schemeClr val="tx1">
+                  <a:lumMod val="50000"/>
+                </a:schemeClr>
+              </a:solidFill>
+            </a:endParaRPr>
+          </a:p>
+        </p:txBody>
+      </p:sp>
+    </p:spTree>
+    <p:extLst>
+      <p:ext uri="{BB962C8B-B14F-4D97-AF65-F5344CB8AC3E}">
+        <p14:creationId xmlns:p14="http://schemas.microsoft.com/office/powerpoint/2010/main" val="1564830514"/>
+      </p:ext>
+    </p:extLst>
+  </p:cSld>
+  <p:clrMapOvr>
+    <a:masterClrMapping/>
+  </p:clrMapOvr>
+</p:sld>
+</file>
+
+<file path=ppt/slides/slide12.xml><?xml version="1.0" encoding="utf-8"?>
+<p:sld xmlns:a="http://schemas.openxmlformats.org/drawingml/2006/main" xmlns:r="http://schemas.openxmlformats.org/officeDocument/2006/relationships" xmlns:p="http://schemas.openxmlformats.org/presentationml/2006/main">
+  <p:cSld>
+    <p:spTree>
+      <p:nvGrpSpPr>
+        <p:cNvPr id="1" name=""/>
+        <p:cNvGrpSpPr/>
+        <p:nvPr/>
+      </p:nvGrpSpPr>
+      <p:grpSpPr>
+        <a:xfrm>
+          <a:off x="0" y="0"/>
+          <a:ext cx="0" cy="0"/>
+          <a:chOff x="0" y="0"/>
+          <a:chExt cx="0" cy="0"/>
+        </a:xfrm>
+      </p:grpSpPr>
+      <p:sp>
+        <p:nvSpPr>
+          <p:cNvPr id="2" name="Date Placeholder 1"/>
+          <p:cNvSpPr>
+            <a:spLocks noGrp="1"/>
+          </p:cNvSpPr>
+          <p:nvPr>
+            <p:ph type="dt" sz="half" idx="10"/>
+          </p:nvPr>
+        </p:nvSpPr>
+        <p:spPr/>
+        <p:txBody>
+          <a:bodyPr/>
+          <a:lstStyle/>
+          <a:p>
+            <a:r>
+              <a:rPr lang="en-US" noProof="0" smtClean="0"/>
+              <a:t>March 24, 2017</a:t>
+            </a:r>
+            <a:endParaRPr lang="en-US" noProof="0" dirty="0"/>
+          </a:p>
+        </p:txBody>
+      </p:sp>
+      <p:sp>
+        <p:nvSpPr>
+          <p:cNvPr id="3" name="Footer Placeholder 2"/>
+          <p:cNvSpPr>
+            <a:spLocks noGrp="1"/>
+          </p:cNvSpPr>
+          <p:nvPr>
+            <p:ph type="ftr" sz="quarter" idx="11"/>
+          </p:nvPr>
+        </p:nvSpPr>
+        <p:spPr/>
+        <p:txBody>
+          <a:bodyPr/>
+          <a:lstStyle/>
+          <a:p>
+            <a:r>
+              <a:rPr lang="en-US" noProof="0" smtClean="0"/>
+              <a:t>Autoliv General Presentation 2017</a:t>
+            </a:r>
+            <a:endParaRPr lang="en-US" noProof="0" dirty="0"/>
+          </a:p>
+        </p:txBody>
+      </p:sp>
+      <p:sp>
+        <p:nvSpPr>
+          <p:cNvPr id="4" name="Slide Number Placeholder 3"/>
+          <p:cNvSpPr>
+            <a:spLocks noGrp="1"/>
+          </p:cNvSpPr>
+          <p:nvPr>
+            <p:ph type="sldNum" sz="quarter" idx="12"/>
+          </p:nvPr>
+        </p:nvSpPr>
+        <p:spPr/>
+        <p:txBody>
+          <a:bodyPr/>
+          <a:lstStyle/>
+          <a:p>
+            <a:fld id="{7E74F4B1-9ADB-4B50-83D6-797B7B30BEA4}" type="slidenum">
+              <a:rPr lang="en-US" noProof="0" smtClean="0"/>
+              <a:t>12</a:t>
+            </a:fld>
+            <a:endParaRPr lang="en-US" noProof="0" dirty="0"/>
+          </a:p>
+        </p:txBody>
+      </p:sp>
+      <p:sp>
+        <p:nvSpPr>
+          <p:cNvPr id="5" name="Text Placeholder 4"/>
+          <p:cNvSpPr>
+            <a:spLocks noGrp="1"/>
+          </p:cNvSpPr>
+          <p:nvPr>
+            <p:ph type="body" sz="quarter" idx="17"/>
+          </p:nvPr>
+        </p:nvSpPr>
+        <p:spPr/>
+        <p:txBody>
+          <a:bodyPr/>
+          <a:lstStyle/>
+          <a:p>
+            <a:r>
+              <a:rPr lang="en-US" altLang="zh-CN" dirty="0" smtClean="0"/>
+              <a:t>Version Log</a:t>
+            </a:r>
+            <a:endParaRPr lang="zh-CN" altLang="en-US" dirty="0"/>
+          </a:p>
+        </p:txBody>
+      </p:sp>
+      <p:sp>
+        <p:nvSpPr>
+          <p:cNvPr id="6" name="TextBox 5"/>
+          <p:cNvSpPr txBox="1"/>
+          <p:nvPr/>
+        </p:nvSpPr>
+        <p:spPr>
+          <a:xfrm>
+            <a:off x="591793" y="1360318"/>
+            <a:ext cx="9458218" cy="5335682"/>
+          </a:xfrm>
+          <a:prstGeom prst="rect">
+            <a:avLst/>
+          </a:prstGeom>
+          <a:noFill/>
+        </p:spPr>
+        <p:txBody>
+          <a:bodyPr wrap="square" lIns="36000" tIns="36000" rIns="36000" bIns="36000" rtlCol="0" anchor="ctr" anchorCtr="0">
+            <a:spAutoFit/>
+          </a:bodyPr>
+          <a:lstStyle/>
+          <a:p>
+            <a:pPr marL="230400" indent="-230400">
+              <a:lnSpc>
+                <a:spcPct val="95000"/>
+              </a:lnSpc>
+              <a:buClr>
+                <a:schemeClr val="accent1"/>
+              </a:buClr>
+              <a:buFont typeface="Wingdings" panose="05000000000000000000" pitchFamily="2" charset="2"/>
+              <a:buChar char="§"/>
+            </a:pPr>
+            <a:r>
+              <a:rPr lang="en-US" altLang="zh-CN" sz="2000" dirty="0">
+                <a:solidFill>
+                  <a:schemeClr val="tx1">
+                    <a:lumMod val="50000"/>
+                  </a:schemeClr>
+                </a:solidFill>
+              </a:rPr>
               <a:t>20180518</a:t>
             </a:r>
           </a:p>
@@ -4090,7 +6267,493 @@
               </a:rPr>
               <a:t>Automatic achieve title for directory</a:t>
             </a:r>
-            <a:endParaRPr lang="zh-CN" altLang="en-US" sz="2000" dirty="0" err="1" smtClean="0">
+          </a:p>
+          <a:p>
+            <a:pPr>
+              <a:lnSpc>
+                <a:spcPct val="95000"/>
+              </a:lnSpc>
+              <a:buClr>
+                <a:schemeClr val="accent1"/>
+              </a:buClr>
+            </a:pPr>
+            <a:endParaRPr lang="en-US" altLang="zh-CN" sz="2000" dirty="0">
+              <a:solidFill>
+                <a:schemeClr val="tx1">
+                  <a:lumMod val="50000"/>
+                </a:schemeClr>
+              </a:solidFill>
+            </a:endParaRPr>
+          </a:p>
+          <a:p>
+            <a:pPr marL="342900" indent="-342900">
+              <a:lnSpc>
+                <a:spcPct val="95000"/>
+              </a:lnSpc>
+              <a:buClr>
+                <a:schemeClr val="accent1"/>
+              </a:buClr>
+              <a:buFont typeface="Wingdings" panose="05000000000000000000" pitchFamily="2" charset="2"/>
+              <a:buChar char="n"/>
+            </a:pPr>
+            <a:r>
+              <a:rPr lang="en-US" altLang="zh-CN" sz="2000" dirty="0" smtClean="0">
+                <a:solidFill>
+                  <a:schemeClr val="tx1">
+                    <a:lumMod val="50000"/>
+                  </a:schemeClr>
+                </a:solidFill>
+              </a:rPr>
+              <a:t>20180606</a:t>
+            </a:r>
+          </a:p>
+          <a:p>
+            <a:pPr>
+              <a:lnSpc>
+                <a:spcPct val="95000"/>
+              </a:lnSpc>
+              <a:buClr>
+                <a:schemeClr val="accent1"/>
+              </a:buClr>
+            </a:pPr>
+            <a:r>
+              <a:rPr lang="en-US" altLang="zh-CN" sz="2000" dirty="0" err="1" smtClean="0">
+                <a:solidFill>
+                  <a:schemeClr val="tx1">
+                    <a:lumMod val="50000"/>
+                  </a:schemeClr>
+                </a:solidFill>
+              </a:rPr>
+              <a:t>SBSession</a:t>
+            </a:r>
+            <a:r>
+              <a:rPr lang="en-US" altLang="zh-CN" sz="2000" dirty="0" smtClean="0">
+                <a:solidFill>
+                  <a:schemeClr val="tx1">
+                    <a:lumMod val="50000"/>
+                  </a:schemeClr>
+                </a:solidFill>
+              </a:rPr>
+              <a:t> check </a:t>
+            </a:r>
+            <a:r>
+              <a:rPr lang="en-US" altLang="zh-CN" sz="2000" dirty="0" err="1" smtClean="0">
+                <a:solidFill>
+                  <a:schemeClr val="tx1">
+                    <a:lumMod val="50000"/>
+                  </a:schemeClr>
+                </a:solidFill>
+              </a:rPr>
+              <a:t>coord</a:t>
+            </a:r>
+            <a:r>
+              <a:rPr lang="en-US" altLang="zh-CN" sz="2000" dirty="0" smtClean="0">
+                <a:solidFill>
+                  <a:schemeClr val="tx1">
+                    <a:lumMod val="50000"/>
+                  </a:schemeClr>
+                </a:solidFill>
+              </a:rPr>
+              <a:t> -&gt; spring</a:t>
+            </a:r>
+            <a:r>
+              <a:rPr lang="zh-CN" altLang="en-US" sz="2000" dirty="0" smtClean="0">
+                <a:solidFill>
+                  <a:schemeClr val="tx1">
+                    <a:lumMod val="50000"/>
+                  </a:schemeClr>
+                </a:solidFill>
+              </a:rPr>
+              <a:t>（</a:t>
+            </a:r>
+            <a:r>
+              <a:rPr lang="en-US" altLang="zh-CN" sz="2000" dirty="0" smtClean="0">
+                <a:solidFill>
+                  <a:schemeClr val="tx1">
+                    <a:lumMod val="50000"/>
+                  </a:schemeClr>
+                </a:solidFill>
+              </a:rPr>
+              <a:t>discrete element</a:t>
+            </a:r>
+            <a:r>
+              <a:rPr lang="zh-CN" altLang="en-US" sz="2000" dirty="0" smtClean="0">
+                <a:solidFill>
+                  <a:schemeClr val="tx1">
+                    <a:lumMod val="50000"/>
+                  </a:schemeClr>
+                </a:solidFill>
+              </a:rPr>
+              <a:t>）</a:t>
+            </a:r>
+            <a:endParaRPr lang="en-US" altLang="zh-CN" sz="2000" dirty="0" smtClean="0">
+              <a:solidFill>
+                <a:schemeClr val="tx1">
+                  <a:lumMod val="50000"/>
+                </a:schemeClr>
+              </a:solidFill>
+            </a:endParaRPr>
+          </a:p>
+          <a:p>
+            <a:pPr>
+              <a:lnSpc>
+                <a:spcPct val="95000"/>
+              </a:lnSpc>
+              <a:buClr>
+                <a:schemeClr val="accent1"/>
+              </a:buClr>
+            </a:pPr>
+            <a:r>
+              <a:rPr lang="en-US" altLang="zh-CN" sz="2000" dirty="0" err="1" smtClean="0">
+                <a:solidFill>
+                  <a:schemeClr val="tx1">
+                    <a:lumMod val="50000"/>
+                  </a:schemeClr>
+                </a:solidFill>
+              </a:rPr>
+              <a:t>Seession</a:t>
+            </a:r>
+            <a:r>
+              <a:rPr lang="zh-CN" altLang="en-US" sz="2000" dirty="0" smtClean="0">
+                <a:solidFill>
+                  <a:schemeClr val="tx1">
+                    <a:lumMod val="50000"/>
+                  </a:schemeClr>
+                </a:solidFill>
+              </a:rPr>
+              <a:t>（</a:t>
+            </a:r>
+            <a:r>
+              <a:rPr lang="en-US" altLang="zh-CN" sz="2000" dirty="0" smtClean="0">
+                <a:solidFill>
+                  <a:schemeClr val="tx1">
+                    <a:lumMod val="50000"/>
+                  </a:schemeClr>
+                </a:solidFill>
+              </a:rPr>
+              <a:t>Animator</a:t>
+            </a:r>
+            <a:r>
+              <a:rPr lang="zh-CN" altLang="en-US" sz="2000" dirty="0" smtClean="0">
+                <a:solidFill>
+                  <a:schemeClr val="tx1">
+                    <a:lumMod val="50000"/>
+                  </a:schemeClr>
+                </a:solidFill>
+              </a:rPr>
+              <a:t>）</a:t>
+            </a:r>
+            <a:r>
+              <a:rPr lang="en-US" altLang="zh-CN" sz="2000" dirty="0" err="1" smtClean="0">
+                <a:solidFill>
+                  <a:schemeClr val="tx1">
+                    <a:lumMod val="50000"/>
+                  </a:schemeClr>
+                </a:solidFill>
+              </a:rPr>
+              <a:t>sta</a:t>
+            </a:r>
+            <a:r>
+              <a:rPr lang="en-US" altLang="zh-CN" sz="2000" dirty="0" smtClean="0">
+                <a:solidFill>
+                  <a:schemeClr val="tx1">
+                    <a:lumMod val="50000"/>
+                  </a:schemeClr>
+                </a:solidFill>
+              </a:rPr>
+              <a:t> set </a:t>
+            </a:r>
+            <a:r>
+              <a:rPr lang="en-US" altLang="zh-CN" sz="2000" dirty="0" err="1" smtClean="0">
+                <a:solidFill>
+                  <a:schemeClr val="tx1">
+                    <a:lumMod val="50000"/>
+                  </a:schemeClr>
+                </a:solidFill>
+              </a:rPr>
+              <a:t>fma</a:t>
+            </a:r>
+            <a:r>
+              <a:rPr lang="en-US" altLang="zh-CN" sz="2000" dirty="0" smtClean="0">
+                <a:solidFill>
+                  <a:schemeClr val="tx1">
+                    <a:lumMod val="50000"/>
+                  </a:schemeClr>
+                </a:solidFill>
+              </a:rPr>
+              <a:t> -&gt;  </a:t>
+            </a:r>
+            <a:r>
+              <a:rPr lang="en-US" altLang="zh-CN" sz="2000" dirty="0" err="1" smtClean="0">
+                <a:solidFill>
+                  <a:schemeClr val="tx1">
+                    <a:lumMod val="50000"/>
+                  </a:schemeClr>
+                </a:solidFill>
+              </a:rPr>
+              <a:t>sta</a:t>
+            </a:r>
+            <a:r>
+              <a:rPr lang="en-US" altLang="zh-CN" sz="2000" dirty="0" smtClean="0">
+                <a:solidFill>
+                  <a:schemeClr val="tx1">
+                    <a:lumMod val="50000"/>
+                  </a:schemeClr>
+                </a:solidFill>
+              </a:rPr>
+              <a:t> set </a:t>
+            </a:r>
+            <a:r>
+              <a:rPr lang="en-US" altLang="zh-CN" sz="2000" dirty="0" err="1" smtClean="0">
+                <a:solidFill>
+                  <a:schemeClr val="tx1">
+                    <a:lumMod val="50000"/>
+                  </a:schemeClr>
+                </a:solidFill>
+              </a:rPr>
+              <a:t>tim</a:t>
+            </a:r>
+            <a:r>
+              <a:rPr lang="en-US" altLang="zh-CN" sz="2000" dirty="0" smtClean="0">
+                <a:solidFill>
+                  <a:schemeClr val="tx1">
+                    <a:lumMod val="50000"/>
+                  </a:schemeClr>
+                </a:solidFill>
+              </a:rPr>
+              <a:t> &lt;time&gt;; insert ‘</a:t>
+            </a:r>
+            <a:r>
+              <a:rPr lang="en-US" altLang="zh-CN" sz="2000" dirty="0" err="1" smtClean="0">
+                <a:solidFill>
+                  <a:schemeClr val="tx1">
+                    <a:lumMod val="50000"/>
+                  </a:schemeClr>
+                </a:solidFill>
+              </a:rPr>
+              <a:t>sta</a:t>
+            </a:r>
+            <a:r>
+              <a:rPr lang="en-US" altLang="zh-CN" sz="2000" dirty="0" smtClean="0">
+                <a:solidFill>
+                  <a:schemeClr val="tx1">
+                    <a:lumMod val="50000"/>
+                  </a:schemeClr>
+                </a:solidFill>
+              </a:rPr>
+              <a:t> set pre’ after </a:t>
+            </a:r>
+            <a:r>
+              <a:rPr lang="en-US" altLang="zh-CN" sz="2000" dirty="0" err="1" smtClean="0">
+                <a:solidFill>
+                  <a:schemeClr val="tx1">
+                    <a:lumMod val="50000"/>
+                  </a:schemeClr>
+                </a:solidFill>
+              </a:rPr>
+              <a:t>sta</a:t>
+            </a:r>
+            <a:r>
+              <a:rPr lang="en-US" altLang="zh-CN" sz="2000" dirty="0" smtClean="0">
+                <a:solidFill>
+                  <a:schemeClr val="tx1">
+                    <a:lumMod val="50000"/>
+                  </a:schemeClr>
+                </a:solidFill>
+              </a:rPr>
+              <a:t> set las to  avoid strange deformed element</a:t>
+            </a:r>
+          </a:p>
+          <a:p>
+            <a:pPr>
+              <a:lnSpc>
+                <a:spcPct val="95000"/>
+              </a:lnSpc>
+              <a:buClr>
+                <a:schemeClr val="accent1"/>
+              </a:buClr>
+            </a:pPr>
+            <a:endParaRPr lang="en-US" altLang="zh-CN" sz="2000" dirty="0">
+              <a:solidFill>
+                <a:schemeClr val="tx1">
+                  <a:lumMod val="50000"/>
+                </a:schemeClr>
+              </a:solidFill>
+            </a:endParaRPr>
+          </a:p>
+          <a:p>
+            <a:pPr marL="342900" indent="-342900">
+              <a:lnSpc>
+                <a:spcPct val="95000"/>
+              </a:lnSpc>
+              <a:buClr>
+                <a:schemeClr val="accent1"/>
+              </a:buClr>
+              <a:buFont typeface="Wingdings" panose="05000000000000000000" pitchFamily="2" charset="2"/>
+              <a:buChar char="n"/>
+            </a:pPr>
+            <a:r>
+              <a:rPr lang="en-US" altLang="zh-CN" sz="2000" dirty="0" smtClean="0">
+                <a:solidFill>
+                  <a:schemeClr val="tx1">
+                    <a:lumMod val="50000"/>
+                  </a:schemeClr>
+                </a:solidFill>
+              </a:rPr>
+              <a:t>201806011</a:t>
+            </a:r>
+            <a:endParaRPr lang="en-US" altLang="zh-CN" sz="2000" dirty="0">
+              <a:solidFill>
+                <a:schemeClr val="tx1">
+                  <a:lumMod val="50000"/>
+                </a:schemeClr>
+              </a:solidFill>
+            </a:endParaRPr>
+          </a:p>
+          <a:p>
+            <a:pPr>
+              <a:lnSpc>
+                <a:spcPct val="95000"/>
+              </a:lnSpc>
+              <a:buClr>
+                <a:schemeClr val="accent1"/>
+              </a:buClr>
+            </a:pPr>
+            <a:r>
+              <a:rPr lang="en-US" altLang="zh-CN" sz="2000" dirty="0" smtClean="0">
+                <a:solidFill>
+                  <a:schemeClr val="tx1">
+                    <a:lumMod val="50000"/>
+                  </a:schemeClr>
+                </a:solidFill>
+              </a:rPr>
+              <a:t>PAB add mode shape slide</a:t>
+            </a:r>
+          </a:p>
+          <a:p>
+            <a:pPr>
+              <a:lnSpc>
+                <a:spcPct val="95000"/>
+              </a:lnSpc>
+              <a:buClr>
+                <a:schemeClr val="accent1"/>
+              </a:buClr>
+            </a:pPr>
+            <a:endParaRPr lang="en-US" altLang="zh-CN" sz="2000" dirty="0">
+              <a:solidFill>
+                <a:schemeClr val="tx1">
+                  <a:lumMod val="50000"/>
+                </a:schemeClr>
+              </a:solidFill>
+            </a:endParaRPr>
+          </a:p>
+          <a:p>
+            <a:pPr>
+              <a:lnSpc>
+                <a:spcPct val="95000"/>
+              </a:lnSpc>
+              <a:buClr>
+                <a:schemeClr val="accent1"/>
+              </a:buClr>
+            </a:pPr>
+            <a:r>
+              <a:rPr lang="en-US" altLang="zh-CN" sz="2000" dirty="0" smtClean="0">
+                <a:solidFill>
+                  <a:schemeClr val="tx1">
+                    <a:lumMod val="50000"/>
+                  </a:schemeClr>
+                </a:solidFill>
+              </a:rPr>
+              <a:t>20180613</a:t>
+            </a:r>
+          </a:p>
+          <a:p>
+            <a:pPr>
+              <a:lnSpc>
+                <a:spcPct val="95000"/>
+              </a:lnSpc>
+              <a:buClr>
+                <a:schemeClr val="accent1"/>
+              </a:buClr>
+            </a:pPr>
+            <a:r>
+              <a:rPr lang="en-US" altLang="zh-CN" sz="2000" dirty="0" smtClean="0">
+                <a:solidFill>
+                  <a:schemeClr val="tx1">
+                    <a:lumMod val="50000"/>
+                  </a:schemeClr>
+                </a:solidFill>
+              </a:rPr>
+              <a:t>SB automatic fill material </a:t>
+            </a:r>
+            <a:r>
+              <a:rPr lang="en-US" altLang="zh-CN" sz="2000" dirty="0" smtClean="0">
+                <a:solidFill>
+                  <a:schemeClr val="tx1">
+                    <a:lumMod val="50000"/>
+                  </a:schemeClr>
+                </a:solidFill>
+              </a:rPr>
+              <a:t>table</a:t>
+            </a:r>
+          </a:p>
+          <a:p>
+            <a:pPr>
+              <a:lnSpc>
+                <a:spcPct val="95000"/>
+              </a:lnSpc>
+              <a:buClr>
+                <a:schemeClr val="accent1"/>
+              </a:buClr>
+            </a:pPr>
+            <a:endParaRPr lang="en-US" altLang="zh-CN" sz="2000" dirty="0">
+              <a:solidFill>
+                <a:schemeClr val="tx1">
+                  <a:lumMod val="50000"/>
+                </a:schemeClr>
+              </a:solidFill>
+            </a:endParaRPr>
+          </a:p>
+          <a:p>
+            <a:pPr>
+              <a:lnSpc>
+                <a:spcPct val="95000"/>
+              </a:lnSpc>
+              <a:buClr>
+                <a:schemeClr val="accent1"/>
+              </a:buClr>
+            </a:pPr>
+            <a:r>
+              <a:rPr lang="en-US" altLang="zh-CN" sz="2000" dirty="0" smtClean="0">
+                <a:solidFill>
+                  <a:schemeClr val="tx1">
+                    <a:lumMod val="50000"/>
+                  </a:schemeClr>
+                </a:solidFill>
+              </a:rPr>
+              <a:t>20180622</a:t>
+            </a:r>
+          </a:p>
+          <a:p>
+            <a:pPr>
+              <a:lnSpc>
+                <a:spcPct val="95000"/>
+              </a:lnSpc>
+              <a:buClr>
+                <a:schemeClr val="accent1"/>
+              </a:buClr>
+            </a:pPr>
+            <a:r>
+              <a:rPr lang="en-US" altLang="zh-CN" sz="2000" dirty="0" smtClean="0">
+                <a:solidFill>
+                  <a:schemeClr val="tx1">
+                    <a:lumMod val="50000"/>
+                  </a:schemeClr>
+                </a:solidFill>
+              </a:rPr>
+              <a:t>SB automatic fill force in the conclusion.</a:t>
+            </a:r>
+            <a:endParaRPr lang="en-US" altLang="zh-CN" sz="2000" dirty="0" smtClean="0">
               <a:solidFill>
                 <a:schemeClr val="tx1">
                   <a:lumMod val="50000"/>
@@ -4437,7 +7100,7 @@
         <p:spPr>
           <a:xfrm>
             <a:off x="611422" y="1464866"/>
-            <a:ext cx="5434308" cy="369332"/>
+            <a:ext cx="5434308" cy="646331"/>
           </a:xfrm>
           <a:prstGeom prst="rect">
             <a:avLst/>
@@ -4450,8 +7113,31 @@
           <a:lstStyle/>
           <a:p>
             <a:r>
+              <a:rPr lang="en-US" altLang="zh-CN" dirty="0" err="1">
+                <a:solidFill>
+                  <a:schemeClr val="tx1">
+                    <a:lumMod val="50000"/>
+                  </a:schemeClr>
+                </a:solidFill>
+              </a:rPr>
+              <a:t>Rundir</a:t>
+            </a:r>
+            <a:endParaRPr lang="zh-CN" altLang="en-US" dirty="0">
+              <a:solidFill>
+                <a:schemeClr val="tx1">
+                  <a:lumMod val="50000"/>
+                </a:schemeClr>
+              </a:solidFill>
+            </a:endParaRPr>
+          </a:p>
+          <a:p>
+            <a:r>
+              <a:rPr lang="zh-CN" altLang="en-US" dirty="0" smtClean="0"/>
+              <a:t>Y</a:t>
+            </a:r>
+            <a:r>
               <a:rPr lang="zh-CN" altLang="en-US" dirty="0"/>
-              <a:t>Y:\doc\08_Personal\Yujin\0508\YokingPy\Howtouse</a:t>
+              <a:t>:\doc\08_Personal\Yujin\0508\YokingPy\Howtouse</a:t>
             </a:r>
           </a:p>
         </p:txBody>
@@ -4787,17 +7473,7 @@
                   </a:schemeClr>
                 </a:solidFill>
               </a:rPr>
-              <a:t>Configure </a:t>
-            </a:r>
-            <a:r>
-              <a:rPr lang="en-US" altLang="zh-CN" dirty="0" smtClean="0">
-                <a:solidFill>
-                  <a:schemeClr val="tx1">
-                    <a:lumMod val="50000"/>
-                  </a:schemeClr>
-                </a:solidFill>
-              </a:rPr>
-              <a:t>the </a:t>
+              <a:t>Configure the </a:t>
             </a:r>
             <a:r>
               <a:rPr lang="en-US" altLang="zh-CN" dirty="0" err="1" smtClean="0">
@@ -5151,7 +7827,7 @@
         <p:spPr>
           <a:xfrm>
             <a:off x="550863" y="1498582"/>
-            <a:ext cx="10101667" cy="1534642"/>
+            <a:ext cx="10244334" cy="1534642"/>
           </a:xfrm>
           <a:prstGeom prst="rect">
             <a:avLst/>
@@ -5265,27 +7941,7 @@
                   </a:schemeClr>
                 </a:solidFill>
               </a:rPr>
-              <a:t>: </a:t>
-            </a:r>
-            <a:r>
-              <a:rPr lang="en-US" altLang="zh-CN" sz="2000" dirty="0" err="1" smtClean="0">
-                <a:solidFill>
-                  <a:schemeClr val="tx1">
-                    <a:lumMod val="50000"/>
-                  </a:schemeClr>
-                </a:solidFill>
-              </a:rPr>
-              <a:t>Creat</a:t>
-            </a:r>
-            <a:r>
-              <a:rPr lang="en-US" altLang="zh-CN" sz="2000" dirty="0" smtClean="0">
-                <a:solidFill>
-                  <a:schemeClr val="tx1">
-                    <a:lumMod val="50000"/>
-                  </a:schemeClr>
-                </a:solidFill>
-              </a:rPr>
-              <a:t> a new session file and </a:t>
+              <a:t>: Create a new session file and </a:t>
             </a:r>
             <a:r>
               <a:rPr lang="en-US" altLang="zh-CN" sz="2000" dirty="0" err="1" smtClean="0">
@@ -5414,6 +8070,260 @@
           </a:p>
         </p:txBody>
       </p:sp>
+      <p:pic>
+        <p:nvPicPr>
+          <p:cNvPr id="6" name="Picture 5"/>
+          <p:cNvPicPr>
+            <a:picLocks noChangeAspect="1"/>
+          </p:cNvPicPr>
+          <p:nvPr/>
+        </p:nvPicPr>
+        <p:blipFill>
+          <a:blip r:embed="rId2"/>
+          <a:stretch>
+            <a:fillRect/>
+          </a:stretch>
+        </p:blipFill>
+        <p:spPr>
+          <a:xfrm>
+            <a:off x="600795" y="4212504"/>
+            <a:ext cx="1447800" cy="819150"/>
+          </a:xfrm>
+          <a:prstGeom prst="rect">
+            <a:avLst/>
+          </a:prstGeom>
+        </p:spPr>
+      </p:pic>
+      <p:sp>
+        <p:nvSpPr>
+          <p:cNvPr id="8" name="Rectangle 7"/>
+          <p:cNvSpPr/>
+          <p:nvPr/>
+        </p:nvSpPr>
+        <p:spPr>
+          <a:xfrm>
+            <a:off x="512733" y="3438198"/>
+            <a:ext cx="6780831" cy="369332"/>
+          </a:xfrm>
+          <a:prstGeom prst="rect">
+            <a:avLst/>
+          </a:prstGeom>
+        </p:spPr>
+        <p:txBody>
+          <a:bodyPr wrap="none">
+            <a:spAutoFit/>
+          </a:bodyPr>
+          <a:lstStyle/>
+          <a:p>
+            <a:r>
+              <a:rPr lang="en-US" altLang="zh-CN" dirty="0" smtClean="0"/>
+              <a:t>Script files:</a:t>
+            </a:r>
+            <a:r>
+              <a:rPr lang="zh-CN" altLang="en-US" dirty="0" smtClean="0"/>
+              <a:t>Y</a:t>
+            </a:r>
+            <a:r>
+              <a:rPr lang="zh-CN" altLang="en-US" dirty="0"/>
+              <a:t>:\doc\08_Personal\Yujin\0508\YokingPy\SessionFiles</a:t>
+            </a:r>
+          </a:p>
+        </p:txBody>
+      </p:sp>
+      <p:cxnSp>
+        <p:nvCxnSpPr>
+          <p:cNvPr id="10" name="Straight Arrow Connector 9"/>
+          <p:cNvCxnSpPr/>
+          <p:nvPr/>
+        </p:nvCxnSpPr>
+        <p:spPr>
+          <a:xfrm flipV="1">
+            <a:off x="1436914" y="4300695"/>
+            <a:ext cx="2220686" cy="251208"/>
+          </a:xfrm>
+          <a:prstGeom prst="straightConnector1">
+            <a:avLst/>
+          </a:prstGeom>
+          <a:ln>
+            <a:solidFill>
+              <a:schemeClr val="accent2"/>
+            </a:solidFill>
+            <a:tailEnd type="triangle"/>
+          </a:ln>
+        </p:spPr>
+        <p:style>
+          <a:lnRef idx="1">
+            <a:schemeClr val="accent1"/>
+          </a:lnRef>
+          <a:fillRef idx="0">
+            <a:schemeClr val="accent1"/>
+          </a:fillRef>
+          <a:effectRef idx="0">
+            <a:schemeClr val="accent1"/>
+          </a:effectRef>
+          <a:fontRef idx="minor">
+            <a:schemeClr val="tx1"/>
+          </a:fontRef>
+        </p:style>
+      </p:cxnSp>
+      <p:sp>
+        <p:nvSpPr>
+          <p:cNvPr id="11" name="TextBox 10"/>
+          <p:cNvSpPr txBox="1"/>
+          <p:nvPr/>
+        </p:nvSpPr>
+        <p:spPr>
+          <a:xfrm>
+            <a:off x="3657600" y="4061208"/>
+            <a:ext cx="2373846" cy="365091"/>
+          </a:xfrm>
+          <a:prstGeom prst="rect">
+            <a:avLst/>
+          </a:prstGeom>
+          <a:noFill/>
+        </p:spPr>
+        <p:txBody>
+          <a:bodyPr wrap="none" lIns="36000" tIns="36000" rIns="36000" bIns="36000" rtlCol="0" anchor="ctr" anchorCtr="0">
+            <a:spAutoFit/>
+          </a:bodyPr>
+          <a:lstStyle/>
+          <a:p>
+            <a:pPr>
+              <a:lnSpc>
+                <a:spcPct val="95000"/>
+              </a:lnSpc>
+              <a:buClr>
+                <a:schemeClr val="accent1"/>
+              </a:buClr>
+            </a:pPr>
+            <a:r>
+              <a:rPr lang="en-US" altLang="zh-CN" sz="2000" dirty="0" smtClean="0">
+                <a:solidFill>
+                  <a:schemeClr val="tx1">
+                    <a:lumMod val="50000"/>
+                  </a:schemeClr>
+                </a:solidFill>
+              </a:rPr>
+              <a:t>HyperView </a:t>
+            </a:r>
+            <a:r>
+              <a:rPr lang="en-US" altLang="zh-CN" sz="2000" dirty="0" err="1" smtClean="0">
+                <a:solidFill>
+                  <a:schemeClr val="tx1">
+                    <a:lumMod val="50000"/>
+                  </a:schemeClr>
+                </a:solidFill>
+              </a:rPr>
+              <a:t>Tcl</a:t>
+            </a:r>
+            <a:r>
+              <a:rPr lang="en-US" altLang="zh-CN" sz="2000" dirty="0" smtClean="0">
+                <a:solidFill>
+                  <a:schemeClr val="tx1">
+                    <a:lumMod val="50000"/>
+                  </a:schemeClr>
+                </a:solidFill>
+              </a:rPr>
+              <a:t> script</a:t>
+            </a:r>
+            <a:endParaRPr lang="zh-CN" altLang="en-US" sz="2000" dirty="0" err="1" smtClean="0">
+              <a:solidFill>
+                <a:schemeClr val="tx1">
+                  <a:lumMod val="50000"/>
+                </a:schemeClr>
+              </a:solidFill>
+            </a:endParaRPr>
+          </a:p>
+        </p:txBody>
+      </p:sp>
+      <p:sp>
+        <p:nvSpPr>
+          <p:cNvPr id="12" name="TextBox 11"/>
+          <p:cNvSpPr txBox="1"/>
+          <p:nvPr/>
+        </p:nvSpPr>
+        <p:spPr>
+          <a:xfrm>
+            <a:off x="3657600" y="4426687"/>
+            <a:ext cx="2294658" cy="365091"/>
+          </a:xfrm>
+          <a:prstGeom prst="rect">
+            <a:avLst/>
+          </a:prstGeom>
+          <a:noFill/>
+        </p:spPr>
+        <p:txBody>
+          <a:bodyPr wrap="none" lIns="36000" tIns="36000" rIns="36000" bIns="36000" rtlCol="0" anchor="ctr" anchorCtr="0">
+            <a:spAutoFit/>
+          </a:bodyPr>
+          <a:lstStyle/>
+          <a:p>
+            <a:pPr>
+              <a:lnSpc>
+                <a:spcPct val="95000"/>
+              </a:lnSpc>
+              <a:buClr>
+                <a:schemeClr val="accent1"/>
+              </a:buClr>
+            </a:pPr>
+            <a:r>
+              <a:rPr lang="en-US" altLang="zh-CN" sz="2000" dirty="0" smtClean="0">
+                <a:solidFill>
+                  <a:schemeClr val="tx1">
+                    <a:lumMod val="50000"/>
+                  </a:schemeClr>
+                </a:solidFill>
+              </a:rPr>
+              <a:t>HyperView Session</a:t>
+            </a:r>
+            <a:endParaRPr lang="zh-CN" altLang="en-US" sz="2000" dirty="0" err="1" smtClean="0">
+              <a:solidFill>
+                <a:schemeClr val="tx1">
+                  <a:lumMod val="50000"/>
+                </a:schemeClr>
+              </a:solidFill>
+            </a:endParaRPr>
+          </a:p>
+        </p:txBody>
+      </p:sp>
+      <p:cxnSp>
+        <p:nvCxnSpPr>
+          <p:cNvPr id="13" name="Straight Arrow Connector 12"/>
+          <p:cNvCxnSpPr>
+            <a:endCxn id="12" idx="1"/>
+          </p:cNvCxnSpPr>
+          <p:nvPr/>
+        </p:nvCxnSpPr>
+        <p:spPr>
+          <a:xfrm flipV="1">
+            <a:off x="1589314" y="4609233"/>
+            <a:ext cx="2068286" cy="95070"/>
+          </a:xfrm>
+          <a:prstGeom prst="straightConnector1">
+            <a:avLst/>
+          </a:prstGeom>
+          <a:ln>
+            <a:solidFill>
+              <a:schemeClr val="accent2"/>
+            </a:solidFill>
+            <a:tailEnd type="triangle"/>
+          </a:ln>
+        </p:spPr>
+        <p:style>
+          <a:lnRef idx="1">
+            <a:schemeClr val="accent1"/>
+          </a:lnRef>
+          <a:fillRef idx="0">
+            <a:schemeClr val="accent1"/>
+          </a:fillRef>
+          <a:effectRef idx="0">
+            <a:schemeClr val="accent1"/>
+          </a:effectRef>
+          <a:fontRef idx="minor">
+            <a:schemeClr val="tx1"/>
+          </a:fontRef>
+        </p:style>
+      </p:cxnSp>
     </p:spTree>
     <p:extLst>
       <p:ext uri="{BB962C8B-B14F-4D97-AF65-F5344CB8AC3E}">
@@ -5545,7 +8455,7 @@
         <p:spPr>
           <a:xfrm>
             <a:off x="550863" y="1498582"/>
-            <a:ext cx="10101667" cy="1534642"/>
+            <a:ext cx="8724495" cy="1534642"/>
           </a:xfrm>
           <a:prstGeom prst="rect">
             <a:avLst/>
@@ -5679,27 +8589,7 @@
                   </a:schemeClr>
                 </a:solidFill>
               </a:rPr>
-              <a:t> a new session file and </a:t>
-            </a:r>
-            <a:r>
-              <a:rPr lang="en-US" altLang="zh-CN" sz="2000" dirty="0" err="1" smtClean="0">
-                <a:solidFill>
-                  <a:schemeClr val="tx1">
-                    <a:lumMod val="50000"/>
-                  </a:schemeClr>
-                </a:solidFill>
-              </a:rPr>
-              <a:t>tcl</a:t>
-            </a:r>
-            <a:r>
-              <a:rPr lang="en-US" altLang="zh-CN" sz="2000" dirty="0" smtClean="0">
-                <a:solidFill>
-                  <a:schemeClr val="tx1">
-                    <a:lumMod val="50000"/>
-                  </a:schemeClr>
-                </a:solidFill>
-              </a:rPr>
-              <a:t> file in work directory, user shouldn’t modify.</a:t>
+              <a:t> a new session file in work directory, user shouldn’t modify.</a:t>
             </a:r>
           </a:p>
           <a:p>
@@ -5736,27 +8626,7 @@
                   </a:schemeClr>
                 </a:solidFill>
               </a:rPr>
-              <a:t>Note: </a:t>
-            </a:r>
-            <a:r>
-              <a:rPr lang="en-US" altLang="zh-CN" sz="2000" dirty="0" err="1" smtClean="0">
-                <a:solidFill>
-                  <a:schemeClr val="tx1">
-                    <a:lumMod val="50000"/>
-                  </a:schemeClr>
-                </a:solidFill>
-              </a:rPr>
-              <a:t>Hyperview</a:t>
-            </a:r>
-            <a:r>
-              <a:rPr lang="en-US" altLang="zh-CN" sz="2000" dirty="0" smtClean="0">
-                <a:solidFill>
-                  <a:schemeClr val="tx1">
-                    <a:lumMod val="50000"/>
-                  </a:schemeClr>
-                </a:solidFill>
-              </a:rPr>
-              <a:t> session and </a:t>
+              <a:t>Note: Animator session and </a:t>
             </a:r>
             <a:r>
               <a:rPr lang="en-US" altLang="zh-CN" sz="2000" dirty="0" err="1" smtClean="0">
@@ -5805,6 +8675,238 @@
                 </a:schemeClr>
               </a:solidFill>
             </a:endParaRPr>
+          </a:p>
+        </p:txBody>
+      </p:sp>
+      <p:pic>
+        <p:nvPicPr>
+          <p:cNvPr id="7" name="Picture 6"/>
+          <p:cNvPicPr>
+            <a:picLocks noChangeAspect="1"/>
+          </p:cNvPicPr>
+          <p:nvPr/>
+        </p:nvPicPr>
+        <p:blipFill>
+          <a:blip r:embed="rId2"/>
+          <a:stretch>
+            <a:fillRect/>
+          </a:stretch>
+        </p:blipFill>
+        <p:spPr>
+          <a:xfrm>
+            <a:off x="804043" y="3856106"/>
+            <a:ext cx="1047750" cy="733425"/>
+          </a:xfrm>
+          <a:prstGeom prst="rect">
+            <a:avLst/>
+          </a:prstGeom>
+        </p:spPr>
+      </p:pic>
+      <p:cxnSp>
+        <p:nvCxnSpPr>
+          <p:cNvPr id="9" name="Straight Arrow Connector 8"/>
+          <p:cNvCxnSpPr/>
+          <p:nvPr/>
+        </p:nvCxnSpPr>
+        <p:spPr>
+          <a:xfrm>
+            <a:off x="1517301" y="3938954"/>
+            <a:ext cx="1637881" cy="40193"/>
+          </a:xfrm>
+          <a:prstGeom prst="straightConnector1">
+            <a:avLst/>
+          </a:prstGeom>
+          <a:ln>
+            <a:solidFill>
+              <a:schemeClr val="accent2"/>
+            </a:solidFill>
+            <a:tailEnd type="triangle"/>
+          </a:ln>
+        </p:spPr>
+        <p:style>
+          <a:lnRef idx="1">
+            <a:schemeClr val="accent1"/>
+          </a:lnRef>
+          <a:fillRef idx="0">
+            <a:schemeClr val="accent1"/>
+          </a:fillRef>
+          <a:effectRef idx="0">
+            <a:schemeClr val="accent1"/>
+          </a:effectRef>
+          <a:fontRef idx="minor">
+            <a:schemeClr val="tx1"/>
+          </a:fontRef>
+        </p:style>
+      </p:cxnSp>
+      <p:sp>
+        <p:nvSpPr>
+          <p:cNvPr id="10" name="TextBox 9"/>
+          <p:cNvSpPr txBox="1"/>
+          <p:nvPr/>
+        </p:nvSpPr>
+        <p:spPr>
+          <a:xfrm>
+            <a:off x="3155183" y="3798678"/>
+            <a:ext cx="2743200" cy="365091"/>
+          </a:xfrm>
+          <a:prstGeom prst="rect">
+            <a:avLst/>
+          </a:prstGeom>
+          <a:noFill/>
+        </p:spPr>
+        <p:txBody>
+          <a:bodyPr wrap="square" lIns="36000" tIns="36000" rIns="36000" bIns="36000" rtlCol="0" anchor="ctr" anchorCtr="0">
+            <a:spAutoFit/>
+          </a:bodyPr>
+          <a:lstStyle/>
+          <a:p>
+            <a:pPr>
+              <a:lnSpc>
+                <a:spcPct val="95000"/>
+              </a:lnSpc>
+              <a:buClr>
+                <a:schemeClr val="accent1"/>
+              </a:buClr>
+            </a:pPr>
+            <a:r>
+              <a:rPr lang="en-US" altLang="zh-CN" sz="2000" dirty="0" smtClean="0">
+                <a:solidFill>
+                  <a:schemeClr val="tx1">
+                    <a:lumMod val="50000"/>
+                  </a:schemeClr>
+                </a:solidFill>
+              </a:rPr>
+              <a:t>Stress-strain curve ID</a:t>
+            </a:r>
+            <a:endParaRPr lang="zh-CN" altLang="en-US" sz="2000" dirty="0" err="1" smtClean="0">
+              <a:solidFill>
+                <a:schemeClr val="tx1">
+                  <a:lumMod val="50000"/>
+                </a:schemeClr>
+              </a:solidFill>
+            </a:endParaRPr>
+          </a:p>
+        </p:txBody>
+      </p:sp>
+      <p:cxnSp>
+        <p:nvCxnSpPr>
+          <p:cNvPr id="11" name="Straight Arrow Connector 10"/>
+          <p:cNvCxnSpPr/>
+          <p:nvPr/>
+        </p:nvCxnSpPr>
+        <p:spPr>
+          <a:xfrm>
+            <a:off x="1517300" y="4472712"/>
+            <a:ext cx="1637881" cy="40193"/>
+          </a:xfrm>
+          <a:prstGeom prst="straightConnector1">
+            <a:avLst/>
+          </a:prstGeom>
+          <a:ln>
+            <a:solidFill>
+              <a:schemeClr val="accent2"/>
+            </a:solidFill>
+            <a:tailEnd type="triangle"/>
+          </a:ln>
+        </p:spPr>
+        <p:style>
+          <a:lnRef idx="1">
+            <a:schemeClr val="accent1"/>
+          </a:lnRef>
+          <a:fillRef idx="0">
+            <a:schemeClr val="accent1"/>
+          </a:fillRef>
+          <a:effectRef idx="0">
+            <a:schemeClr val="accent1"/>
+          </a:effectRef>
+          <a:fontRef idx="minor">
+            <a:schemeClr val="tx1"/>
+          </a:fontRef>
+        </p:style>
+      </p:cxnSp>
+      <p:sp>
+        <p:nvSpPr>
+          <p:cNvPr id="12" name="TextBox 11"/>
+          <p:cNvSpPr txBox="1"/>
+          <p:nvPr/>
+        </p:nvSpPr>
+        <p:spPr>
+          <a:xfrm>
+            <a:off x="3151865" y="4391520"/>
+            <a:ext cx="2743200" cy="365091"/>
+          </a:xfrm>
+          <a:prstGeom prst="rect">
+            <a:avLst/>
+          </a:prstGeom>
+          <a:noFill/>
+        </p:spPr>
+        <p:txBody>
+          <a:bodyPr wrap="square" lIns="36000" tIns="36000" rIns="36000" bIns="36000" rtlCol="0" anchor="ctr" anchorCtr="0">
+            <a:spAutoFit/>
+          </a:bodyPr>
+          <a:lstStyle/>
+          <a:p>
+            <a:pPr>
+              <a:lnSpc>
+                <a:spcPct val="95000"/>
+              </a:lnSpc>
+              <a:buClr>
+                <a:schemeClr val="accent1"/>
+              </a:buClr>
+            </a:pPr>
+            <a:r>
+              <a:rPr lang="en-US" altLang="zh-CN" sz="2000" dirty="0" smtClean="0">
+                <a:solidFill>
+                  <a:schemeClr val="tx1">
+                    <a:lumMod val="50000"/>
+                  </a:schemeClr>
+                </a:solidFill>
+              </a:rPr>
+              <a:t>Animator script</a:t>
+            </a:r>
+            <a:endParaRPr lang="zh-CN" altLang="en-US" sz="2000" dirty="0" err="1" smtClean="0">
+              <a:solidFill>
+                <a:schemeClr val="tx1">
+                  <a:lumMod val="50000"/>
+                </a:schemeClr>
+              </a:solidFill>
+            </a:endParaRPr>
+          </a:p>
+        </p:txBody>
+      </p:sp>
+      <p:sp>
+        <p:nvSpPr>
+          <p:cNvPr id="13" name="Rectangle 12"/>
+          <p:cNvSpPr/>
+          <p:nvPr/>
+        </p:nvSpPr>
+        <p:spPr>
+          <a:xfrm>
+            <a:off x="512733" y="3438198"/>
+            <a:ext cx="6780831" cy="369332"/>
+          </a:xfrm>
+          <a:prstGeom prst="rect">
+            <a:avLst/>
+          </a:prstGeom>
+        </p:spPr>
+        <p:txBody>
+          <a:bodyPr wrap="none">
+            <a:spAutoFit/>
+          </a:bodyPr>
+          <a:lstStyle/>
+          <a:p>
+            <a:r>
+              <a:rPr lang="en-US" altLang="zh-CN" dirty="0" smtClean="0"/>
+              <a:t>Script files:</a:t>
+            </a:r>
+            <a:r>
+              <a:rPr lang="zh-CN" altLang="en-US" dirty="0" smtClean="0"/>
+              <a:t>Y</a:t>
+            </a:r>
+            <a:r>
+              <a:rPr lang="zh-CN" altLang="en-US" dirty="0"/>
+              <a:t>:\doc\08_Personal\Yujin\0508\YokingPy\SessionFiles</a:t>
+            </a:r>
           </a:p>
         </p:txBody>
       </p:sp>
@@ -5982,7 +9084,7 @@
                     </a:schemeClr>
                   </a:solidFill>
                 </a:rPr>
-                <a:t>Three layouts in </a:t>
+                <a:t>Three layouts in the </a:t>
               </a:r>
               <a:r>
                 <a:rPr lang="en-US" altLang="zh-CN" sz="2000" dirty="0" err="1" smtClean="0">
@@ -6522,7 +9624,7 @@
         </p:nvSpPr>
         <p:spPr>
           <a:xfrm>
-            <a:off x="1221793" y="3975382"/>
+            <a:off x="1221793" y="4423716"/>
             <a:ext cx="8810673" cy="365091"/>
           </a:xfrm>
           <a:prstGeom prst="rect">
@@ -7205,7 +10307,7 @@
           <a:p>
             <a:r>
               <a:rPr lang="en-US" altLang="zh-CN" dirty="0" smtClean="0"/>
-              <a:t>Add pictures</a:t>
+              <a:t>Add Pictures</a:t>
             </a:r>
             <a:endParaRPr lang="zh-CN" altLang="en-US" dirty="0"/>
           </a:p>
@@ -8147,15 +11249,6 @@
 </file>
 
 <file path=customXml/item1.xml><?xml version="1.0" encoding="utf-8"?>
-<?mso-contentType ?>
-<FormTemplates xmlns="http://schemas.microsoft.com/sharepoint/v3/contenttype/forms">
-  <Display>DocumentLibraryForm</Display>
-  <Edit>DocumentLibraryForm</Edit>
-  <New>DocumentLibraryForm</New>
-</FormTemplates>
-</file>
-
-<file path=customXml/item2.xml><?xml version="1.0" encoding="utf-8"?>
 <ct:contentTypeSchema xmlns:ct="http://schemas.microsoft.com/office/2006/metadata/contentType" xmlns:ma="http://schemas.microsoft.com/office/2006/metadata/properties/metaAttributes" ct:_="" ma:_="" ma:contentTypeName="Document" ma:contentTypeID="0x0101003E26274DA2244544AECB7DA0FE328074" ma:contentTypeVersion="6" ma:contentTypeDescription="Create a new document." ma:contentTypeScope="" ma:versionID="24a85b3c35ad3414fabe44f2223db083">
   <xsd:schema xmlns:xsd="http://www.w3.org/2001/XMLSchema" xmlns:xs="http://www.w3.org/2001/XMLSchema" xmlns:p="http://schemas.microsoft.com/office/2006/metadata/properties" xmlns:ns1="http://schemas.microsoft.com/sharepoint/v3" xmlns:ns2="682f6bf9-3ecb-412a-8ab2-32cc2720e371" xmlns:ns3="9b763500-6eb8-456c-a4dd-dbef261a76a2" targetNamespace="http://schemas.microsoft.com/office/2006/metadata/properties" ma:root="true" ma:fieldsID="083e422e35f6fb6253b2b3a449aca566" ns1:_="" ns2:_="" ns3:_="">
     <xsd:import namespace="http://schemas.microsoft.com/sharepoint/v3"/>
@@ -8373,6 +11466,15 @@
 </ct:contentTypeSchema>
 </file>
 
+<file path=customXml/item2.xml><?xml version="1.0" encoding="utf-8"?>
+<?mso-contentType ?>
+<FormTemplates xmlns="http://schemas.microsoft.com/sharepoint/v3/contenttype/forms">
+  <Display>DocumentLibraryForm</Display>
+  <Edit>DocumentLibraryForm</Edit>
+  <New>DocumentLibraryForm</New>
+</FormTemplates>
+</file>
+
 <file path=customXml/item3.xml><?xml version="1.0" encoding="utf-8"?>
 <p:properties xmlns:p="http://schemas.microsoft.com/office/2006/metadata/properties" xmlns:xsi="http://www.w3.org/2001/XMLSchema-instance" xmlns:pc="http://schemas.microsoft.com/office/infopath/2007/PartnerControls">
   <documentManagement>
@@ -8386,14 +11488,6 @@
 </file>
 
 <file path=customXml/itemProps1.xml><?xml version="1.0" encoding="utf-8"?>
-<ds:datastoreItem xmlns:ds="http://schemas.openxmlformats.org/officeDocument/2006/customXml" ds:itemID="{66B9EAF3-28D0-4592-A9D2-6364F4E06FA4}">
-  <ds:schemaRefs>
-    <ds:schemaRef ds:uri="http://schemas.microsoft.com/sharepoint/v3/contenttype/forms"/>
-  </ds:schemaRefs>
-</ds:datastoreItem>
-</file>
-
-<file path=customXml/itemProps2.xml><?xml version="1.0" encoding="utf-8"?>
 <ds:datastoreItem xmlns:ds="http://schemas.openxmlformats.org/officeDocument/2006/customXml" ds:itemID="{D7F8D69D-D168-4C3D-8799-AF4EC2D52947}">
   <ds:schemaRefs>
     <ds:schemaRef ds:uri="http://schemas.microsoft.com/office/2006/metadata/contentType"/>
@@ -8409,6 +11503,14 @@
     <ds:schemaRef ds:uri="http://purl.org/dc/elements/1.1/"/>
     <ds:schemaRef ds:uri="http://purl.org/dc/terms/"/>
     <ds:schemaRef ds:uri="http://schemas.microsoft.com/internal/obd"/>
+  </ds:schemaRefs>
+</ds:datastoreItem>
+</file>
+
+<file path=customXml/itemProps2.xml><?xml version="1.0" encoding="utf-8"?>
+<ds:datastoreItem xmlns:ds="http://schemas.openxmlformats.org/officeDocument/2006/customXml" ds:itemID="{66B9EAF3-28D0-4592-A9D2-6364F4E06FA4}">
+  <ds:schemaRefs>
+    <ds:schemaRef ds:uri="http://schemas.microsoft.com/sharepoint/v3/contenttype/forms"/>
   </ds:schemaRefs>
 </ds:datastoreItem>
 </file>

</xml_diff>